<commit_message>
Another version of the slides for the March 16 F2F
</commit_message>
<xml_diff>
--- a/slides/2016-03-01-FTWG-Error-Handlers.pptx
+++ b/slides/2016-03-01-FTWG-Error-Handlers.pptx
@@ -8,13 +8,14 @@
     <p:sldId id="256" r:id="rId2"/>
     <p:sldId id="260" r:id="rId3"/>
     <p:sldId id="261" r:id="rId4"/>
-    <p:sldId id="262" r:id="rId5"/>
-    <p:sldId id="263" r:id="rId6"/>
-    <p:sldId id="264" r:id="rId7"/>
-    <p:sldId id="265" r:id="rId8"/>
-    <p:sldId id="258" r:id="rId9"/>
-    <p:sldId id="257" r:id="rId10"/>
-    <p:sldId id="266" r:id="rId11"/>
+    <p:sldId id="267" r:id="rId5"/>
+    <p:sldId id="262" r:id="rId6"/>
+    <p:sldId id="263" r:id="rId7"/>
+    <p:sldId id="264" r:id="rId8"/>
+    <p:sldId id="265" r:id="rId9"/>
+    <p:sldId id="258" r:id="rId10"/>
+    <p:sldId id="257" r:id="rId11"/>
+    <p:sldId id="266" r:id="rId12"/>
   </p:sldIdLst>
   <p:sldSz cx="9144000" cy="6858000" type="screen4x3"/>
   <p:notesSz cx="6858000" cy="9144000"/>
@@ -252,7 +253,7 @@
           <a:p>
             <a:fld id="{46937E52-4684-DE44-B24F-C2CD0B439DDE}" type="datetimeFigureOut">
               <a:rPr lang="en-US" smtClean="0"/>
-              <a:t>2/16/16</a:t>
+              <a:t>2/29/16</a:t>
             </a:fld>
             <a:endParaRPr lang="en-US"/>
           </a:p>
@@ -422,7 +423,7 @@
           <a:p>
             <a:fld id="{46937E52-4684-DE44-B24F-C2CD0B439DDE}" type="datetimeFigureOut">
               <a:rPr lang="en-US" smtClean="0"/>
-              <a:t>2/16/16</a:t>
+              <a:t>2/29/16</a:t>
             </a:fld>
             <a:endParaRPr lang="en-US"/>
           </a:p>
@@ -602,7 +603,7 @@
           <a:p>
             <a:fld id="{46937E52-4684-DE44-B24F-C2CD0B439DDE}" type="datetimeFigureOut">
               <a:rPr lang="en-US" smtClean="0"/>
-              <a:t>2/16/16</a:t>
+              <a:t>2/29/16</a:t>
             </a:fld>
             <a:endParaRPr lang="en-US"/>
           </a:p>
@@ -772,7 +773,7 @@
           <a:p>
             <a:fld id="{46937E52-4684-DE44-B24F-C2CD0B439DDE}" type="datetimeFigureOut">
               <a:rPr lang="en-US" smtClean="0"/>
-              <a:t>2/16/16</a:t>
+              <a:t>2/29/16</a:t>
             </a:fld>
             <a:endParaRPr lang="en-US"/>
           </a:p>
@@ -1016,7 +1017,7 @@
           <a:p>
             <a:fld id="{46937E52-4684-DE44-B24F-C2CD0B439DDE}" type="datetimeFigureOut">
               <a:rPr lang="en-US" smtClean="0"/>
-              <a:t>2/16/16</a:t>
+              <a:t>2/29/16</a:t>
             </a:fld>
             <a:endParaRPr lang="en-US"/>
           </a:p>
@@ -1248,7 +1249,7 @@
           <a:p>
             <a:fld id="{46937E52-4684-DE44-B24F-C2CD0B439DDE}" type="datetimeFigureOut">
               <a:rPr lang="en-US" smtClean="0"/>
-              <a:t>2/16/16</a:t>
+              <a:t>2/29/16</a:t>
             </a:fld>
             <a:endParaRPr lang="en-US"/>
           </a:p>
@@ -1615,7 +1616,7 @@
           <a:p>
             <a:fld id="{46937E52-4684-DE44-B24F-C2CD0B439DDE}" type="datetimeFigureOut">
               <a:rPr lang="en-US" smtClean="0"/>
-              <a:t>2/16/16</a:t>
+              <a:t>2/29/16</a:t>
             </a:fld>
             <a:endParaRPr lang="en-US"/>
           </a:p>
@@ -1733,7 +1734,7 @@
           <a:p>
             <a:fld id="{46937E52-4684-DE44-B24F-C2CD0B439DDE}" type="datetimeFigureOut">
               <a:rPr lang="en-US" smtClean="0"/>
-              <a:t>2/16/16</a:t>
+              <a:t>2/29/16</a:t>
             </a:fld>
             <a:endParaRPr lang="en-US"/>
           </a:p>
@@ -1828,7 +1829,7 @@
           <a:p>
             <a:fld id="{46937E52-4684-DE44-B24F-C2CD0B439DDE}" type="datetimeFigureOut">
               <a:rPr lang="en-US" smtClean="0"/>
-              <a:t>2/16/16</a:t>
+              <a:t>2/29/16</a:t>
             </a:fld>
             <a:endParaRPr lang="en-US"/>
           </a:p>
@@ -2105,7 +2106,7 @@
           <a:p>
             <a:fld id="{46937E52-4684-DE44-B24F-C2CD0B439DDE}" type="datetimeFigureOut">
               <a:rPr lang="en-US" smtClean="0"/>
-              <a:t>2/16/16</a:t>
+              <a:t>2/29/16</a:t>
             </a:fld>
             <a:endParaRPr lang="en-US"/>
           </a:p>
@@ -2362,7 +2363,7 @@
           <a:p>
             <a:fld id="{46937E52-4684-DE44-B24F-C2CD0B439DDE}" type="datetimeFigureOut">
               <a:rPr lang="en-US" smtClean="0"/>
-              <a:t>2/16/16</a:t>
+              <a:t>2/29/16</a:t>
             </a:fld>
             <a:endParaRPr lang="en-US"/>
           </a:p>
@@ -2575,7 +2576,7 @@
           <a:p>
             <a:fld id="{46937E52-4684-DE44-B24F-C2CD0B439DDE}" type="datetimeFigureOut">
               <a:rPr lang="en-US" smtClean="0"/>
-              <a:t>2/16/16</a:t>
+              <a:t>2/29/16</a:t>
             </a:fld>
             <a:endParaRPr lang="en-US"/>
           </a:p>
@@ -3020,13 +3021,8 @@
           <a:p>
             <a:r>
               <a:rPr lang="en-US" dirty="0" smtClean="0"/>
-              <a:t>Fault Tolerance Working </a:t>
-            </a:r>
-            <a:r>
-              <a:rPr lang="en-US" dirty="0" smtClean="0"/>
-              <a:t>Group</a:t>
-            </a:r>
-            <a:endParaRPr lang="en-US" dirty="0" smtClean="0"/>
+              <a:t>Fault Tolerance Working Group</a:t>
+            </a:r>
           </a:p>
         </p:txBody>
       </p:sp>
@@ -3070,6 +3066,766 @@
             <p:ph type="title"/>
           </p:nvPr>
         </p:nvSpPr>
+        <p:spPr>
+          <a:xfrm>
+            <a:off x="628650" y="365126"/>
+            <a:ext cx="4953118" cy="1325563"/>
+          </a:xfrm>
+        </p:spPr>
+        <p:txBody>
+          <a:bodyPr>
+            <a:normAutofit fontScale="90000"/>
+          </a:bodyPr>
+          <a:lstStyle/>
+          <a:p>
+            <a:r>
+              <a:rPr lang="en-US" dirty="0" smtClean="0"/>
+              <a:t>Multiple Error Handler</a:t>
+            </a:r>
+            <a:br>
+              <a:rPr lang="en-US" dirty="0" smtClean="0"/>
+            </a:br>
+            <a:r>
+              <a:rPr lang="en-US" dirty="0" smtClean="0"/>
+              <a:t>Types Solution</a:t>
+            </a:r>
+            <a:endParaRPr lang="en-US" dirty="0"/>
+          </a:p>
+        </p:txBody>
+      </p:sp>
+      <p:sp>
+        <p:nvSpPr>
+          <p:cNvPr id="3" name="Content Placeholder 2"/>
+          <p:cNvSpPr>
+            <a:spLocks noGrp="1"/>
+          </p:cNvSpPr>
+          <p:nvPr>
+            <p:ph idx="1"/>
+          </p:nvPr>
+        </p:nvSpPr>
+        <p:spPr>
+          <a:xfrm>
+            <a:off x="628650" y="2237573"/>
+            <a:ext cx="4497175" cy="3628694"/>
+          </a:xfrm>
+        </p:spPr>
+        <p:txBody>
+          <a:bodyPr/>
+          <a:lstStyle/>
+          <a:p>
+            <a:r>
+              <a:rPr lang="en-US" dirty="0" smtClean="0"/>
+              <a:t>Create a new </a:t>
+            </a:r>
+            <a:r>
+              <a:rPr lang="en-US" dirty="0" err="1" smtClean="0"/>
+              <a:t>struct</a:t>
+            </a:r>
+            <a:r>
+              <a:rPr lang="en-US" dirty="0" smtClean="0"/>
+              <a:t> that provides all of the </a:t>
+            </a:r>
+            <a:r>
+              <a:rPr lang="en-US" dirty="0" smtClean="0"/>
+              <a:t>information</a:t>
+            </a:r>
+          </a:p>
+          <a:p>
+            <a:r>
+              <a:rPr lang="en-US" dirty="0" smtClean="0"/>
+              <a:t>Solves other problems discussed previously</a:t>
+            </a:r>
+          </a:p>
+          <a:p>
+            <a:pPr lvl="1"/>
+            <a:r>
+              <a:rPr lang="en-US" dirty="0" smtClean="0"/>
+              <a:t>Multiple requests, multiple error codes, user context</a:t>
+            </a:r>
+            <a:endParaRPr lang="en-US" dirty="0"/>
+          </a:p>
+        </p:txBody>
+      </p:sp>
+      <p:sp>
+        <p:nvSpPr>
+          <p:cNvPr id="4" name="TextBox 3"/>
+          <p:cNvSpPr txBox="1"/>
+          <p:nvPr/>
+        </p:nvSpPr>
+        <p:spPr>
+          <a:xfrm>
+            <a:off x="5581768" y="2205259"/>
+            <a:ext cx="3457280" cy="3693319"/>
+          </a:xfrm>
+          <a:prstGeom prst="rect">
+            <a:avLst/>
+          </a:prstGeom>
+          <a:ln w="28575">
+            <a:solidFill>
+              <a:schemeClr val="accent6"/>
+            </a:solidFill>
+          </a:ln>
+        </p:spPr>
+        <p:style>
+          <a:lnRef idx="2">
+            <a:schemeClr val="accent1"/>
+          </a:lnRef>
+          <a:fillRef idx="1">
+            <a:schemeClr val="lt1"/>
+          </a:fillRef>
+          <a:effectRef idx="0">
+            <a:schemeClr val="accent1"/>
+          </a:effectRef>
+          <a:fontRef idx="minor">
+            <a:schemeClr val="dk1"/>
+          </a:fontRef>
+        </p:style>
+        <p:txBody>
+          <a:bodyPr wrap="square" numCol="1" rtlCol="0" anchor="ctr">
+            <a:spAutoFit/>
+          </a:bodyPr>
+          <a:lstStyle/>
+          <a:p>
+            <a:pPr>
+              <a:lnSpc>
+                <a:spcPct val="150000"/>
+              </a:lnSpc>
+            </a:pPr>
+            <a:r>
+              <a:rPr lang="en-US" sz="1200" dirty="0" err="1">
+                <a:latin typeface="Monaco" charset="0"/>
+                <a:ea typeface="Monaco" charset="0"/>
+                <a:cs typeface="Monaco" charset="0"/>
+              </a:rPr>
+              <a:t>typedef</a:t>
+            </a:r>
+            <a:r>
+              <a:rPr lang="en-US" sz="1200" dirty="0">
+                <a:latin typeface="Monaco" charset="0"/>
+                <a:ea typeface="Monaco" charset="0"/>
+                <a:cs typeface="Monaco" charset="0"/>
+              </a:rPr>
+              <a:t> </a:t>
+            </a:r>
+            <a:r>
+              <a:rPr lang="en-US" sz="1200" dirty="0" err="1">
+                <a:latin typeface="Monaco" charset="0"/>
+                <a:ea typeface="Monaco" charset="0"/>
+                <a:cs typeface="Monaco" charset="0"/>
+              </a:rPr>
+              <a:t>struct</a:t>
+            </a:r>
+            <a:r>
+              <a:rPr lang="en-US" sz="1200" dirty="0">
+                <a:latin typeface="Monaco" charset="0"/>
+                <a:ea typeface="Monaco" charset="0"/>
+                <a:cs typeface="Monaco" charset="0"/>
+              </a:rPr>
+              <a:t> {</a:t>
+            </a:r>
+          </a:p>
+          <a:p>
+            <a:pPr>
+              <a:lnSpc>
+                <a:spcPct val="150000"/>
+              </a:lnSpc>
+            </a:pPr>
+            <a:r>
+              <a:rPr lang="en-US" sz="1200" dirty="0">
+                <a:latin typeface="Monaco" charset="0"/>
+                <a:ea typeface="Monaco" charset="0"/>
+                <a:cs typeface="Monaco" charset="0"/>
+              </a:rPr>
+              <a:t>  </a:t>
+            </a:r>
+            <a:r>
+              <a:rPr lang="en-US" sz="1200" dirty="0" err="1">
+                <a:latin typeface="Monaco" charset="0"/>
+                <a:ea typeface="Monaco" charset="0"/>
+                <a:cs typeface="Monaco" charset="0"/>
+              </a:rPr>
+              <a:t>enum</a:t>
+            </a:r>
+            <a:r>
+              <a:rPr lang="en-US" sz="1200" dirty="0">
+                <a:latin typeface="Monaco" charset="0"/>
+                <a:ea typeface="Monaco" charset="0"/>
+                <a:cs typeface="Monaco" charset="0"/>
+              </a:rPr>
+              <a:t> </a:t>
+            </a:r>
+            <a:r>
+              <a:rPr lang="en-US" sz="1200" dirty="0" err="1">
+                <a:latin typeface="Monaco" charset="0"/>
+                <a:ea typeface="Monaco" charset="0"/>
+                <a:cs typeface="Monaco" charset="0"/>
+              </a:rPr>
+              <a:t>int</a:t>
+            </a:r>
+            <a:r>
+              <a:rPr lang="en-US" sz="1200" dirty="0">
+                <a:latin typeface="Monaco" charset="0"/>
+                <a:ea typeface="Monaco" charset="0"/>
+                <a:cs typeface="Monaco" charset="0"/>
+              </a:rPr>
+              <a:t> *</a:t>
+            </a:r>
+            <a:r>
+              <a:rPr lang="en-US" sz="1200" dirty="0" err="1">
+                <a:latin typeface="Monaco" charset="0"/>
+                <a:ea typeface="Monaco" charset="0"/>
+                <a:cs typeface="Monaco" charset="0"/>
+              </a:rPr>
+              <a:t>object_types</a:t>
+            </a:r>
+            <a:r>
+              <a:rPr lang="en-US" sz="1200" dirty="0">
+                <a:latin typeface="Monaco" charset="0"/>
+                <a:ea typeface="Monaco" charset="0"/>
+                <a:cs typeface="Monaco" charset="0"/>
+              </a:rPr>
+              <a:t>;</a:t>
+            </a:r>
+          </a:p>
+          <a:p>
+            <a:pPr>
+              <a:lnSpc>
+                <a:spcPct val="150000"/>
+              </a:lnSpc>
+            </a:pPr>
+            <a:r>
+              <a:rPr lang="en-US" sz="1200" dirty="0">
+                <a:latin typeface="Monaco" charset="0"/>
+                <a:ea typeface="Monaco" charset="0"/>
+                <a:cs typeface="Monaco" charset="0"/>
+              </a:rPr>
+              <a:t>  union </a:t>
+            </a:r>
+            <a:r>
+              <a:rPr lang="en-US" sz="1200" dirty="0" err="1" smtClean="0">
+                <a:latin typeface="Monaco" charset="0"/>
+                <a:ea typeface="Monaco" charset="0"/>
+                <a:cs typeface="Monaco" charset="0"/>
+              </a:rPr>
+              <a:t>MPI_Object</a:t>
+            </a:r>
+            <a:r>
+              <a:rPr lang="en-US" sz="1200" dirty="0" smtClean="0">
+                <a:latin typeface="Monaco" charset="0"/>
+                <a:ea typeface="Monaco" charset="0"/>
+                <a:cs typeface="Monaco" charset="0"/>
+              </a:rPr>
+              <a:t> {</a:t>
+            </a:r>
+          </a:p>
+          <a:p>
+            <a:pPr>
+              <a:lnSpc>
+                <a:spcPct val="150000"/>
+              </a:lnSpc>
+            </a:pPr>
+            <a:r>
+              <a:rPr lang="en-US" sz="1200" dirty="0">
+                <a:latin typeface="Monaco" charset="0"/>
+                <a:ea typeface="Monaco" charset="0"/>
+                <a:cs typeface="Monaco" charset="0"/>
+              </a:rPr>
+              <a:t> </a:t>
+            </a:r>
+            <a:r>
+              <a:rPr lang="en-US" sz="1200" dirty="0" smtClean="0">
+                <a:latin typeface="Monaco" charset="0"/>
+                <a:ea typeface="Monaco" charset="0"/>
+                <a:cs typeface="Monaco" charset="0"/>
+              </a:rPr>
+              <a:t>   </a:t>
+            </a:r>
+            <a:r>
+              <a:rPr lang="en-US" sz="1200" dirty="0" err="1" smtClean="0">
+                <a:latin typeface="Monaco" charset="0"/>
+                <a:ea typeface="Monaco" charset="0"/>
+                <a:cs typeface="Monaco" charset="0"/>
+              </a:rPr>
+              <a:t>MPI_Comm</a:t>
+            </a:r>
+            <a:r>
+              <a:rPr lang="en-US" sz="1200" dirty="0" smtClean="0">
+                <a:latin typeface="Monaco" charset="0"/>
+                <a:ea typeface="Monaco" charset="0"/>
+                <a:cs typeface="Monaco" charset="0"/>
+              </a:rPr>
+              <a:t> </a:t>
+            </a:r>
+            <a:r>
+              <a:rPr lang="en-US" sz="1200" dirty="0" err="1" smtClean="0">
+                <a:latin typeface="Monaco" charset="0"/>
+                <a:ea typeface="Monaco" charset="0"/>
+                <a:cs typeface="Monaco" charset="0"/>
+              </a:rPr>
+              <a:t>comm</a:t>
+            </a:r>
+            <a:r>
+              <a:rPr lang="en-US" sz="1200" dirty="0">
+                <a:latin typeface="Monaco" charset="0"/>
+                <a:ea typeface="Monaco" charset="0"/>
+                <a:cs typeface="Monaco" charset="0"/>
+              </a:rPr>
+              <a:t>;</a:t>
+            </a:r>
+          </a:p>
+          <a:p>
+            <a:pPr>
+              <a:lnSpc>
+                <a:spcPct val="150000"/>
+              </a:lnSpc>
+            </a:pPr>
+            <a:r>
+              <a:rPr lang="en-US" sz="1200" dirty="0" smtClean="0">
+                <a:latin typeface="Monaco" charset="0"/>
+                <a:ea typeface="Monaco" charset="0"/>
+                <a:cs typeface="Monaco" charset="0"/>
+              </a:rPr>
+              <a:t>    </a:t>
+            </a:r>
+            <a:r>
+              <a:rPr lang="en-US" sz="1200" dirty="0" err="1" smtClean="0">
+                <a:latin typeface="Monaco" charset="0"/>
+                <a:ea typeface="Monaco" charset="0"/>
+                <a:cs typeface="Monaco" charset="0"/>
+              </a:rPr>
+              <a:t>MPI_Win</a:t>
+            </a:r>
+            <a:r>
+              <a:rPr lang="en-US" sz="1200" dirty="0" smtClean="0">
+                <a:latin typeface="Monaco" charset="0"/>
+                <a:ea typeface="Monaco" charset="0"/>
+                <a:cs typeface="Monaco" charset="0"/>
+              </a:rPr>
+              <a:t> </a:t>
+            </a:r>
+            <a:r>
+              <a:rPr lang="en-US" sz="1200" dirty="0">
+                <a:latin typeface="Monaco" charset="0"/>
+                <a:ea typeface="Monaco" charset="0"/>
+                <a:cs typeface="Monaco" charset="0"/>
+              </a:rPr>
+              <a:t>win</a:t>
+            </a:r>
+            <a:r>
+              <a:rPr lang="en-US" sz="1200" dirty="0" smtClean="0">
+                <a:latin typeface="Monaco" charset="0"/>
+                <a:ea typeface="Monaco" charset="0"/>
+                <a:cs typeface="Monaco" charset="0"/>
+              </a:rPr>
+              <a:t>;</a:t>
+            </a:r>
+            <a:endParaRPr lang="en-US" sz="1200" dirty="0">
+              <a:latin typeface="Monaco" charset="0"/>
+              <a:ea typeface="Monaco" charset="0"/>
+              <a:cs typeface="Monaco" charset="0"/>
+            </a:endParaRPr>
+          </a:p>
+          <a:p>
+            <a:pPr>
+              <a:lnSpc>
+                <a:spcPct val="150000"/>
+              </a:lnSpc>
+            </a:pPr>
+            <a:r>
+              <a:rPr lang="en-US" sz="1200" dirty="0" smtClean="0">
+                <a:latin typeface="Monaco" charset="0"/>
+                <a:ea typeface="Monaco" charset="0"/>
+                <a:cs typeface="Monaco" charset="0"/>
+              </a:rPr>
+              <a:t>    </a:t>
+            </a:r>
+            <a:r>
+              <a:rPr lang="en-US" sz="1200" dirty="0" err="1" smtClean="0">
+                <a:latin typeface="Monaco" charset="0"/>
+                <a:ea typeface="Monaco" charset="0"/>
+                <a:cs typeface="Monaco" charset="0"/>
+              </a:rPr>
+              <a:t>MPI_File</a:t>
+            </a:r>
+            <a:r>
+              <a:rPr lang="en-US" sz="1200" dirty="0" smtClean="0">
+                <a:latin typeface="Monaco" charset="0"/>
+                <a:ea typeface="Monaco" charset="0"/>
+                <a:cs typeface="Monaco" charset="0"/>
+              </a:rPr>
+              <a:t> </a:t>
+            </a:r>
+            <a:r>
+              <a:rPr lang="en-US" sz="1200" dirty="0">
+                <a:latin typeface="Monaco" charset="0"/>
+                <a:ea typeface="Monaco" charset="0"/>
+                <a:cs typeface="Monaco" charset="0"/>
+              </a:rPr>
+              <a:t>file</a:t>
+            </a:r>
+            <a:r>
+              <a:rPr lang="en-US" sz="1200" dirty="0" smtClean="0">
+                <a:latin typeface="Monaco" charset="0"/>
+                <a:ea typeface="Monaco" charset="0"/>
+                <a:cs typeface="Monaco" charset="0"/>
+              </a:rPr>
+              <a:t>;</a:t>
+            </a:r>
+            <a:endParaRPr lang="en-US" sz="1200" dirty="0">
+              <a:latin typeface="Monaco" charset="0"/>
+              <a:ea typeface="Monaco" charset="0"/>
+              <a:cs typeface="Monaco" charset="0"/>
+            </a:endParaRPr>
+          </a:p>
+          <a:p>
+            <a:pPr>
+              <a:lnSpc>
+                <a:spcPct val="150000"/>
+              </a:lnSpc>
+            </a:pPr>
+            <a:r>
+              <a:rPr lang="en-US" sz="1200" dirty="0">
+                <a:latin typeface="Monaco" charset="0"/>
+                <a:ea typeface="Monaco" charset="0"/>
+                <a:cs typeface="Monaco" charset="0"/>
+              </a:rPr>
+              <a:t>  </a:t>
+            </a:r>
+            <a:r>
+              <a:rPr lang="en-US" sz="1200" dirty="0" smtClean="0">
+                <a:latin typeface="Monaco" charset="0"/>
+                <a:ea typeface="Monaco" charset="0"/>
+                <a:cs typeface="Monaco" charset="0"/>
+              </a:rPr>
+              <a:t>};</a:t>
+            </a:r>
+          </a:p>
+          <a:p>
+            <a:pPr>
+              <a:lnSpc>
+                <a:spcPct val="150000"/>
+              </a:lnSpc>
+            </a:pPr>
+            <a:r>
+              <a:rPr lang="en-US" sz="1200" dirty="0">
+                <a:latin typeface="Monaco" charset="0"/>
+                <a:ea typeface="Monaco" charset="0"/>
+                <a:cs typeface="Monaco" charset="0"/>
+              </a:rPr>
+              <a:t> </a:t>
+            </a:r>
+            <a:r>
+              <a:rPr lang="en-US" sz="1200" dirty="0" smtClean="0">
+                <a:latin typeface="Monaco" charset="0"/>
+                <a:ea typeface="Monaco" charset="0"/>
+                <a:cs typeface="Monaco" charset="0"/>
+              </a:rPr>
+              <a:t> </a:t>
+            </a:r>
+            <a:r>
+              <a:rPr lang="en-US" sz="1200" dirty="0" err="1">
+                <a:latin typeface="Monaco" charset="0"/>
+                <a:ea typeface="Monaco" charset="0"/>
+                <a:cs typeface="Monaco" charset="0"/>
+              </a:rPr>
+              <a:t>MPI_Request</a:t>
+            </a:r>
+            <a:r>
+              <a:rPr lang="en-US" sz="1200" dirty="0">
+                <a:latin typeface="Monaco" charset="0"/>
+                <a:ea typeface="Monaco" charset="0"/>
+                <a:cs typeface="Monaco" charset="0"/>
+              </a:rPr>
+              <a:t> *</a:t>
+            </a:r>
+            <a:r>
+              <a:rPr lang="en-US" sz="1200" dirty="0" err="1">
+                <a:latin typeface="Monaco" charset="0"/>
+                <a:ea typeface="Monaco" charset="0"/>
+                <a:cs typeface="Monaco" charset="0"/>
+              </a:rPr>
+              <a:t>reqs</a:t>
+            </a:r>
+            <a:r>
+              <a:rPr lang="en-US" sz="1200" dirty="0">
+                <a:latin typeface="Monaco" charset="0"/>
+                <a:ea typeface="Monaco" charset="0"/>
+                <a:cs typeface="Monaco" charset="0"/>
+              </a:rPr>
+              <a:t>;</a:t>
+            </a:r>
+          </a:p>
+          <a:p>
+            <a:pPr>
+              <a:lnSpc>
+                <a:spcPct val="150000"/>
+              </a:lnSpc>
+            </a:pPr>
+            <a:r>
+              <a:rPr lang="en-US" sz="1200" dirty="0" smtClean="0">
+                <a:latin typeface="Monaco" charset="0"/>
+                <a:ea typeface="Monaco" charset="0"/>
+                <a:cs typeface="Monaco" charset="0"/>
+              </a:rPr>
+              <a:t>  </a:t>
+            </a:r>
+            <a:r>
+              <a:rPr lang="en-US" sz="1200" dirty="0" err="1">
+                <a:latin typeface="Monaco" charset="0"/>
+                <a:ea typeface="Monaco" charset="0"/>
+                <a:cs typeface="Monaco" charset="0"/>
+              </a:rPr>
+              <a:t>int</a:t>
+            </a:r>
+            <a:r>
+              <a:rPr lang="en-US" sz="1200" dirty="0">
+                <a:latin typeface="Monaco" charset="0"/>
+                <a:ea typeface="Monaco" charset="0"/>
+                <a:cs typeface="Monaco" charset="0"/>
+              </a:rPr>
+              <a:t> </a:t>
+            </a:r>
+            <a:r>
+              <a:rPr lang="en-US" sz="1200" dirty="0" err="1" smtClean="0">
+                <a:latin typeface="Monaco" charset="0"/>
+                <a:ea typeface="Monaco" charset="0"/>
+                <a:cs typeface="Monaco" charset="0"/>
+              </a:rPr>
+              <a:t>num_reqs</a:t>
+            </a:r>
+            <a:r>
+              <a:rPr lang="en-US" sz="1200" dirty="0" smtClean="0">
+                <a:latin typeface="Monaco" charset="0"/>
+                <a:ea typeface="Monaco" charset="0"/>
+                <a:cs typeface="Monaco" charset="0"/>
+              </a:rPr>
+              <a:t>;</a:t>
+            </a:r>
+            <a:endParaRPr lang="en-US" sz="1200" dirty="0">
+              <a:latin typeface="Monaco" charset="0"/>
+              <a:ea typeface="Monaco" charset="0"/>
+              <a:cs typeface="Monaco" charset="0"/>
+            </a:endParaRPr>
+          </a:p>
+          <a:p>
+            <a:pPr>
+              <a:lnSpc>
+                <a:spcPct val="150000"/>
+              </a:lnSpc>
+            </a:pPr>
+            <a:r>
+              <a:rPr lang="en-US" sz="1200" dirty="0">
+                <a:latin typeface="Monaco" charset="0"/>
+                <a:ea typeface="Monaco" charset="0"/>
+                <a:cs typeface="Monaco" charset="0"/>
+              </a:rPr>
+              <a:t>  </a:t>
+            </a:r>
+            <a:r>
+              <a:rPr lang="en-US" sz="1200" dirty="0" err="1">
+                <a:latin typeface="Monaco" charset="0"/>
+                <a:ea typeface="Monaco" charset="0"/>
+                <a:cs typeface="Monaco" charset="0"/>
+              </a:rPr>
+              <a:t>int</a:t>
+            </a:r>
+            <a:r>
+              <a:rPr lang="en-US" sz="1200" dirty="0">
+                <a:latin typeface="Monaco" charset="0"/>
+                <a:ea typeface="Monaco" charset="0"/>
+                <a:cs typeface="Monaco" charset="0"/>
+              </a:rPr>
+              <a:t> </a:t>
+            </a:r>
+            <a:r>
+              <a:rPr lang="en-US" sz="1200" dirty="0" smtClean="0">
+                <a:latin typeface="Monaco" charset="0"/>
+                <a:ea typeface="Monaco" charset="0"/>
+                <a:cs typeface="Monaco" charset="0"/>
+              </a:rPr>
+              <a:t>*</a:t>
+            </a:r>
+            <a:r>
+              <a:rPr lang="en-US" sz="1200" dirty="0" err="1" smtClean="0">
+                <a:latin typeface="Monaco" charset="0"/>
+                <a:ea typeface="Monaco" charset="0"/>
+                <a:cs typeface="Monaco" charset="0"/>
+              </a:rPr>
+              <a:t>errcodes</a:t>
+            </a:r>
+            <a:r>
+              <a:rPr lang="en-US" sz="1200" dirty="0" smtClean="0">
+                <a:latin typeface="Monaco" charset="0"/>
+                <a:ea typeface="Monaco" charset="0"/>
+                <a:cs typeface="Monaco" charset="0"/>
+              </a:rPr>
+              <a:t>;</a:t>
+            </a:r>
+          </a:p>
+          <a:p>
+            <a:pPr>
+              <a:lnSpc>
+                <a:spcPct val="150000"/>
+              </a:lnSpc>
+            </a:pPr>
+            <a:r>
+              <a:rPr lang="en-US" sz="1200" dirty="0">
+                <a:latin typeface="Monaco" charset="0"/>
+                <a:ea typeface="Monaco" charset="0"/>
+                <a:cs typeface="Monaco" charset="0"/>
+              </a:rPr>
+              <a:t> </a:t>
+            </a:r>
+            <a:r>
+              <a:rPr lang="en-US" sz="1200" dirty="0" smtClean="0">
+                <a:latin typeface="Monaco" charset="0"/>
+                <a:ea typeface="Monaco" charset="0"/>
+                <a:cs typeface="Monaco" charset="0"/>
+              </a:rPr>
+              <a:t> </a:t>
+            </a:r>
+            <a:r>
+              <a:rPr lang="en-US" sz="1200" dirty="0" err="1" smtClean="0">
+                <a:latin typeface="Monaco" charset="0"/>
+                <a:ea typeface="Monaco" charset="0"/>
+                <a:cs typeface="Monaco" charset="0"/>
+              </a:rPr>
+              <a:t>int</a:t>
+            </a:r>
+            <a:r>
+              <a:rPr lang="en-US" sz="1200" dirty="0" smtClean="0">
+                <a:latin typeface="Monaco" charset="0"/>
+                <a:ea typeface="Monaco" charset="0"/>
+                <a:cs typeface="Monaco" charset="0"/>
+              </a:rPr>
+              <a:t> </a:t>
+            </a:r>
+            <a:r>
+              <a:rPr lang="en-US" sz="1200" dirty="0" err="1" smtClean="0">
+                <a:latin typeface="Monaco" charset="0"/>
+                <a:ea typeface="Monaco" charset="0"/>
+                <a:cs typeface="Monaco" charset="0"/>
+              </a:rPr>
+              <a:t>num_errcodes</a:t>
+            </a:r>
+            <a:r>
+              <a:rPr lang="en-US" sz="1200" dirty="0" smtClean="0">
+                <a:latin typeface="Monaco" charset="0"/>
+                <a:ea typeface="Monaco" charset="0"/>
+                <a:cs typeface="Monaco" charset="0"/>
+              </a:rPr>
+              <a:t>;</a:t>
+            </a:r>
+            <a:endParaRPr lang="en-US" sz="1200" dirty="0">
+              <a:latin typeface="Monaco" charset="0"/>
+              <a:ea typeface="Monaco" charset="0"/>
+              <a:cs typeface="Monaco" charset="0"/>
+            </a:endParaRPr>
+          </a:p>
+          <a:p>
+            <a:pPr>
+              <a:lnSpc>
+                <a:spcPct val="150000"/>
+              </a:lnSpc>
+            </a:pPr>
+            <a:r>
+              <a:rPr lang="en-US" sz="1200" dirty="0">
+                <a:latin typeface="Monaco" charset="0"/>
+                <a:ea typeface="Monaco" charset="0"/>
+                <a:cs typeface="Monaco" charset="0"/>
+              </a:rPr>
+              <a:t>  void *</a:t>
+            </a:r>
+            <a:r>
+              <a:rPr lang="en-US" sz="1200" dirty="0" err="1">
+                <a:latin typeface="Monaco" charset="0"/>
+                <a:ea typeface="Monaco" charset="0"/>
+                <a:cs typeface="Monaco" charset="0"/>
+              </a:rPr>
+              <a:t>user_context</a:t>
+            </a:r>
+            <a:r>
+              <a:rPr lang="en-US" sz="1200" dirty="0">
+                <a:latin typeface="Monaco" charset="0"/>
+                <a:ea typeface="Monaco" charset="0"/>
+                <a:cs typeface="Monaco" charset="0"/>
+              </a:rPr>
+              <a:t>; </a:t>
+            </a:r>
+            <a:br>
+              <a:rPr lang="en-US" sz="1200" dirty="0">
+                <a:latin typeface="Monaco" charset="0"/>
+                <a:ea typeface="Monaco" charset="0"/>
+                <a:cs typeface="Monaco" charset="0"/>
+              </a:rPr>
+            </a:br>
+            <a:r>
+              <a:rPr lang="en-US" sz="1200" dirty="0">
+                <a:latin typeface="Monaco" charset="0"/>
+                <a:ea typeface="Monaco" charset="0"/>
+                <a:cs typeface="Monaco" charset="0"/>
+              </a:rPr>
+              <a:t>} </a:t>
+            </a:r>
+            <a:r>
+              <a:rPr lang="en-US" sz="1200" dirty="0" err="1">
+                <a:latin typeface="Monaco" charset="0"/>
+                <a:ea typeface="Monaco" charset="0"/>
+                <a:cs typeface="Monaco" charset="0"/>
+              </a:rPr>
+              <a:t>MPI_Errhandler_args</a:t>
+            </a:r>
+            <a:r>
+              <a:rPr lang="en-US" sz="1200" dirty="0">
+                <a:latin typeface="Monaco" charset="0"/>
+                <a:ea typeface="Monaco" charset="0"/>
+                <a:cs typeface="Monaco" charset="0"/>
+              </a:rPr>
+              <a:t>;</a:t>
+            </a:r>
+          </a:p>
+        </p:txBody>
+      </p:sp>
+    </p:spTree>
+    <p:extLst>
+      <p:ext uri="{BB962C8B-B14F-4D97-AF65-F5344CB8AC3E}">
+        <p14:creationId xmlns:p14="http://schemas.microsoft.com/office/powerpoint/2010/main" val="362328095"/>
+      </p:ext>
+    </p:extLst>
+  </p:cSld>
+  <p:clrMapOvr>
+    <a:masterClrMapping/>
+  </p:clrMapOvr>
+</p:sld>
+</file>
+
+<file path=ppt/slides/slide11.xml><?xml version="1.0" encoding="utf-8"?>
+<p:sld xmlns:a="http://schemas.openxmlformats.org/drawingml/2006/main" xmlns:r="http://schemas.openxmlformats.org/officeDocument/2006/relationships" xmlns:p="http://schemas.openxmlformats.org/presentationml/2006/main">
+  <p:cSld>
+    <p:spTree>
+      <p:nvGrpSpPr>
+        <p:cNvPr id="1" name=""/>
+        <p:cNvGrpSpPr/>
+        <p:nvPr/>
+      </p:nvGrpSpPr>
+      <p:grpSpPr>
+        <a:xfrm>
+          <a:off x="0" y="0"/>
+          <a:ext cx="0" cy="0"/>
+          <a:chOff x="0" y="0"/>
+          <a:chExt cx="0" cy="0"/>
+        </a:xfrm>
+      </p:grpSpPr>
+      <p:sp>
+        <p:nvSpPr>
+          <p:cNvPr id="2" name="Title 1"/>
+          <p:cNvSpPr>
+            <a:spLocks noGrp="1"/>
+          </p:cNvSpPr>
+          <p:nvPr>
+            <p:ph type="title"/>
+          </p:nvPr>
+        </p:nvSpPr>
         <p:spPr/>
         <p:txBody>
           <a:bodyPr/>
@@ -3397,15 +4153,7 @@
             </a:r>
             <a:r>
               <a:rPr lang="en-US" dirty="0" smtClean="0"/>
-              <a:t>15 Tony </a:t>
-            </a:r>
-            <a:r>
-              <a:rPr lang="en-US" dirty="0" smtClean="0"/>
-              <a:t>charged us with going off and thinking of all of the changes we would make to error handlers if we </a:t>
-            </a:r>
-            <a:r>
-              <a:rPr lang="en-US" dirty="0" smtClean="0"/>
-              <a:t>could</a:t>
+              <a:t>15 Tony charged us with going off and thinking of all of the changes we would make to error handlers if we could</a:t>
             </a:r>
           </a:p>
           <a:p>
@@ -3488,8 +4236,23 @@
           <a:lstStyle/>
           <a:p>
             <a:r>
-              <a:rPr lang="en-US" dirty="0" smtClean="0"/>
-              <a:t>Get multiple MPI objects in a single error handler</a:t>
+              <a:rPr lang="en-US" dirty="0"/>
+              <a:t>Return new error codes from an error </a:t>
+            </a:r>
+            <a:r>
+              <a:rPr lang="en-US" dirty="0" smtClean="0"/>
+              <a:t>handler</a:t>
+            </a:r>
+            <a:endParaRPr lang="en-US" dirty="0" smtClean="0"/>
+          </a:p>
+          <a:p>
+            <a:r>
+              <a:rPr lang="en-US" dirty="0" smtClean="0"/>
+              <a:t>Get </a:t>
+            </a:r>
+            <a:r>
+              <a:rPr lang="en-US" dirty="0" smtClean="0"/>
+              <a:t>multiple MPI objects in a single error handler</a:t>
             </a:r>
           </a:p>
           <a:p>
@@ -3524,13 +4287,8 @@
           <a:p>
             <a:r>
               <a:rPr lang="en-US" dirty="0" smtClean="0"/>
-              <a:t>Combine the three error handler functions into a single </a:t>
-            </a:r>
-            <a:r>
-              <a:rPr lang="en-US" dirty="0" smtClean="0"/>
-              <a:t>one to be able to assign generically</a:t>
-            </a:r>
-            <a:endParaRPr lang="en-US" dirty="0" smtClean="0"/>
+              <a:t>Combine the three error handler functions into a single one to be able to assign generically</a:t>
+            </a:r>
           </a:p>
           <a:p>
             <a:pPr lvl="1"/>
@@ -3550,21 +4308,7 @@
               <a:rPr lang="en-US" dirty="0" smtClean="0"/>
               <a:t>impacted</a:t>
             </a:r>
-          </a:p>
-          <a:p>
-            <a:r>
-              <a:rPr lang="en-US" dirty="0" smtClean="0">
-                <a:solidFill>
-                  <a:srgbClr val="FF0000"/>
-                </a:solidFill>
-              </a:rPr>
-              <a:t>Return new error codes from an error handler</a:t>
-            </a:r>
-            <a:endParaRPr lang="en-US" dirty="0" smtClean="0">
-              <a:solidFill>
-                <a:srgbClr val="FF0000"/>
-              </a:solidFill>
-            </a:endParaRPr>
+            <a:endParaRPr lang="en-US" dirty="0" smtClean="0"/>
           </a:p>
         </p:txBody>
       </p:sp>
@@ -3615,6 +4359,94 @@
           <a:p>
             <a:r>
               <a:rPr lang="en-US" dirty="0" smtClean="0"/>
+              <a:t>Return New Error Code From Error Handler</a:t>
+            </a:r>
+            <a:endParaRPr lang="en-US" dirty="0"/>
+          </a:p>
+        </p:txBody>
+      </p:sp>
+      <p:sp>
+        <p:nvSpPr>
+          <p:cNvPr id="3" name="Content Placeholder 2"/>
+          <p:cNvSpPr>
+            <a:spLocks noGrp="1"/>
+          </p:cNvSpPr>
+          <p:nvPr>
+            <p:ph idx="1"/>
+          </p:nvPr>
+        </p:nvSpPr>
+        <p:spPr/>
+        <p:txBody>
+          <a:bodyPr/>
+          <a:lstStyle/>
+          <a:p>
+            <a:r>
+              <a:rPr lang="en-US" dirty="0" smtClean="0"/>
+              <a:t>Make error codes INOUT instead of just IN</a:t>
+            </a:r>
+          </a:p>
+          <a:p>
+            <a:r>
+              <a:rPr lang="en-US" dirty="0" smtClean="0"/>
+              <a:t>Allows the error handler to handle/mask errors</a:t>
+            </a:r>
+          </a:p>
+          <a:p>
+            <a:pPr lvl="1"/>
+            <a:r>
+              <a:rPr lang="en-US" dirty="0" smtClean="0"/>
+              <a:t>If the incoming error class is MPI_ERR_MEM, we could free some memory, retry the call, and return MPI_SUCCESS.</a:t>
+            </a:r>
+          </a:p>
+        </p:txBody>
+      </p:sp>
+    </p:spTree>
+    <p:extLst>
+      <p:ext uri="{BB962C8B-B14F-4D97-AF65-F5344CB8AC3E}">
+        <p14:creationId xmlns:p14="http://schemas.microsoft.com/office/powerpoint/2010/main" val="1286057464"/>
+      </p:ext>
+    </p:extLst>
+  </p:cSld>
+  <p:clrMapOvr>
+    <a:masterClrMapping/>
+  </p:clrMapOvr>
+</p:sld>
+</file>
+
+<file path=ppt/slides/slide5.xml><?xml version="1.0" encoding="utf-8"?>
+<p:sld xmlns:a="http://schemas.openxmlformats.org/drawingml/2006/main" xmlns:r="http://schemas.openxmlformats.org/officeDocument/2006/relationships" xmlns:p="http://schemas.openxmlformats.org/presentationml/2006/main">
+  <p:cSld>
+    <p:spTree>
+      <p:nvGrpSpPr>
+        <p:cNvPr id="1" name=""/>
+        <p:cNvGrpSpPr/>
+        <p:nvPr/>
+      </p:nvGrpSpPr>
+      <p:grpSpPr>
+        <a:xfrm>
+          <a:off x="0" y="0"/>
+          <a:ext cx="0" cy="0"/>
+          <a:chOff x="0" y="0"/>
+          <a:chExt cx="0" cy="0"/>
+        </a:xfrm>
+      </p:grpSpPr>
+      <p:sp>
+        <p:nvSpPr>
+          <p:cNvPr id="2" name="Title 1"/>
+          <p:cNvSpPr>
+            <a:spLocks noGrp="1"/>
+          </p:cNvSpPr>
+          <p:nvPr>
+            <p:ph type="title"/>
+          </p:nvPr>
+        </p:nvSpPr>
+        <p:spPr/>
+        <p:txBody>
+          <a:bodyPr/>
+          <a:lstStyle/>
+          <a:p>
+            <a:r>
+              <a:rPr lang="en-US" dirty="0" smtClean="0"/>
               <a:t>Multiple Objects in a Single Call</a:t>
             </a:r>
             <a:endParaRPr lang="en-US" dirty="0"/>
@@ -3639,7 +4471,7 @@
         </p:spPr>
         <p:txBody>
           <a:bodyPr>
-            <a:normAutofit lnSpcReduction="10000"/>
+            <a:normAutofit fontScale="85000" lnSpcReduction="10000"/>
           </a:bodyPr>
           <a:lstStyle/>
           <a:p>
@@ -3660,11 +4492,7 @@
             </a:r>
             <a:r>
               <a:rPr lang="en-US" dirty="0" smtClean="0"/>
-              <a:t> with multiple </a:t>
-            </a:r>
-            <a:r>
-              <a:rPr lang="en-US" dirty="0" smtClean="0"/>
-              <a:t>communicators.</a:t>
+              <a:t> with multiple communicators.</a:t>
             </a:r>
           </a:p>
           <a:p>
@@ -3677,7 +4505,25 @@
             <a:pPr lvl="1"/>
             <a:r>
               <a:rPr lang="en-US" dirty="0" smtClean="0"/>
-              <a:t>Possibly only one and the rest get MPI_ERR_PENDING</a:t>
+              <a:t>Possibly only one and the rest get </a:t>
+            </a:r>
+            <a:r>
+              <a:rPr lang="en-US" dirty="0" smtClean="0"/>
+              <a:t>MPI_ERR_PENDING</a:t>
+            </a:r>
+          </a:p>
+          <a:p>
+            <a:r>
+              <a:rPr lang="en-US" dirty="0" smtClean="0"/>
+              <a:t>Is this the way we </a:t>
+            </a:r>
+            <a:r>
+              <a:rPr lang="en-US" b="1" dirty="0" smtClean="0"/>
+              <a:t>want</a:t>
+            </a:r>
+            <a:r>
+              <a:rPr lang="en-US" dirty="0" smtClean="0"/>
+              <a:t> things to work? Would a single call be better?</a:t>
             </a:r>
             <a:endParaRPr lang="en-US" dirty="0" smtClean="0"/>
           </a:p>
@@ -4169,7 +5015,7 @@
 </p:sld>
 </file>
 
-<file path=ppt/slides/slide5.xml><?xml version="1.0" encoding="utf-8"?>
+<file path=ppt/slides/slide6.xml><?xml version="1.0" encoding="utf-8"?>
 <p:sld xmlns:a="http://schemas.openxmlformats.org/drawingml/2006/main" xmlns:r="http://schemas.openxmlformats.org/officeDocument/2006/relationships" xmlns:p="http://schemas.openxmlformats.org/presentationml/2006/main">
   <p:cSld>
     <p:spTree>
@@ -4194,7 +5040,7 @@
         </p:nvSpPr>
         <p:spPr>
           <a:xfrm>
-            <a:off x="365760" y="3535680"/>
+            <a:off x="448491" y="4001294"/>
             <a:ext cx="8247017" cy="1193074"/>
           </a:xfrm>
           <a:prstGeom prst="rect">
@@ -4259,7 +5105,9 @@
         </p:nvSpPr>
         <p:spPr/>
         <p:txBody>
-          <a:bodyPr/>
+          <a:bodyPr>
+            <a:normAutofit lnSpcReduction="10000"/>
+          </a:bodyPr>
           <a:lstStyle/>
           <a:p>
             <a:r>
@@ -4272,8 +5120,35 @@
             </a:r>
             <a:r>
               <a:rPr lang="en-US" dirty="0" smtClean="0"/>
-              <a:t> being passed in is sometimes not enough</a:t>
-            </a:r>
+              <a:t> being passed in is sometimes not </a:t>
+            </a:r>
+            <a:r>
+              <a:rPr lang="en-US" dirty="0" smtClean="0"/>
+              <a:t>enough</a:t>
+            </a:r>
+          </a:p>
+          <a:p>
+            <a:pPr lvl="1"/>
+            <a:r>
+              <a:rPr lang="en-US" dirty="0" smtClean="0"/>
+              <a:t>Could be more than one error code that applies</a:t>
+            </a:r>
+          </a:p>
+          <a:p>
+            <a:pPr lvl="1"/>
+            <a:r>
+              <a:rPr lang="en-US" dirty="0" smtClean="0"/>
+              <a:t>Could be multiple errors in the same call (</a:t>
+            </a:r>
+            <a:r>
+              <a:rPr lang="en-US" dirty="0" err="1" smtClean="0"/>
+              <a:t>MPI_Waitall</a:t>
+            </a:r>
+            <a:r>
+              <a:rPr lang="en-US" dirty="0" smtClean="0"/>
+              <a:t>)</a:t>
+            </a:r>
+            <a:endParaRPr lang="en-US" dirty="0" smtClean="0"/>
           </a:p>
           <a:p>
             <a:r>
@@ -4316,11 +5191,7 @@
             </a:r>
             <a:r>
               <a:rPr lang="en-US" dirty="0" smtClean="0"/>
-              <a:t> </a:t>
-            </a:r>
-            <a:r>
-              <a:rPr lang="en-US" dirty="0" smtClean="0"/>
-              <a:t>*?</a:t>
+              <a:t> *?</a:t>
             </a:r>
           </a:p>
           <a:p>
@@ -4336,110 +5207,6 @@
     <p:extLst>
       <p:ext uri="{BB962C8B-B14F-4D97-AF65-F5344CB8AC3E}">
         <p14:creationId xmlns:p14="http://schemas.microsoft.com/office/powerpoint/2010/main" val="1789365167"/>
-      </p:ext>
-    </p:extLst>
-  </p:cSld>
-  <p:clrMapOvr>
-    <a:masterClrMapping/>
-  </p:clrMapOvr>
-</p:sld>
-</file>
-
-<file path=ppt/slides/slide6.xml><?xml version="1.0" encoding="utf-8"?>
-<p:sld xmlns:a="http://schemas.openxmlformats.org/drawingml/2006/main" xmlns:r="http://schemas.openxmlformats.org/officeDocument/2006/relationships" xmlns:p="http://schemas.openxmlformats.org/presentationml/2006/main">
-  <p:cSld>
-    <p:spTree>
-      <p:nvGrpSpPr>
-        <p:cNvPr id="1" name=""/>
-        <p:cNvGrpSpPr/>
-        <p:nvPr/>
-      </p:nvGrpSpPr>
-      <p:grpSpPr>
-        <a:xfrm>
-          <a:off x="0" y="0"/>
-          <a:ext cx="0" cy="0"/>
-          <a:chOff x="0" y="0"/>
-          <a:chExt cx="0" cy="0"/>
-        </a:xfrm>
-      </p:grpSpPr>
-      <p:sp>
-        <p:nvSpPr>
-          <p:cNvPr id="2" name="Title 1"/>
-          <p:cNvSpPr>
-            <a:spLocks noGrp="1"/>
-          </p:cNvSpPr>
-          <p:nvPr>
-            <p:ph type="title"/>
-          </p:nvPr>
-        </p:nvSpPr>
-        <p:spPr/>
-        <p:txBody>
-          <a:bodyPr/>
-          <a:lstStyle/>
-          <a:p>
-            <a:r>
-              <a:rPr lang="en-US" dirty="0" smtClean="0"/>
-              <a:t>Allow the application to provide context</a:t>
-            </a:r>
-            <a:endParaRPr lang="en-US" dirty="0"/>
-          </a:p>
-        </p:txBody>
-      </p:sp>
-      <p:sp>
-        <p:nvSpPr>
-          <p:cNvPr id="3" name="Content Placeholder 2"/>
-          <p:cNvSpPr>
-            <a:spLocks noGrp="1"/>
-          </p:cNvSpPr>
-          <p:nvPr>
-            <p:ph idx="1"/>
-          </p:nvPr>
-        </p:nvSpPr>
-        <p:spPr/>
-        <p:txBody>
-          <a:bodyPr/>
-          <a:lstStyle/>
-          <a:p>
-            <a:r>
-              <a:rPr lang="en-US" dirty="0" smtClean="0"/>
-              <a:t>Allow the application to provide some sort of per –object context to the error handler</a:t>
-            </a:r>
-          </a:p>
-          <a:p>
-            <a:r>
-              <a:rPr lang="en-US" dirty="0" smtClean="0"/>
-              <a:t>We’d </a:t>
-            </a:r>
-            <a:r>
-              <a:rPr lang="en-US" dirty="0" smtClean="0"/>
-              <a:t>add something to the function to set the error handler with a void *</a:t>
-            </a:r>
-            <a:r>
-              <a:rPr lang="en-US" dirty="0" smtClean="0"/>
-              <a:t>context</a:t>
-            </a:r>
-          </a:p>
-          <a:p>
-            <a:r>
-              <a:rPr lang="en-US" dirty="0" smtClean="0">
-                <a:solidFill>
-                  <a:srgbClr val="FF0000"/>
-                </a:solidFill>
-              </a:rPr>
-              <a:t>Might already get this via the info object on the communication object</a:t>
-            </a:r>
-            <a:endParaRPr lang="en-US" dirty="0">
-              <a:solidFill>
-                <a:srgbClr val="FF0000"/>
-              </a:solidFill>
-            </a:endParaRPr>
-          </a:p>
-        </p:txBody>
-      </p:sp>
-    </p:spTree>
-    <p:extLst>
-      <p:ext uri="{BB962C8B-B14F-4D97-AF65-F5344CB8AC3E}">
-        <p14:creationId xmlns:p14="http://schemas.microsoft.com/office/powerpoint/2010/main" val="1196468407"/>
       </p:ext>
     </p:extLst>
   </p:cSld>
@@ -4483,7 +5250,7 @@
           <a:p>
             <a:r>
               <a:rPr lang="en-US" dirty="0" smtClean="0"/>
-              <a:t>Pick Error Classes to Handle</a:t>
+              <a:t>Allow the application to provide context</a:t>
             </a:r>
             <a:endParaRPr lang="en-US" dirty="0"/>
           </a:p>
@@ -4491,6 +5258,44 @@
       </p:sp>
       <p:sp>
         <p:nvSpPr>
+          <p:cNvPr id="4" name="Rectangle 3"/>
+          <p:cNvSpPr/>
+          <p:nvPr/>
+        </p:nvSpPr>
+        <p:spPr>
+          <a:xfrm>
+            <a:off x="628650" y="3648891"/>
+            <a:ext cx="7809956" cy="1576252"/>
+          </a:xfrm>
+          <a:prstGeom prst="rect">
+            <a:avLst/>
+          </a:prstGeom>
+        </p:spPr>
+        <p:style>
+          <a:lnRef idx="1">
+            <a:schemeClr val="accent4"/>
+          </a:lnRef>
+          <a:fillRef idx="2">
+            <a:schemeClr val="accent4"/>
+          </a:fillRef>
+          <a:effectRef idx="1">
+            <a:schemeClr val="accent4"/>
+          </a:effectRef>
+          <a:fontRef idx="minor">
+            <a:schemeClr val="dk1"/>
+          </a:fontRef>
+        </p:style>
+        <p:txBody>
+          <a:bodyPr rtlCol="0" anchor="ctr"/>
+          <a:lstStyle/>
+          <a:p>
+            <a:pPr algn="ctr"/>
+            <a:endParaRPr lang="en-US"/>
+          </a:p>
+        </p:txBody>
+      </p:sp>
+      <p:sp>
+        <p:nvSpPr>
           <p:cNvPr id="3" name="Content Placeholder 2"/>
           <p:cNvSpPr>
             <a:spLocks noGrp="1"/>
@@ -4506,43 +5311,30 @@
           <a:p>
             <a:r>
               <a:rPr lang="en-US" dirty="0" smtClean="0"/>
-              <a:t>Add array of error classes to the </a:t>
-            </a:r>
-            <a:r>
-              <a:rPr lang="en-US" dirty="0" err="1" smtClean="0"/>
-              <a:t>MPI_Errhandler_set</a:t>
-            </a:r>
-            <a:r>
-              <a:rPr lang="en-US" dirty="0" smtClean="0"/>
-              <a:t> </a:t>
-            </a:r>
-            <a:r>
-              <a:rPr lang="en-US" dirty="0" smtClean="0"/>
-              <a:t>function</a:t>
-            </a:r>
-          </a:p>
-          <a:p>
-            <a:r>
-              <a:rPr lang="en-US" dirty="0" smtClean="0"/>
-              <a:t>Only call this error handler when an error </a:t>
-            </a:r>
-            <a:r>
-              <a:rPr lang="en-US" dirty="0" smtClean="0"/>
-              <a:t>class </a:t>
-            </a:r>
-            <a:r>
-              <a:rPr lang="en-US" dirty="0" smtClean="0"/>
-              <a:t>in the array is </a:t>
-            </a:r>
-            <a:r>
-              <a:rPr lang="en-US" dirty="0" smtClean="0"/>
-              <a:t>raised</a:t>
-            </a:r>
-          </a:p>
-          <a:p>
-            <a:r>
-              <a:rPr lang="en-US" dirty="0" smtClean="0"/>
-              <a:t>Have ”generic” error handler for all other cases</a:t>
+              <a:t>Allow the application to provide some sort of per –object context to the error handler</a:t>
+            </a:r>
+          </a:p>
+          <a:p>
+            <a:r>
+              <a:rPr lang="en-US" dirty="0" smtClean="0"/>
+              <a:t>We’d add something to the function to set the error handler with a void *context</a:t>
+            </a:r>
+          </a:p>
+          <a:p>
+            <a:r>
+              <a:rPr lang="en-US" dirty="0" smtClean="0"/>
+              <a:t>Might already get this via the info object on the communication </a:t>
+            </a:r>
+            <a:r>
+              <a:rPr lang="en-US" dirty="0" smtClean="0"/>
+              <a:t>object</a:t>
+            </a:r>
+          </a:p>
+          <a:p>
+            <a:pPr lvl="1"/>
+            <a:r>
+              <a:rPr lang="en-US" dirty="0" smtClean="0"/>
+              <a:t>George? Brought this up on the con call, but what is the idea here? Strings only?</a:t>
             </a:r>
             <a:endParaRPr lang="en-US" dirty="0"/>
           </a:p>
@@ -4551,7 +5343,7 @@
     </p:spTree>
     <p:extLst>
       <p:ext uri="{BB962C8B-B14F-4D97-AF65-F5344CB8AC3E}">
-        <p14:creationId xmlns:p14="http://schemas.microsoft.com/office/powerpoint/2010/main" val="1148874328"/>
+        <p14:creationId xmlns:p14="http://schemas.microsoft.com/office/powerpoint/2010/main" val="1196468407"/>
       </p:ext>
     </p:extLst>
   </p:cSld>
@@ -4595,7 +5387,7 @@
           <a:p>
             <a:r>
               <a:rPr lang="en-US" dirty="0" smtClean="0"/>
-              <a:t>Multiple Error Handler Types Problem</a:t>
+              <a:t>Pick Error Classes to Handle</a:t>
             </a:r>
             <a:endParaRPr lang="en-US" dirty="0"/>
           </a:p>
@@ -4611,689 +5403,44 @@
             <p:ph idx="1"/>
           </p:nvPr>
         </p:nvSpPr>
-        <p:spPr>
-          <a:xfrm>
-            <a:off x="628650" y="1669681"/>
-            <a:ext cx="7886700" cy="1705174"/>
-          </a:xfrm>
-        </p:spPr>
-        <p:txBody>
-          <a:bodyPr>
-            <a:normAutofit fontScale="77500" lnSpcReduction="20000"/>
-          </a:bodyPr>
-          <a:lstStyle/>
-          <a:p>
-            <a:r>
-              <a:rPr lang="en-US" dirty="0" smtClean="0"/>
-              <a:t>Right now, we have to create a bunch of different error handler functions even when they </a:t>
-            </a:r>
-            <a:r>
-              <a:rPr lang="en-US" dirty="0" smtClean="0"/>
-              <a:t>all often </a:t>
-            </a:r>
-            <a:r>
-              <a:rPr lang="en-US" dirty="0" smtClean="0"/>
-              <a:t>do the same thing.</a:t>
-            </a:r>
-          </a:p>
-          <a:p>
-            <a:pPr lvl="1"/>
-            <a:r>
-              <a:rPr lang="en-US" dirty="0" smtClean="0"/>
-              <a:t>Callback functions have object types built into the signatures.</a:t>
-            </a:r>
-          </a:p>
-          <a:p>
-            <a:r>
-              <a:rPr lang="en-US" dirty="0" smtClean="0"/>
-              <a:t>Makes using a single error handler function for generic handling more complex</a:t>
-            </a:r>
-          </a:p>
-        </p:txBody>
-      </p:sp>
-      <p:sp>
-        <p:nvSpPr>
-          <p:cNvPr id="4" name="TextBox 3"/>
-          <p:cNvSpPr txBox="1"/>
-          <p:nvPr/>
-        </p:nvSpPr>
-        <p:spPr>
-          <a:xfrm>
-            <a:off x="324420" y="3550886"/>
-            <a:ext cx="3542189" cy="923330"/>
-          </a:xfrm>
-          <a:prstGeom prst="rect">
-            <a:avLst/>
-          </a:prstGeom>
-          <a:ln w="28575"/>
-        </p:spPr>
-        <p:style>
-          <a:lnRef idx="2">
-            <a:schemeClr val="accent1"/>
-          </a:lnRef>
-          <a:fillRef idx="1">
-            <a:schemeClr val="lt1"/>
-          </a:fillRef>
-          <a:effectRef idx="0">
-            <a:schemeClr val="accent1"/>
-          </a:effectRef>
-          <a:fontRef idx="minor">
-            <a:schemeClr val="dk1"/>
-          </a:fontRef>
-        </p:style>
-        <p:txBody>
-          <a:bodyPr wrap="square" rtlCol="0" anchor="ctr">
-            <a:spAutoFit/>
-          </a:bodyPr>
-          <a:lstStyle/>
-          <a:p>
-            <a:r>
-              <a:rPr lang="en-US" sz="1350" dirty="0" err="1">
-                <a:latin typeface="Monaco" charset="0"/>
-                <a:ea typeface="Monaco" charset="0"/>
-                <a:cs typeface="Monaco" charset="0"/>
-              </a:rPr>
-              <a:t>MPI_Comm_errhandler_fn</a:t>
-            </a:r>
-            <a:r>
-              <a:rPr lang="en-US" sz="1350" dirty="0">
-                <a:latin typeface="Monaco" charset="0"/>
-                <a:ea typeface="Monaco" charset="0"/>
-                <a:cs typeface="Monaco" charset="0"/>
-              </a:rPr>
-              <a:t>(</a:t>
-            </a:r>
-            <a:r>
-              <a:rPr lang="en-US" sz="1350" dirty="0" err="1">
-                <a:latin typeface="Monaco" charset="0"/>
-                <a:ea typeface="Monaco" charset="0"/>
-                <a:cs typeface="Monaco" charset="0"/>
-              </a:rPr>
-              <a:t>MPI_Comm</a:t>
-            </a:r>
-            <a:r>
-              <a:rPr lang="en-US" sz="1350" dirty="0">
-                <a:latin typeface="Monaco" charset="0"/>
-                <a:ea typeface="Monaco" charset="0"/>
-                <a:cs typeface="Monaco" charset="0"/>
-              </a:rPr>
-              <a:t> *</a:t>
-            </a:r>
-            <a:r>
-              <a:rPr lang="en-US" sz="1350" dirty="0" err="1">
-                <a:latin typeface="Monaco" charset="0"/>
-                <a:ea typeface="Monaco" charset="0"/>
-                <a:cs typeface="Monaco" charset="0"/>
-              </a:rPr>
-              <a:t>comm</a:t>
-            </a:r>
-            <a:r>
-              <a:rPr lang="en-US" sz="1350" dirty="0">
-                <a:latin typeface="Monaco" charset="0"/>
-                <a:ea typeface="Monaco" charset="0"/>
-                <a:cs typeface="Monaco" charset="0"/>
-              </a:rPr>
-              <a:t>, </a:t>
-            </a:r>
-            <a:r>
-              <a:rPr lang="en-US" sz="1350" dirty="0" err="1">
-                <a:latin typeface="Monaco" charset="0"/>
-                <a:ea typeface="Monaco" charset="0"/>
-                <a:cs typeface="Monaco" charset="0"/>
-              </a:rPr>
-              <a:t>int</a:t>
-            </a:r>
-            <a:r>
-              <a:rPr lang="en-US" sz="1350" dirty="0">
-                <a:latin typeface="Monaco" charset="0"/>
-                <a:ea typeface="Monaco" charset="0"/>
-                <a:cs typeface="Monaco" charset="0"/>
-              </a:rPr>
-              <a:t> *</a:t>
-            </a:r>
-            <a:r>
-              <a:rPr lang="en-US" sz="1350" dirty="0" err="1">
-                <a:latin typeface="Monaco" charset="0"/>
-                <a:ea typeface="Monaco" charset="0"/>
-                <a:cs typeface="Monaco" charset="0"/>
-              </a:rPr>
-              <a:t>errcode</a:t>
-            </a:r>
-            <a:r>
-              <a:rPr lang="en-US" sz="1350" dirty="0">
-                <a:latin typeface="Monaco" charset="0"/>
-                <a:ea typeface="Monaco" charset="0"/>
-                <a:cs typeface="Monaco" charset="0"/>
-              </a:rPr>
-              <a:t>, </a:t>
-            </a:r>
-            <a:r>
-              <a:rPr lang="is-IS" sz="1350" dirty="0">
-                <a:latin typeface="Monaco" charset="0"/>
-                <a:ea typeface="Monaco" charset="0"/>
-                <a:cs typeface="Monaco" charset="0"/>
-              </a:rPr>
-              <a:t>…) {</a:t>
-            </a:r>
-          </a:p>
-          <a:p>
-            <a:r>
-              <a:rPr lang="is-IS" sz="1350" dirty="0">
-                <a:latin typeface="Monaco" charset="0"/>
-                <a:ea typeface="Monaco" charset="0"/>
-                <a:cs typeface="Monaco" charset="0"/>
-              </a:rPr>
-              <a:t>    cleanup_fn();</a:t>
-            </a:r>
-          </a:p>
-          <a:p>
-            <a:r>
-              <a:rPr lang="is-IS" sz="1350" dirty="0">
-                <a:latin typeface="Monaco" charset="0"/>
-                <a:ea typeface="Monaco" charset="0"/>
-                <a:cs typeface="Monaco" charset="0"/>
-              </a:rPr>
-              <a:t>}</a:t>
-            </a:r>
-            <a:endParaRPr lang="en-US" sz="1350" dirty="0">
-              <a:latin typeface="Monaco" charset="0"/>
-              <a:ea typeface="Monaco" charset="0"/>
-              <a:cs typeface="Monaco" charset="0"/>
-            </a:endParaRPr>
-          </a:p>
-        </p:txBody>
-      </p:sp>
-      <p:sp>
-        <p:nvSpPr>
-          <p:cNvPr id="5" name="TextBox 4"/>
-          <p:cNvSpPr txBox="1"/>
-          <p:nvPr/>
-        </p:nvSpPr>
-        <p:spPr>
-          <a:xfrm>
-            <a:off x="324420" y="4546373"/>
-            <a:ext cx="3542190" cy="923330"/>
-          </a:xfrm>
-          <a:prstGeom prst="rect">
-            <a:avLst/>
-          </a:prstGeom>
-          <a:ln w="28575">
-            <a:solidFill>
-              <a:srgbClr val="7030A0"/>
-            </a:solidFill>
-          </a:ln>
-        </p:spPr>
-        <p:style>
-          <a:lnRef idx="2">
-            <a:schemeClr val="accent2"/>
-          </a:lnRef>
-          <a:fillRef idx="1">
-            <a:schemeClr val="lt1"/>
-          </a:fillRef>
-          <a:effectRef idx="0">
-            <a:schemeClr val="accent2"/>
-          </a:effectRef>
-          <a:fontRef idx="minor">
-            <a:schemeClr val="dk1"/>
-          </a:fontRef>
-        </p:style>
-        <p:txBody>
-          <a:bodyPr wrap="square" rtlCol="0" anchor="ctr">
-            <a:spAutoFit/>
-          </a:bodyPr>
-          <a:lstStyle/>
-          <a:p>
-            <a:r>
-              <a:rPr lang="en-US" sz="1350" dirty="0" err="1">
-                <a:latin typeface="Monaco" charset="0"/>
-                <a:ea typeface="Monaco" charset="0"/>
-                <a:cs typeface="Monaco" charset="0"/>
-              </a:rPr>
-              <a:t>MPI_Win_errhandler_fn</a:t>
-            </a:r>
-            <a:r>
-              <a:rPr lang="en-US" sz="1350" dirty="0">
-                <a:latin typeface="Monaco" charset="0"/>
-                <a:ea typeface="Monaco" charset="0"/>
-                <a:cs typeface="Monaco" charset="0"/>
-              </a:rPr>
-              <a:t>(</a:t>
-            </a:r>
-            <a:r>
-              <a:rPr lang="en-US" sz="1350" dirty="0" err="1">
-                <a:latin typeface="Monaco" charset="0"/>
-                <a:ea typeface="Monaco" charset="0"/>
-                <a:cs typeface="Monaco" charset="0"/>
-              </a:rPr>
-              <a:t>MPI_Win</a:t>
-            </a:r>
-            <a:r>
-              <a:rPr lang="en-US" sz="1350" dirty="0">
-                <a:latin typeface="Monaco" charset="0"/>
-                <a:ea typeface="Monaco" charset="0"/>
-                <a:cs typeface="Monaco" charset="0"/>
-              </a:rPr>
-              <a:t> *win, </a:t>
-            </a:r>
-            <a:r>
-              <a:rPr lang="en-US" sz="1350" dirty="0" err="1">
-                <a:latin typeface="Monaco" charset="0"/>
-                <a:ea typeface="Monaco" charset="0"/>
-                <a:cs typeface="Monaco" charset="0"/>
-              </a:rPr>
-              <a:t>int</a:t>
-            </a:r>
-            <a:r>
-              <a:rPr lang="en-US" sz="1350" dirty="0">
-                <a:latin typeface="Monaco" charset="0"/>
-                <a:ea typeface="Monaco" charset="0"/>
-                <a:cs typeface="Monaco" charset="0"/>
-              </a:rPr>
-              <a:t> *</a:t>
-            </a:r>
-            <a:r>
-              <a:rPr lang="en-US" sz="1350" dirty="0" err="1">
-                <a:latin typeface="Monaco" charset="0"/>
-                <a:ea typeface="Monaco" charset="0"/>
-                <a:cs typeface="Monaco" charset="0"/>
-              </a:rPr>
-              <a:t>errcode</a:t>
-            </a:r>
-            <a:r>
-              <a:rPr lang="en-US" sz="1350" dirty="0">
-                <a:latin typeface="Monaco" charset="0"/>
-                <a:ea typeface="Monaco" charset="0"/>
-                <a:cs typeface="Monaco" charset="0"/>
-              </a:rPr>
-              <a:t>, </a:t>
-            </a:r>
-            <a:r>
-              <a:rPr lang="is-IS" sz="1350" dirty="0">
-                <a:latin typeface="Monaco" charset="0"/>
-                <a:ea typeface="Monaco" charset="0"/>
-                <a:cs typeface="Monaco" charset="0"/>
-              </a:rPr>
-              <a:t>…) {</a:t>
-            </a:r>
-          </a:p>
-          <a:p>
-            <a:r>
-              <a:rPr lang="is-IS" sz="1350" dirty="0">
-                <a:latin typeface="Monaco" charset="0"/>
-                <a:ea typeface="Monaco" charset="0"/>
-                <a:cs typeface="Monaco" charset="0"/>
-              </a:rPr>
-              <a:t>    cleanup_fn();</a:t>
-            </a:r>
-          </a:p>
-          <a:p>
-            <a:r>
-              <a:rPr lang="is-IS" sz="1350" dirty="0">
-                <a:latin typeface="Monaco" charset="0"/>
-                <a:ea typeface="Monaco" charset="0"/>
-                <a:cs typeface="Monaco" charset="0"/>
-              </a:rPr>
-              <a:t>}</a:t>
-            </a:r>
-            <a:endParaRPr lang="en-US" sz="1350" dirty="0">
-              <a:latin typeface="Monaco" charset="0"/>
-              <a:ea typeface="Monaco" charset="0"/>
-              <a:cs typeface="Monaco" charset="0"/>
-            </a:endParaRPr>
-          </a:p>
-        </p:txBody>
-      </p:sp>
-      <p:sp>
-        <p:nvSpPr>
-          <p:cNvPr id="6" name="TextBox 5"/>
-          <p:cNvSpPr txBox="1"/>
-          <p:nvPr/>
-        </p:nvSpPr>
-        <p:spPr>
-          <a:xfrm>
-            <a:off x="324420" y="5559363"/>
-            <a:ext cx="3542191" cy="923330"/>
-          </a:xfrm>
-          <a:prstGeom prst="rect">
-            <a:avLst/>
-          </a:prstGeom>
-          <a:ln w="28575">
-            <a:solidFill>
-              <a:schemeClr val="accent2"/>
-            </a:solidFill>
-          </a:ln>
-        </p:spPr>
-        <p:style>
-          <a:lnRef idx="2">
-            <a:schemeClr val="accent4"/>
-          </a:lnRef>
-          <a:fillRef idx="1">
-            <a:schemeClr val="lt1"/>
-          </a:fillRef>
-          <a:effectRef idx="0">
-            <a:schemeClr val="accent4"/>
-          </a:effectRef>
-          <a:fontRef idx="minor">
-            <a:schemeClr val="dk1"/>
-          </a:fontRef>
-        </p:style>
-        <p:txBody>
-          <a:bodyPr wrap="square" rtlCol="0" anchor="ctr">
-            <a:spAutoFit/>
-          </a:bodyPr>
-          <a:lstStyle/>
-          <a:p>
-            <a:r>
-              <a:rPr lang="en-US" sz="1350" dirty="0" err="1">
-                <a:latin typeface="Monaco" charset="0"/>
-                <a:ea typeface="Monaco" charset="0"/>
-                <a:cs typeface="Monaco" charset="0"/>
-              </a:rPr>
-              <a:t>MPI_Comm_errhandler_fn</a:t>
-            </a:r>
-            <a:r>
-              <a:rPr lang="en-US" sz="1350" dirty="0">
-                <a:latin typeface="Monaco" charset="0"/>
-                <a:ea typeface="Monaco" charset="0"/>
-                <a:cs typeface="Monaco" charset="0"/>
-              </a:rPr>
-              <a:t>(</a:t>
-            </a:r>
-            <a:r>
-              <a:rPr lang="en-US" sz="1350" dirty="0" err="1">
-                <a:latin typeface="Monaco" charset="0"/>
-                <a:ea typeface="Monaco" charset="0"/>
-                <a:cs typeface="Monaco" charset="0"/>
-              </a:rPr>
-              <a:t>MPI_File</a:t>
-            </a:r>
-            <a:r>
-              <a:rPr lang="en-US" sz="1350" dirty="0">
-                <a:latin typeface="Monaco" charset="0"/>
-                <a:ea typeface="Monaco" charset="0"/>
-                <a:cs typeface="Monaco" charset="0"/>
-              </a:rPr>
-              <a:t> *file, </a:t>
-            </a:r>
-            <a:r>
-              <a:rPr lang="en-US" sz="1350" dirty="0" err="1">
-                <a:latin typeface="Monaco" charset="0"/>
-                <a:ea typeface="Monaco" charset="0"/>
-                <a:cs typeface="Monaco" charset="0"/>
-              </a:rPr>
-              <a:t>int</a:t>
-            </a:r>
-            <a:r>
-              <a:rPr lang="en-US" sz="1350" dirty="0">
-                <a:latin typeface="Monaco" charset="0"/>
-                <a:ea typeface="Monaco" charset="0"/>
-                <a:cs typeface="Monaco" charset="0"/>
-              </a:rPr>
-              <a:t> *</a:t>
-            </a:r>
-            <a:r>
-              <a:rPr lang="en-US" sz="1350" dirty="0" err="1">
-                <a:latin typeface="Monaco" charset="0"/>
-                <a:ea typeface="Monaco" charset="0"/>
-                <a:cs typeface="Monaco" charset="0"/>
-              </a:rPr>
-              <a:t>errcode</a:t>
-            </a:r>
-            <a:r>
-              <a:rPr lang="en-US" sz="1350" dirty="0">
-                <a:latin typeface="Monaco" charset="0"/>
-                <a:ea typeface="Monaco" charset="0"/>
-                <a:cs typeface="Monaco" charset="0"/>
-              </a:rPr>
-              <a:t>, </a:t>
-            </a:r>
-            <a:r>
-              <a:rPr lang="is-IS" sz="1350" dirty="0">
-                <a:latin typeface="Monaco" charset="0"/>
-                <a:ea typeface="Monaco" charset="0"/>
-                <a:cs typeface="Monaco" charset="0"/>
-              </a:rPr>
-              <a:t>…) {</a:t>
-            </a:r>
-          </a:p>
-          <a:p>
-            <a:r>
-              <a:rPr lang="is-IS" sz="1350" dirty="0">
-                <a:latin typeface="Monaco" charset="0"/>
-                <a:ea typeface="Monaco" charset="0"/>
-                <a:cs typeface="Monaco" charset="0"/>
-              </a:rPr>
-              <a:t>    cleanup_fn();</a:t>
-            </a:r>
-          </a:p>
-          <a:p>
-            <a:r>
-              <a:rPr lang="is-IS" sz="1350" dirty="0">
-                <a:latin typeface="Monaco" charset="0"/>
-                <a:ea typeface="Monaco" charset="0"/>
-                <a:cs typeface="Monaco" charset="0"/>
-              </a:rPr>
-              <a:t>}</a:t>
-            </a:r>
-          </a:p>
-        </p:txBody>
-      </p:sp>
-      <p:sp>
-        <p:nvSpPr>
-          <p:cNvPr id="8" name="TextBox 7"/>
-          <p:cNvSpPr txBox="1"/>
-          <p:nvPr/>
-        </p:nvSpPr>
-        <p:spPr>
-          <a:xfrm>
-            <a:off x="5240405" y="4130875"/>
-            <a:ext cx="3542191" cy="1754326"/>
-          </a:xfrm>
-          <a:prstGeom prst="rect">
-            <a:avLst/>
-          </a:prstGeom>
-          <a:ln w="28575">
-            <a:solidFill>
-              <a:schemeClr val="accent6"/>
-            </a:solidFill>
-          </a:ln>
-        </p:spPr>
-        <p:style>
-          <a:lnRef idx="2">
-            <a:schemeClr val="accent4"/>
-          </a:lnRef>
-          <a:fillRef idx="1">
-            <a:schemeClr val="lt1"/>
-          </a:fillRef>
-          <a:effectRef idx="0">
-            <a:schemeClr val="accent4"/>
-          </a:effectRef>
-          <a:fontRef idx="minor">
-            <a:schemeClr val="dk1"/>
-          </a:fontRef>
-        </p:style>
-        <p:txBody>
-          <a:bodyPr wrap="square" rtlCol="0" anchor="ctr">
-            <a:spAutoFit/>
-          </a:bodyPr>
-          <a:lstStyle/>
-          <a:p>
-            <a:r>
-              <a:rPr lang="en-US" sz="1350" dirty="0" err="1" smtClean="0">
-                <a:latin typeface="Monaco" charset="0"/>
-                <a:ea typeface="Monaco" charset="0"/>
-                <a:cs typeface="Monaco" charset="0"/>
-              </a:rPr>
-              <a:t>MPI_Errhandler_fn</a:t>
-            </a:r>
-            <a:r>
-              <a:rPr lang="en-US" sz="1350" dirty="0" smtClean="0">
-                <a:latin typeface="Monaco" charset="0"/>
-                <a:ea typeface="Monaco" charset="0"/>
-                <a:cs typeface="Monaco" charset="0"/>
-              </a:rPr>
-              <a:t>(</a:t>
-            </a:r>
-            <a:r>
-              <a:rPr lang="is-IS" sz="1350" dirty="0" smtClean="0">
-                <a:latin typeface="Monaco" charset="0"/>
-                <a:ea typeface="Monaco" charset="0"/>
-                <a:cs typeface="Monaco" charset="0"/>
-              </a:rPr>
-              <a:t>…) {</a:t>
-            </a:r>
-          </a:p>
-          <a:p>
-            <a:r>
-              <a:rPr lang="is-IS" sz="1350" dirty="0" smtClean="0">
-                <a:latin typeface="Monaco" charset="0"/>
-                <a:ea typeface="Monaco" charset="0"/>
-                <a:cs typeface="Monaco" charset="0"/>
-              </a:rPr>
-              <a:t>    /* ... Free objects ... */</a:t>
-            </a:r>
-          </a:p>
-          <a:p>
-            <a:r>
-              <a:rPr lang="is-IS" sz="1350" dirty="0">
-                <a:latin typeface="Monaco" charset="0"/>
-                <a:ea typeface="Monaco" charset="0"/>
-                <a:cs typeface="Monaco" charset="0"/>
-              </a:rPr>
-              <a:t> </a:t>
-            </a:r>
-            <a:r>
-              <a:rPr lang="is-IS" sz="1350" dirty="0" smtClean="0">
-                <a:latin typeface="Monaco" charset="0"/>
-                <a:ea typeface="Monaco" charset="0"/>
-                <a:cs typeface="Monaco" charset="0"/>
-              </a:rPr>
-              <a:t>   /* ... Close files ... */</a:t>
-            </a:r>
-          </a:p>
-          <a:p>
-            <a:r>
-              <a:rPr lang="is-IS" sz="1350" dirty="0">
-                <a:latin typeface="Monaco" charset="0"/>
-                <a:ea typeface="Monaco" charset="0"/>
-                <a:cs typeface="Monaco" charset="0"/>
-              </a:rPr>
-              <a:t> </a:t>
-            </a:r>
-            <a:r>
-              <a:rPr lang="is-IS" sz="1350" dirty="0" smtClean="0">
-                <a:latin typeface="Monaco" charset="0"/>
-                <a:ea typeface="Monaco" charset="0"/>
-                <a:cs typeface="Monaco" charset="0"/>
-              </a:rPr>
-              <a:t>   </a:t>
-            </a:r>
-          </a:p>
-          <a:p>
-            <a:r>
-              <a:rPr lang="is-IS" sz="1350" dirty="0">
-                <a:latin typeface="Monaco" charset="0"/>
-                <a:ea typeface="Monaco" charset="0"/>
-                <a:cs typeface="Monaco" charset="0"/>
-              </a:rPr>
-              <a:t> </a:t>
-            </a:r>
-            <a:r>
-              <a:rPr lang="is-IS" sz="1350" dirty="0" smtClean="0">
-                <a:latin typeface="Monaco" charset="0"/>
-                <a:ea typeface="Monaco" charset="0"/>
-                <a:cs typeface="Monaco" charset="0"/>
-              </a:rPr>
-              <a:t>   if (comm) repair_comm(comm);</a:t>
-            </a:r>
-          </a:p>
-          <a:p>
-            <a:r>
-              <a:rPr lang="is-IS" sz="1350" dirty="0">
-                <a:latin typeface="Monaco" charset="0"/>
-                <a:ea typeface="Monaco" charset="0"/>
-                <a:cs typeface="Monaco" charset="0"/>
-              </a:rPr>
-              <a:t> </a:t>
-            </a:r>
-            <a:r>
-              <a:rPr lang="is-IS" sz="1350" dirty="0" smtClean="0">
-                <a:latin typeface="Monaco" charset="0"/>
-                <a:ea typeface="Monaco" charset="0"/>
-                <a:cs typeface="Monaco" charset="0"/>
-              </a:rPr>
-              <a:t>   if (win) repair_win(win);</a:t>
-            </a:r>
-          </a:p>
-          <a:p>
-            <a:r>
-              <a:rPr lang="is-IS" sz="1350" dirty="0">
-                <a:latin typeface="Monaco" charset="0"/>
-                <a:ea typeface="Monaco" charset="0"/>
-                <a:cs typeface="Monaco" charset="0"/>
-              </a:rPr>
-              <a:t> </a:t>
-            </a:r>
-            <a:r>
-              <a:rPr lang="is-IS" sz="1350" dirty="0" smtClean="0">
-                <a:latin typeface="Monaco" charset="0"/>
-                <a:ea typeface="Monaco" charset="0"/>
-                <a:cs typeface="Monaco" charset="0"/>
-              </a:rPr>
-              <a:t>   if (file) repair_file(file);</a:t>
-            </a:r>
-            <a:endParaRPr lang="is-IS" sz="1350" dirty="0">
-              <a:latin typeface="Monaco" charset="0"/>
-              <a:ea typeface="Monaco" charset="0"/>
-              <a:cs typeface="Monaco" charset="0"/>
-            </a:endParaRPr>
-          </a:p>
-          <a:p>
-            <a:r>
-              <a:rPr lang="is-IS" sz="1350" dirty="0" smtClean="0">
-                <a:latin typeface="Monaco" charset="0"/>
-                <a:ea typeface="Monaco" charset="0"/>
-                <a:cs typeface="Monaco" charset="0"/>
-              </a:rPr>
-              <a:t>}</a:t>
-            </a:r>
-            <a:endParaRPr lang="is-IS" sz="1350" dirty="0">
-              <a:latin typeface="Monaco" charset="0"/>
-              <a:ea typeface="Monaco" charset="0"/>
-              <a:cs typeface="Monaco" charset="0"/>
-            </a:endParaRPr>
-          </a:p>
-        </p:txBody>
-      </p:sp>
-      <p:sp>
-        <p:nvSpPr>
-          <p:cNvPr id="9" name="TextBox 8"/>
-          <p:cNvSpPr txBox="1"/>
-          <p:nvPr/>
-        </p:nvSpPr>
-        <p:spPr>
-          <a:xfrm>
-            <a:off x="4287492" y="4823372"/>
-            <a:ext cx="435440" cy="369332"/>
-          </a:xfrm>
-          <a:prstGeom prst="rect">
-            <a:avLst/>
-          </a:prstGeom>
-          <a:noFill/>
-        </p:spPr>
-        <p:txBody>
-          <a:bodyPr wrap="none" rtlCol="0">
-            <a:spAutoFit/>
-          </a:bodyPr>
-          <a:lstStyle/>
-          <a:p>
-            <a:r>
-              <a:rPr lang="en-US" dirty="0"/>
-              <a:t>v</a:t>
-            </a:r>
-            <a:r>
-              <a:rPr lang="en-US" dirty="0" smtClean="0"/>
-              <a:t>s.</a:t>
+        <p:spPr/>
+        <p:txBody>
+          <a:bodyPr/>
+          <a:lstStyle/>
+          <a:p>
+            <a:r>
+              <a:rPr lang="en-US" dirty="0" smtClean="0"/>
+              <a:t>Add array of error classes to the </a:t>
+            </a:r>
+            <a:r>
+              <a:rPr lang="en-US" dirty="0" err="1" smtClean="0"/>
+              <a:t>MPI_Errhandler_set</a:t>
+            </a:r>
+            <a:r>
+              <a:rPr lang="en-US" dirty="0" smtClean="0"/>
+              <a:t> function</a:t>
+            </a:r>
+          </a:p>
+          <a:p>
+            <a:r>
+              <a:rPr lang="en-US" dirty="0" smtClean="0"/>
+              <a:t>Only call this error handler when an error class in the array is raised</a:t>
+            </a:r>
+          </a:p>
+          <a:p>
+            <a:r>
+              <a:rPr lang="en-US" dirty="0" smtClean="0"/>
+              <a:t>Have ”generic” error handler for all other </a:t>
+            </a:r>
+            <a:r>
+              <a:rPr lang="en-US" dirty="0" smtClean="0"/>
+              <a:t>cases</a:t>
+            </a:r>
+          </a:p>
+          <a:p>
+            <a:r>
+              <a:rPr lang="en-US" dirty="0" smtClean="0"/>
+              <a:t>Add some predefined value for MPI_ALL_ERROR_CLASSES</a:t>
             </a:r>
             <a:endParaRPr lang="en-US" dirty="0"/>
           </a:p>
@@ -5302,7 +5449,7 @@
     </p:spTree>
     <p:extLst>
       <p:ext uri="{BB962C8B-B14F-4D97-AF65-F5344CB8AC3E}">
-        <p14:creationId xmlns:p14="http://schemas.microsoft.com/office/powerpoint/2010/main" val="533739408"/>
+        <p14:creationId xmlns:p14="http://schemas.microsoft.com/office/powerpoint/2010/main" val="1148874328"/>
       </p:ext>
     </p:extLst>
   </p:cSld>
@@ -5339,66 +5486,90 @@
             <p:ph type="title"/>
           </p:nvPr>
         </p:nvSpPr>
+        <p:spPr/>
+        <p:txBody>
+          <a:bodyPr/>
+          <a:lstStyle/>
+          <a:p>
+            <a:r>
+              <a:rPr lang="en-US" dirty="0" smtClean="0"/>
+              <a:t>Multiple Error Handler Types Problem</a:t>
+            </a:r>
+            <a:endParaRPr lang="en-US" dirty="0"/>
+          </a:p>
+        </p:txBody>
+      </p:sp>
+      <p:sp>
+        <p:nvSpPr>
+          <p:cNvPr id="3" name="Content Placeholder 2"/>
+          <p:cNvSpPr>
+            <a:spLocks noGrp="1"/>
+          </p:cNvSpPr>
+          <p:nvPr>
+            <p:ph idx="1"/>
+          </p:nvPr>
+        </p:nvSpPr>
         <p:spPr>
           <a:xfrm>
-            <a:off x="628650" y="365126"/>
-            <a:ext cx="4953118" cy="1325563"/>
+            <a:off x="628650" y="1669681"/>
+            <a:ext cx="7886700" cy="2332572"/>
           </a:xfrm>
         </p:spPr>
         <p:txBody>
           <a:bodyPr>
-            <a:normAutofit fontScale="90000"/>
+            <a:normAutofit fontScale="92500" lnSpcReduction="10000"/>
           </a:bodyPr>
           <a:lstStyle/>
           <a:p>
             <a:r>
               <a:rPr lang="en-US" dirty="0" smtClean="0"/>
-              <a:t>Multiple Error Handler</a:t>
-            </a:r>
-            <a:br>
-              <a:rPr lang="en-US" dirty="0" smtClean="0"/>
-            </a:br>
-            <a:r>
-              <a:rPr lang="en-US" dirty="0" smtClean="0"/>
-              <a:t>Types Solution</a:t>
-            </a:r>
-            <a:endParaRPr lang="en-US" dirty="0"/>
-          </a:p>
-        </p:txBody>
-      </p:sp>
-      <p:sp>
-        <p:nvSpPr>
-          <p:cNvPr id="3" name="Content Placeholder 2"/>
-          <p:cNvSpPr>
-            <a:spLocks noGrp="1"/>
-          </p:cNvSpPr>
-          <p:nvPr>
-            <p:ph idx="1"/>
-          </p:nvPr>
-        </p:nvSpPr>
-        <p:spPr>
-          <a:xfrm>
-            <a:off x="628650" y="2237573"/>
-            <a:ext cx="4497175" cy="3628694"/>
-          </a:xfrm>
-        </p:spPr>
-        <p:txBody>
-          <a:bodyPr/>
-          <a:lstStyle/>
-          <a:p>
-            <a:r>
-              <a:rPr lang="en-US" dirty="0" smtClean="0"/>
-              <a:t>Create a new </a:t>
-            </a:r>
-            <a:r>
-              <a:rPr lang="en-US" dirty="0" err="1" smtClean="0"/>
-              <a:t>struct</a:t>
-            </a:r>
-            <a:r>
-              <a:rPr lang="en-US" dirty="0" smtClean="0"/>
-              <a:t> that provides all of the information</a:t>
-            </a:r>
-            <a:endParaRPr lang="en-US" dirty="0"/>
+              <a:t>Currently have </a:t>
+            </a:r>
+            <a:r>
+              <a:rPr lang="en-US" dirty="0" smtClean="0"/>
+              <a:t>to create a bunch of </a:t>
+            </a:r>
+            <a:r>
+              <a:rPr lang="en-US" dirty="0" smtClean="0"/>
+              <a:t>functions </a:t>
+            </a:r>
+            <a:r>
+              <a:rPr lang="en-US" dirty="0" smtClean="0"/>
+              <a:t>even when they all often do the same </a:t>
+            </a:r>
+            <a:r>
+              <a:rPr lang="en-US" dirty="0" smtClean="0"/>
+              <a:t>thing</a:t>
+            </a:r>
+            <a:endParaRPr lang="en-US" dirty="0" smtClean="0"/>
+          </a:p>
+          <a:p>
+            <a:pPr lvl="1"/>
+            <a:r>
+              <a:rPr lang="en-US" dirty="0" smtClean="0"/>
+              <a:t>Callback functions have object types built into the </a:t>
+            </a:r>
+            <a:r>
+              <a:rPr lang="en-US" dirty="0" smtClean="0"/>
+              <a:t>signatures</a:t>
+            </a:r>
+          </a:p>
+          <a:p>
+            <a:r>
+              <a:rPr lang="en-US" dirty="0" smtClean="0"/>
+              <a:t>Multiple types == better code reuse</a:t>
+            </a:r>
+            <a:endParaRPr lang="en-US" dirty="0" smtClean="0"/>
+          </a:p>
+          <a:p>
+            <a:r>
+              <a:rPr lang="en-US" dirty="0" smtClean="0"/>
+              <a:t>Makes using a single error handler function for generic handling more </a:t>
+            </a:r>
+            <a:r>
+              <a:rPr lang="en-US" dirty="0" smtClean="0"/>
+              <a:t>complex</a:t>
+            </a:r>
           </a:p>
         </p:txBody>
       </p:sp>
@@ -5410,17 +5581,13 @@
         </p:nvSpPr>
         <p:spPr>
           <a:xfrm>
-            <a:off x="5581768" y="2205259"/>
-            <a:ext cx="3457280" cy="3693319"/>
+            <a:off x="324420" y="4241473"/>
+            <a:ext cx="3542189" cy="715581"/>
           </a:xfrm>
           <a:prstGeom prst="rect">
             <a:avLst/>
           </a:prstGeom>
-          <a:ln w="28575">
-            <a:solidFill>
-              <a:schemeClr val="accent6"/>
-            </a:solidFill>
-          </a:ln>
+          <a:ln w="28575"/>
         </p:spPr>
         <p:style>
           <a:lnRef idx="2">
@@ -5437,81 +5604,61 @@
           </a:fontRef>
         </p:style>
         <p:txBody>
-          <a:bodyPr wrap="square" numCol="1" rtlCol="0" anchor="ctr">
+          <a:bodyPr wrap="square" rtlCol="0" anchor="ctr">
             <a:spAutoFit/>
           </a:bodyPr>
           <a:lstStyle/>
           <a:p>
-            <a:pPr>
-              <a:lnSpc>
-                <a:spcPct val="150000"/>
-              </a:lnSpc>
-            </a:pPr>
-            <a:r>
-              <a:rPr lang="en-US" sz="1200" dirty="0" err="1">
-                <a:latin typeface="Monaco" charset="0"/>
-                <a:ea typeface="Monaco" charset="0"/>
-                <a:cs typeface="Monaco" charset="0"/>
-              </a:rPr>
-              <a:t>typedef</a:t>
-            </a:r>
-            <a:r>
-              <a:rPr lang="en-US" sz="1200" dirty="0">
-                <a:latin typeface="Monaco" charset="0"/>
-                <a:ea typeface="Monaco" charset="0"/>
-                <a:cs typeface="Monaco" charset="0"/>
-              </a:rPr>
-              <a:t> </a:t>
-            </a:r>
-            <a:r>
-              <a:rPr lang="en-US" sz="1200" dirty="0" err="1">
-                <a:latin typeface="Monaco" charset="0"/>
-                <a:ea typeface="Monaco" charset="0"/>
-                <a:cs typeface="Monaco" charset="0"/>
-              </a:rPr>
-              <a:t>struct</a:t>
-            </a:r>
-            <a:r>
-              <a:rPr lang="en-US" sz="1200" dirty="0">
-                <a:latin typeface="Monaco" charset="0"/>
-                <a:ea typeface="Monaco" charset="0"/>
-                <a:cs typeface="Monaco" charset="0"/>
-              </a:rPr>
-              <a:t> {</a:t>
-            </a:r>
-          </a:p>
-          <a:p>
-            <a:pPr>
-              <a:lnSpc>
-                <a:spcPct val="150000"/>
-              </a:lnSpc>
-            </a:pPr>
-            <a:r>
-              <a:rPr lang="en-US" sz="1200" dirty="0">
-                <a:latin typeface="Monaco" charset="0"/>
-                <a:ea typeface="Monaco" charset="0"/>
-                <a:cs typeface="Monaco" charset="0"/>
-              </a:rPr>
-              <a:t>  </a:t>
-            </a:r>
-            <a:r>
-              <a:rPr lang="en-US" sz="1200" dirty="0" err="1">
-                <a:latin typeface="Monaco" charset="0"/>
-                <a:ea typeface="Monaco" charset="0"/>
-                <a:cs typeface="Monaco" charset="0"/>
-              </a:rPr>
-              <a:t>enum</a:t>
-            </a:r>
-            <a:r>
-              <a:rPr lang="en-US" sz="1200" dirty="0">
-                <a:latin typeface="Monaco" charset="0"/>
-                <a:ea typeface="Monaco" charset="0"/>
-                <a:cs typeface="Monaco" charset="0"/>
-              </a:rPr>
-              <a:t> </a:t>
-            </a:r>
-            <a:r>
-              <a:rPr lang="en-US" sz="1200" dirty="0" err="1">
+            <a:r>
+              <a:rPr lang="en-US" sz="1350" dirty="0" err="1">
+                <a:latin typeface="Monaco" charset="0"/>
+                <a:ea typeface="Monaco" charset="0"/>
+                <a:cs typeface="Monaco" charset="0"/>
+              </a:rPr>
+              <a:t>MPI_Comm_errhandler_fn</a:t>
+            </a:r>
+            <a:r>
+              <a:rPr lang="en-US" sz="1350" dirty="0">
+                <a:latin typeface="Monaco" charset="0"/>
+                <a:ea typeface="Monaco" charset="0"/>
+                <a:cs typeface="Monaco" charset="0"/>
+              </a:rPr>
+              <a:t>(</a:t>
+            </a:r>
+            <a:r>
+              <a:rPr lang="en-US" sz="1350" dirty="0" err="1">
+                <a:latin typeface="Monaco" charset="0"/>
+                <a:ea typeface="Monaco" charset="0"/>
+                <a:cs typeface="Monaco" charset="0"/>
+              </a:rPr>
+              <a:t>MPI_Comm</a:t>
+            </a:r>
+            <a:r>
+              <a:rPr lang="en-US" sz="1350" dirty="0">
+                <a:latin typeface="Monaco" charset="0"/>
+                <a:ea typeface="Monaco" charset="0"/>
+                <a:cs typeface="Monaco" charset="0"/>
+              </a:rPr>
+              <a:t> *</a:t>
+            </a:r>
+            <a:r>
+              <a:rPr lang="en-US" sz="1350" dirty="0" err="1">
+                <a:latin typeface="Monaco" charset="0"/>
+                <a:ea typeface="Monaco" charset="0"/>
+                <a:cs typeface="Monaco" charset="0"/>
+              </a:rPr>
+              <a:t>comm</a:t>
+            </a:r>
+            <a:r>
+              <a:rPr lang="en-US" sz="1350" dirty="0">
+                <a:latin typeface="Monaco" charset="0"/>
+                <a:ea typeface="Monaco" charset="0"/>
+                <a:cs typeface="Monaco" charset="0"/>
+              </a:rPr>
+              <a:t>, </a:t>
+            </a:r>
+            <a:r>
+              <a:rPr lang="en-US" sz="1350" dirty="0" err="1">
                 <a:latin typeface="Monaco" charset="0"/>
                 <a:ea typeface="Monaco" charset="0"/>
                 <a:cs typeface="Monaco" charset="0"/>
@@ -5519,7 +5666,7 @@
               <a:t>int</a:t>
             </a:r>
             <a:r>
-              <a:rPr lang="en-US" sz="1200" dirty="0">
+              <a:rPr lang="en-US" sz="1350" dirty="0">
                 <a:latin typeface="Monaco" charset="0"/>
                 <a:ea typeface="Monaco" charset="0"/>
                 <a:cs typeface="Monaco" charset="0"/>
@@ -5527,137 +5674,113 @@
               <a:t> *</a:t>
             </a:r>
             <a:r>
-              <a:rPr lang="en-US" sz="1200" dirty="0" err="1">
-                <a:latin typeface="Monaco" charset="0"/>
-                <a:ea typeface="Monaco" charset="0"/>
-                <a:cs typeface="Monaco" charset="0"/>
-              </a:rPr>
-              <a:t>object_types</a:t>
-            </a:r>
-            <a:r>
-              <a:rPr lang="en-US" sz="1200" dirty="0">
-                <a:latin typeface="Monaco" charset="0"/>
-                <a:ea typeface="Monaco" charset="0"/>
-                <a:cs typeface="Monaco" charset="0"/>
-              </a:rPr>
-              <a:t>;</a:t>
-            </a:r>
-          </a:p>
-          <a:p>
-            <a:pPr>
-              <a:lnSpc>
-                <a:spcPct val="150000"/>
-              </a:lnSpc>
-            </a:pPr>
-            <a:r>
-              <a:rPr lang="en-US" sz="1200" dirty="0">
-                <a:latin typeface="Monaco" charset="0"/>
-                <a:ea typeface="Monaco" charset="0"/>
-                <a:cs typeface="Monaco" charset="0"/>
-              </a:rPr>
-              <a:t>  union </a:t>
-            </a:r>
-            <a:r>
-              <a:rPr lang="en-US" sz="1200" dirty="0" err="1" smtClean="0">
-                <a:latin typeface="Monaco" charset="0"/>
-                <a:ea typeface="Monaco" charset="0"/>
-                <a:cs typeface="Monaco" charset="0"/>
-              </a:rPr>
-              <a:t>MPI_Object</a:t>
-            </a:r>
-            <a:r>
-              <a:rPr lang="en-US" sz="1200" dirty="0" smtClean="0">
-                <a:latin typeface="Monaco" charset="0"/>
-                <a:ea typeface="Monaco" charset="0"/>
-                <a:cs typeface="Monaco" charset="0"/>
-              </a:rPr>
-              <a:t> </a:t>
-            </a:r>
-            <a:r>
-              <a:rPr lang="en-US" sz="1200" dirty="0" smtClean="0">
-                <a:latin typeface="Monaco" charset="0"/>
-                <a:ea typeface="Monaco" charset="0"/>
-                <a:cs typeface="Monaco" charset="0"/>
-              </a:rPr>
-              <a:t>{</a:t>
-            </a:r>
-          </a:p>
-          <a:p>
-            <a:pPr>
-              <a:lnSpc>
-                <a:spcPct val="150000"/>
-              </a:lnSpc>
-            </a:pPr>
-            <a:r>
-              <a:rPr lang="en-US" sz="1200" dirty="0">
-                <a:latin typeface="Monaco" charset="0"/>
-                <a:ea typeface="Monaco" charset="0"/>
-                <a:cs typeface="Monaco" charset="0"/>
-              </a:rPr>
-              <a:t> </a:t>
-            </a:r>
-            <a:r>
-              <a:rPr lang="en-US" sz="1200" dirty="0" smtClean="0">
-                <a:latin typeface="Monaco" charset="0"/>
-                <a:ea typeface="Monaco" charset="0"/>
-                <a:cs typeface="Monaco" charset="0"/>
-              </a:rPr>
-              <a:t>   </a:t>
-            </a:r>
-            <a:r>
-              <a:rPr lang="en-US" sz="1200" dirty="0" err="1" smtClean="0">
-                <a:latin typeface="Monaco" charset="0"/>
-                <a:ea typeface="Monaco" charset="0"/>
-                <a:cs typeface="Monaco" charset="0"/>
-              </a:rPr>
-              <a:t>MPI_Comm</a:t>
-            </a:r>
-            <a:r>
-              <a:rPr lang="en-US" sz="1200" dirty="0" smtClean="0">
-                <a:latin typeface="Monaco" charset="0"/>
-                <a:ea typeface="Monaco" charset="0"/>
-                <a:cs typeface="Monaco" charset="0"/>
-              </a:rPr>
-              <a:t> </a:t>
-            </a:r>
-            <a:r>
-              <a:rPr lang="en-US" sz="1200" dirty="0" err="1" smtClean="0">
-                <a:latin typeface="Monaco" charset="0"/>
-                <a:ea typeface="Monaco" charset="0"/>
-                <a:cs typeface="Monaco" charset="0"/>
-              </a:rPr>
-              <a:t>comm</a:t>
-            </a:r>
-            <a:r>
-              <a:rPr lang="en-US" sz="1200" dirty="0">
-                <a:latin typeface="Monaco" charset="0"/>
-                <a:ea typeface="Monaco" charset="0"/>
-                <a:cs typeface="Monaco" charset="0"/>
-              </a:rPr>
-              <a:t>;</a:t>
-            </a:r>
-            <a:endParaRPr lang="en-US" sz="1200" dirty="0">
+              <a:rPr lang="en-US" sz="1350" dirty="0" err="1">
+                <a:latin typeface="Monaco" charset="0"/>
+                <a:ea typeface="Monaco" charset="0"/>
+                <a:cs typeface="Monaco" charset="0"/>
+              </a:rPr>
+              <a:t>errcode</a:t>
+            </a:r>
+            <a:r>
+              <a:rPr lang="en-US" sz="1350" dirty="0">
+                <a:latin typeface="Monaco" charset="0"/>
+                <a:ea typeface="Monaco" charset="0"/>
+                <a:cs typeface="Monaco" charset="0"/>
+              </a:rPr>
+              <a:t>, </a:t>
+            </a:r>
+            <a:r>
+              <a:rPr lang="is-IS" sz="1350" dirty="0">
+                <a:latin typeface="Monaco" charset="0"/>
+                <a:ea typeface="Monaco" charset="0"/>
+                <a:cs typeface="Monaco" charset="0"/>
+              </a:rPr>
+              <a:t>…) {</a:t>
+            </a:r>
+          </a:p>
+          <a:p>
+            <a:r>
+              <a:rPr lang="is-IS" sz="1350" dirty="0">
+                <a:latin typeface="Monaco" charset="0"/>
+                <a:ea typeface="Monaco" charset="0"/>
+                <a:cs typeface="Monaco" charset="0"/>
+              </a:rPr>
+              <a:t>    cleanup_fn</a:t>
+            </a:r>
+            <a:r>
+              <a:rPr lang="is-IS" sz="1350" dirty="0" smtClean="0">
+                <a:latin typeface="Monaco" charset="0"/>
+                <a:ea typeface="Monaco" charset="0"/>
+                <a:cs typeface="Monaco" charset="0"/>
+              </a:rPr>
+              <a:t>(); }</a:t>
+            </a:r>
+            <a:endParaRPr lang="en-US" sz="1350" dirty="0">
               <a:latin typeface="Monaco" charset="0"/>
               <a:ea typeface="Monaco" charset="0"/>
               <a:cs typeface="Monaco" charset="0"/>
             </a:endParaRPr>
           </a:p>
-          <a:p>
-            <a:pPr>
-              <a:lnSpc>
-                <a:spcPct val="150000"/>
-              </a:lnSpc>
-            </a:pPr>
-            <a:r>
-              <a:rPr lang="en-US" sz="1200" dirty="0" smtClean="0">
-                <a:latin typeface="Monaco" charset="0"/>
-                <a:ea typeface="Monaco" charset="0"/>
-                <a:cs typeface="Monaco" charset="0"/>
-              </a:rPr>
-              <a:t>    </a:t>
-            </a:r>
-            <a:r>
-              <a:rPr lang="en-US" sz="1200" dirty="0" err="1" smtClean="0">
+        </p:txBody>
+      </p:sp>
+      <p:sp>
+        <p:nvSpPr>
+          <p:cNvPr id="5" name="TextBox 4"/>
+          <p:cNvSpPr txBox="1"/>
+          <p:nvPr/>
+        </p:nvSpPr>
+        <p:spPr>
+          <a:xfrm>
+            <a:off x="324420" y="5085676"/>
+            <a:ext cx="3542190" cy="715581"/>
+          </a:xfrm>
+          <a:prstGeom prst="rect">
+            <a:avLst/>
+          </a:prstGeom>
+          <a:ln w="28575">
+            <a:solidFill>
+              <a:srgbClr val="7030A0"/>
+            </a:solidFill>
+          </a:ln>
+        </p:spPr>
+        <p:style>
+          <a:lnRef idx="2">
+            <a:schemeClr val="accent2"/>
+          </a:lnRef>
+          <a:fillRef idx="1">
+            <a:schemeClr val="lt1"/>
+          </a:fillRef>
+          <a:effectRef idx="0">
+            <a:schemeClr val="accent2"/>
+          </a:effectRef>
+          <a:fontRef idx="minor">
+            <a:schemeClr val="dk1"/>
+          </a:fontRef>
+        </p:style>
+        <p:txBody>
+          <a:bodyPr wrap="square" rtlCol="0" anchor="ctr">
+            <a:spAutoFit/>
+          </a:bodyPr>
+          <a:lstStyle/>
+          <a:p>
+            <a:r>
+              <a:rPr lang="en-US" sz="1350" dirty="0" err="1">
+                <a:latin typeface="Monaco" charset="0"/>
+                <a:ea typeface="Monaco" charset="0"/>
+                <a:cs typeface="Monaco" charset="0"/>
+              </a:rPr>
+              <a:t>MPI_Win_errhandler_fn</a:t>
+            </a:r>
+            <a:r>
+              <a:rPr lang="en-US" sz="1350" dirty="0">
+                <a:latin typeface="Monaco" charset="0"/>
+                <a:ea typeface="Monaco" charset="0"/>
+                <a:cs typeface="Monaco" charset="0"/>
+              </a:rPr>
+              <a:t>(</a:t>
+            </a:r>
+            <a:r>
+              <a:rPr lang="en-US" sz="1350" dirty="0" err="1">
                 <a:latin typeface="Monaco" charset="0"/>
                 <a:ea typeface="Monaco" charset="0"/>
                 <a:cs typeface="Monaco" charset="0"/>
@@ -5665,51 +5788,137 @@
               <a:t>MPI_Win</a:t>
             </a:r>
             <a:r>
-              <a:rPr lang="en-US" sz="1200" dirty="0" smtClean="0">
-                <a:latin typeface="Monaco" charset="0"/>
-                <a:ea typeface="Monaco" charset="0"/>
-                <a:cs typeface="Monaco" charset="0"/>
-              </a:rPr>
-              <a:t> </a:t>
-            </a:r>
-            <a:r>
-              <a:rPr lang="en-US" sz="1200" dirty="0">
-                <a:latin typeface="Monaco" charset="0"/>
-                <a:ea typeface="Monaco" charset="0"/>
-                <a:cs typeface="Monaco" charset="0"/>
-              </a:rPr>
-              <a:t>win</a:t>
-            </a:r>
-            <a:r>
-              <a:rPr lang="en-US" sz="1200" dirty="0" smtClean="0">
-                <a:latin typeface="Monaco" charset="0"/>
-                <a:ea typeface="Monaco" charset="0"/>
-                <a:cs typeface="Monaco" charset="0"/>
-              </a:rPr>
-              <a:t>;</a:t>
-            </a:r>
-            <a:endParaRPr lang="en-US" sz="1200" dirty="0">
+              <a:rPr lang="en-US" sz="1350" dirty="0">
+                <a:latin typeface="Monaco" charset="0"/>
+                <a:ea typeface="Monaco" charset="0"/>
+                <a:cs typeface="Monaco" charset="0"/>
+              </a:rPr>
+              <a:t> *win, </a:t>
+            </a:r>
+            <a:r>
+              <a:rPr lang="en-US" sz="1350" dirty="0" err="1">
+                <a:latin typeface="Monaco" charset="0"/>
+                <a:ea typeface="Monaco" charset="0"/>
+                <a:cs typeface="Monaco" charset="0"/>
+              </a:rPr>
+              <a:t>int</a:t>
+            </a:r>
+            <a:r>
+              <a:rPr lang="en-US" sz="1350" dirty="0">
+                <a:latin typeface="Monaco" charset="0"/>
+                <a:ea typeface="Monaco" charset="0"/>
+                <a:cs typeface="Monaco" charset="0"/>
+              </a:rPr>
+              <a:t> *</a:t>
+            </a:r>
+            <a:r>
+              <a:rPr lang="en-US" sz="1350" dirty="0" err="1">
+                <a:latin typeface="Monaco" charset="0"/>
+                <a:ea typeface="Monaco" charset="0"/>
+                <a:cs typeface="Monaco" charset="0"/>
+              </a:rPr>
+              <a:t>errcode</a:t>
+            </a:r>
+            <a:r>
+              <a:rPr lang="en-US" sz="1350" dirty="0">
+                <a:latin typeface="Monaco" charset="0"/>
+                <a:ea typeface="Monaco" charset="0"/>
+                <a:cs typeface="Monaco" charset="0"/>
+              </a:rPr>
+              <a:t>, </a:t>
+            </a:r>
+            <a:r>
+              <a:rPr lang="is-IS" sz="1350" dirty="0">
+                <a:latin typeface="Monaco" charset="0"/>
+                <a:ea typeface="Monaco" charset="0"/>
+                <a:cs typeface="Monaco" charset="0"/>
+              </a:rPr>
+              <a:t>…) {</a:t>
+            </a:r>
+          </a:p>
+          <a:p>
+            <a:r>
+              <a:rPr lang="is-IS" sz="1350" dirty="0">
+                <a:latin typeface="Monaco" charset="0"/>
+                <a:ea typeface="Monaco" charset="0"/>
+                <a:cs typeface="Monaco" charset="0"/>
+              </a:rPr>
+              <a:t>    cleanup_fn</a:t>
+            </a:r>
+            <a:r>
+              <a:rPr lang="is-IS" sz="1350" dirty="0" smtClean="0">
+                <a:latin typeface="Monaco" charset="0"/>
+                <a:ea typeface="Monaco" charset="0"/>
+                <a:cs typeface="Monaco" charset="0"/>
+              </a:rPr>
+              <a:t>(); }</a:t>
+            </a:r>
+            <a:endParaRPr lang="en-US" sz="1350" dirty="0">
               <a:latin typeface="Monaco" charset="0"/>
               <a:ea typeface="Monaco" charset="0"/>
               <a:cs typeface="Monaco" charset="0"/>
             </a:endParaRPr>
           </a:p>
-          <a:p>
-            <a:pPr>
-              <a:lnSpc>
-                <a:spcPct val="150000"/>
-              </a:lnSpc>
-            </a:pPr>
-            <a:r>
-              <a:rPr lang="en-US" sz="1200" dirty="0" smtClean="0">
-                <a:latin typeface="Monaco" charset="0"/>
-                <a:ea typeface="Monaco" charset="0"/>
-                <a:cs typeface="Monaco" charset="0"/>
-              </a:rPr>
-              <a:t>    </a:t>
-            </a:r>
-            <a:r>
-              <a:rPr lang="en-US" sz="1200" dirty="0" err="1" smtClean="0">
+        </p:txBody>
+      </p:sp>
+      <p:sp>
+        <p:nvSpPr>
+          <p:cNvPr id="6" name="TextBox 5"/>
+          <p:cNvSpPr txBox="1"/>
+          <p:nvPr/>
+        </p:nvSpPr>
+        <p:spPr>
+          <a:xfrm>
+            <a:off x="324420" y="5925639"/>
+            <a:ext cx="3542191" cy="715581"/>
+          </a:xfrm>
+          <a:prstGeom prst="rect">
+            <a:avLst/>
+          </a:prstGeom>
+          <a:ln w="28575">
+            <a:solidFill>
+              <a:schemeClr val="accent2"/>
+            </a:solidFill>
+          </a:ln>
+        </p:spPr>
+        <p:style>
+          <a:lnRef idx="2">
+            <a:schemeClr val="accent4"/>
+          </a:lnRef>
+          <a:fillRef idx="1">
+            <a:schemeClr val="lt1"/>
+          </a:fillRef>
+          <a:effectRef idx="0">
+            <a:schemeClr val="accent4"/>
+          </a:effectRef>
+          <a:fontRef idx="minor">
+            <a:schemeClr val="dk1"/>
+          </a:fontRef>
+        </p:style>
+        <p:txBody>
+          <a:bodyPr wrap="square" rtlCol="0" anchor="ctr">
+            <a:spAutoFit/>
+          </a:bodyPr>
+          <a:lstStyle/>
+          <a:p>
+            <a:r>
+              <a:rPr lang="en-US" sz="1350" dirty="0" err="1">
+                <a:latin typeface="Monaco" charset="0"/>
+                <a:ea typeface="Monaco" charset="0"/>
+                <a:cs typeface="Monaco" charset="0"/>
+              </a:rPr>
+              <a:t>MPI_Comm_errhandler_fn</a:t>
+            </a:r>
+            <a:r>
+              <a:rPr lang="en-US" sz="1350" dirty="0">
+                <a:latin typeface="Monaco" charset="0"/>
+                <a:ea typeface="Monaco" charset="0"/>
+                <a:cs typeface="Monaco" charset="0"/>
+              </a:rPr>
+              <a:t>(</a:t>
+            </a:r>
+            <a:r>
+              <a:rPr lang="en-US" sz="1350" dirty="0" err="1">
                 <a:latin typeface="Monaco" charset="0"/>
                 <a:ea typeface="Monaco" charset="0"/>
                 <a:cs typeface="Monaco" charset="0"/>
@@ -5717,66 +5926,157 @@
               <a:t>MPI_File</a:t>
             </a:r>
             <a:r>
-              <a:rPr lang="en-US" sz="1200" dirty="0" smtClean="0">
-                <a:latin typeface="Monaco" charset="0"/>
-                <a:ea typeface="Monaco" charset="0"/>
-                <a:cs typeface="Monaco" charset="0"/>
-              </a:rPr>
-              <a:t> </a:t>
-            </a:r>
-            <a:r>
-              <a:rPr lang="en-US" sz="1200" dirty="0">
-                <a:latin typeface="Monaco" charset="0"/>
-                <a:ea typeface="Monaco" charset="0"/>
-                <a:cs typeface="Monaco" charset="0"/>
-              </a:rPr>
-              <a:t>file</a:t>
-            </a:r>
-            <a:r>
-              <a:rPr lang="en-US" sz="1200" dirty="0" smtClean="0">
-                <a:latin typeface="Monaco" charset="0"/>
-                <a:ea typeface="Monaco" charset="0"/>
-                <a:cs typeface="Monaco" charset="0"/>
-              </a:rPr>
-              <a:t>;</a:t>
-            </a:r>
-            <a:endParaRPr lang="en-US" sz="1200" dirty="0">
+              <a:rPr lang="en-US" sz="1350" dirty="0">
+                <a:latin typeface="Monaco" charset="0"/>
+                <a:ea typeface="Monaco" charset="0"/>
+                <a:cs typeface="Monaco" charset="0"/>
+              </a:rPr>
+              <a:t> *file, </a:t>
+            </a:r>
+            <a:r>
+              <a:rPr lang="en-US" sz="1350" dirty="0" err="1">
+                <a:latin typeface="Monaco" charset="0"/>
+                <a:ea typeface="Monaco" charset="0"/>
+                <a:cs typeface="Monaco" charset="0"/>
+              </a:rPr>
+              <a:t>int</a:t>
+            </a:r>
+            <a:r>
+              <a:rPr lang="en-US" sz="1350" dirty="0">
+                <a:latin typeface="Monaco" charset="0"/>
+                <a:ea typeface="Monaco" charset="0"/>
+                <a:cs typeface="Monaco" charset="0"/>
+              </a:rPr>
+              <a:t> *</a:t>
+            </a:r>
+            <a:r>
+              <a:rPr lang="en-US" sz="1350" dirty="0" err="1">
+                <a:latin typeface="Monaco" charset="0"/>
+                <a:ea typeface="Monaco" charset="0"/>
+                <a:cs typeface="Monaco" charset="0"/>
+              </a:rPr>
+              <a:t>errcode</a:t>
+            </a:r>
+            <a:r>
+              <a:rPr lang="en-US" sz="1350" dirty="0">
+                <a:latin typeface="Monaco" charset="0"/>
+                <a:ea typeface="Monaco" charset="0"/>
+                <a:cs typeface="Monaco" charset="0"/>
+              </a:rPr>
+              <a:t>, </a:t>
+            </a:r>
+            <a:r>
+              <a:rPr lang="is-IS" sz="1350" dirty="0">
+                <a:latin typeface="Monaco" charset="0"/>
+                <a:ea typeface="Monaco" charset="0"/>
+                <a:cs typeface="Monaco" charset="0"/>
+              </a:rPr>
+              <a:t>…) {</a:t>
+            </a:r>
+          </a:p>
+          <a:p>
+            <a:r>
+              <a:rPr lang="is-IS" sz="1350" dirty="0">
+                <a:latin typeface="Monaco" charset="0"/>
+                <a:ea typeface="Monaco" charset="0"/>
+                <a:cs typeface="Monaco" charset="0"/>
+              </a:rPr>
+              <a:t>    cleanup_fn</a:t>
+            </a:r>
+            <a:r>
+              <a:rPr lang="is-IS" sz="1350" dirty="0" smtClean="0">
+                <a:latin typeface="Monaco" charset="0"/>
+                <a:ea typeface="Monaco" charset="0"/>
+                <a:cs typeface="Monaco" charset="0"/>
+              </a:rPr>
+              <a:t>(); }</a:t>
+            </a:r>
+            <a:endParaRPr lang="is-IS" sz="1350" dirty="0">
               <a:latin typeface="Monaco" charset="0"/>
               <a:ea typeface="Monaco" charset="0"/>
               <a:cs typeface="Monaco" charset="0"/>
             </a:endParaRPr>
           </a:p>
-          <a:p>
-            <a:pPr>
-              <a:lnSpc>
-                <a:spcPct val="150000"/>
-              </a:lnSpc>
-            </a:pPr>
-            <a:r>
-              <a:rPr lang="en-US" sz="1200" dirty="0">
-                <a:latin typeface="Monaco" charset="0"/>
-                <a:ea typeface="Monaco" charset="0"/>
-                <a:cs typeface="Monaco" charset="0"/>
-              </a:rPr>
-              <a:t>  </a:t>
-            </a:r>
-            <a:r>
-              <a:rPr lang="en-US" sz="1200" dirty="0" smtClean="0">
-                <a:latin typeface="Monaco" charset="0"/>
-                <a:ea typeface="Monaco" charset="0"/>
-                <a:cs typeface="Monaco" charset="0"/>
-              </a:rPr>
-              <a:t>};</a:t>
-            </a:r>
-          </a:p>
-          <a:p>
-            <a:pPr>
-              <a:lnSpc>
-                <a:spcPct val="150000"/>
-              </a:lnSpc>
-            </a:pPr>
-            <a:r>
-              <a:rPr lang="en-US" sz="1200" dirty="0">
+        </p:txBody>
+      </p:sp>
+      <p:sp>
+        <p:nvSpPr>
+          <p:cNvPr id="8" name="TextBox 7"/>
+          <p:cNvSpPr txBox="1"/>
+          <p:nvPr/>
+        </p:nvSpPr>
+        <p:spPr>
+          <a:xfrm>
+            <a:off x="5240405" y="4566303"/>
+            <a:ext cx="3542191" cy="1754326"/>
+          </a:xfrm>
+          <a:prstGeom prst="rect">
+            <a:avLst/>
+          </a:prstGeom>
+          <a:ln w="28575">
+            <a:solidFill>
+              <a:schemeClr val="accent6"/>
+            </a:solidFill>
+          </a:ln>
+        </p:spPr>
+        <p:style>
+          <a:lnRef idx="2">
+            <a:schemeClr val="accent4"/>
+          </a:lnRef>
+          <a:fillRef idx="1">
+            <a:schemeClr val="lt1"/>
+          </a:fillRef>
+          <a:effectRef idx="0">
+            <a:schemeClr val="accent4"/>
+          </a:effectRef>
+          <a:fontRef idx="minor">
+            <a:schemeClr val="dk1"/>
+          </a:fontRef>
+        </p:style>
+        <p:txBody>
+          <a:bodyPr wrap="square" rtlCol="0" anchor="ctr">
+            <a:spAutoFit/>
+          </a:bodyPr>
+          <a:lstStyle/>
+          <a:p>
+            <a:r>
+              <a:rPr lang="en-US" sz="1350" dirty="0" err="1" smtClean="0">
+                <a:latin typeface="Monaco" charset="0"/>
+                <a:ea typeface="Monaco" charset="0"/>
+                <a:cs typeface="Monaco" charset="0"/>
+              </a:rPr>
+              <a:t>MPI_Errhandler_fn</a:t>
+            </a:r>
+            <a:r>
+              <a:rPr lang="en-US" sz="1350" dirty="0" smtClean="0">
+                <a:latin typeface="Monaco" charset="0"/>
+                <a:ea typeface="Monaco" charset="0"/>
+                <a:cs typeface="Monaco" charset="0"/>
+              </a:rPr>
+              <a:t>(</a:t>
+            </a:r>
+            <a:r>
+              <a:rPr lang="is-IS" sz="1350" dirty="0" smtClean="0">
+                <a:latin typeface="Monaco" charset="0"/>
+                <a:ea typeface="Monaco" charset="0"/>
+                <a:cs typeface="Monaco" charset="0"/>
+              </a:rPr>
+              <a:t>…) {</a:t>
+            </a:r>
+          </a:p>
+          <a:p>
+            <a:r>
+              <a:rPr lang="is-IS" sz="1350" dirty="0" smtClean="0">
+                <a:latin typeface="Monaco" charset="0"/>
+                <a:ea typeface="Monaco" charset="0"/>
+                <a:cs typeface="Monaco" charset="0"/>
+              </a:rPr>
+              <a:t>    /* ... Free objects ... */</a:t>
+            </a:r>
+          </a:p>
+          <a:p>
+            <a:r>
+              <a:rPr lang="is-IS" sz="1350" dirty="0">
                 <a:latin typeface="Monaco" charset="0"/>
                 <a:ea typeface="Monaco" charset="0"/>
                 <a:cs typeface="Monaco" charset="0"/>
@@ -5784,7 +6084,17 @@
               <a:t> </a:t>
             </a:r>
             <a:r>
-              <a:rPr lang="en-US" sz="1200" dirty="0" smtClean="0">
+              <a:rPr lang="is-IS" sz="1350" dirty="0" smtClean="0">
+                <a:latin typeface="Monaco" charset="0"/>
+                <a:ea typeface="Monaco" charset="0"/>
+                <a:cs typeface="Monaco" charset="0"/>
+              </a:rPr>
+              <a:t>   /* ... Close files ... */</a:t>
+            </a:r>
+          </a:p>
+          <a:p>
+            <a:r>
+              <a:rPr lang="is-IS" sz="1350" dirty="0">
                 <a:latin typeface="Monaco" charset="0"/>
                 <a:ea typeface="Monaco" charset="0"/>
                 <a:cs typeface="Monaco" charset="0"/>
@@ -5792,62 +6102,17 @@
               <a:t> </a:t>
             </a:r>
             <a:r>
-              <a:rPr lang="en-US" sz="1200" dirty="0" err="1">
-                <a:latin typeface="Monaco" charset="0"/>
-                <a:ea typeface="Monaco" charset="0"/>
-                <a:cs typeface="Monaco" charset="0"/>
-              </a:rPr>
-              <a:t>MPI_Request</a:t>
-            </a:r>
-            <a:r>
-              <a:rPr lang="en-US" sz="1200" dirty="0">
-                <a:latin typeface="Monaco" charset="0"/>
-                <a:ea typeface="Monaco" charset="0"/>
-                <a:cs typeface="Monaco" charset="0"/>
-              </a:rPr>
-              <a:t> *</a:t>
-            </a:r>
-            <a:r>
-              <a:rPr lang="en-US" sz="1200" dirty="0" err="1">
-                <a:latin typeface="Monaco" charset="0"/>
-                <a:ea typeface="Monaco" charset="0"/>
-                <a:cs typeface="Monaco" charset="0"/>
-              </a:rPr>
-              <a:t>reqs</a:t>
-            </a:r>
-            <a:r>
-              <a:rPr lang="en-US" sz="1200" dirty="0">
-                <a:latin typeface="Monaco" charset="0"/>
-                <a:ea typeface="Monaco" charset="0"/>
-                <a:cs typeface="Monaco" charset="0"/>
-              </a:rPr>
-              <a:t>;</a:t>
-            </a:r>
-          </a:p>
-          <a:p>
-            <a:pPr>
-              <a:lnSpc>
-                <a:spcPct val="150000"/>
-              </a:lnSpc>
-            </a:pPr>
-            <a:r>
-              <a:rPr lang="en-US" sz="1200" dirty="0" smtClean="0">
-                <a:latin typeface="Monaco" charset="0"/>
-                <a:ea typeface="Monaco" charset="0"/>
-                <a:cs typeface="Monaco" charset="0"/>
-              </a:rPr>
-              <a:t>  </a:t>
-            </a:r>
-            <a:r>
-              <a:rPr lang="en-US" sz="1200" dirty="0" err="1">
-                <a:latin typeface="Monaco" charset="0"/>
-                <a:ea typeface="Monaco" charset="0"/>
-                <a:cs typeface="Monaco" charset="0"/>
-              </a:rPr>
-              <a:t>int</a:t>
-            </a:r>
-            <a:r>
-              <a:rPr lang="en-US" sz="1200" dirty="0">
+              <a:rPr lang="is-IS" sz="1350" dirty="0" smtClean="0">
+                <a:latin typeface="Monaco" charset="0"/>
+                <a:ea typeface="Monaco" charset="0"/>
+                <a:cs typeface="Monaco" charset="0"/>
+              </a:rPr>
+              <a:t>   </a:t>
+            </a:r>
+          </a:p>
+          <a:p>
+            <a:r>
+              <a:rPr lang="is-IS" sz="1350" dirty="0">
                 <a:latin typeface="Monaco" charset="0"/>
                 <a:ea typeface="Monaco" charset="0"/>
                 <a:cs typeface="Monaco" charset="0"/>
@@ -5855,210 +6120,110 @@
               <a:t> </a:t>
             </a:r>
             <a:r>
-              <a:rPr lang="en-US" sz="1200" dirty="0" err="1" smtClean="0">
-                <a:latin typeface="Monaco" charset="0"/>
-                <a:ea typeface="Monaco" charset="0"/>
-                <a:cs typeface="Monaco" charset="0"/>
-              </a:rPr>
-              <a:t>num_reqs</a:t>
-            </a:r>
-            <a:r>
-              <a:rPr lang="en-US" sz="1200" dirty="0" smtClean="0">
-                <a:latin typeface="Monaco" charset="0"/>
-                <a:ea typeface="Monaco" charset="0"/>
-                <a:cs typeface="Monaco" charset="0"/>
-              </a:rPr>
-              <a:t>;</a:t>
-            </a:r>
-            <a:endParaRPr lang="en-US" sz="1200" dirty="0">
+              <a:rPr lang="is-IS" sz="1350" dirty="0" smtClean="0">
+                <a:latin typeface="Monaco" charset="0"/>
+                <a:ea typeface="Monaco" charset="0"/>
+                <a:cs typeface="Monaco" charset="0"/>
+              </a:rPr>
+              <a:t>   if (comm) repair_comm(comm);</a:t>
+            </a:r>
+          </a:p>
+          <a:p>
+            <a:r>
+              <a:rPr lang="is-IS" sz="1350" dirty="0">
+                <a:latin typeface="Monaco" charset="0"/>
+                <a:ea typeface="Monaco" charset="0"/>
+                <a:cs typeface="Monaco" charset="0"/>
+              </a:rPr>
+              <a:t> </a:t>
+            </a:r>
+            <a:r>
+              <a:rPr lang="is-IS" sz="1350" dirty="0" smtClean="0">
+                <a:latin typeface="Monaco" charset="0"/>
+                <a:ea typeface="Monaco" charset="0"/>
+                <a:cs typeface="Monaco" charset="0"/>
+              </a:rPr>
+              <a:t>   if (win) repair_win(win);</a:t>
+            </a:r>
+          </a:p>
+          <a:p>
+            <a:r>
+              <a:rPr lang="is-IS" sz="1350" dirty="0">
+                <a:latin typeface="Monaco" charset="0"/>
+                <a:ea typeface="Monaco" charset="0"/>
+                <a:cs typeface="Monaco" charset="0"/>
+              </a:rPr>
+              <a:t> </a:t>
+            </a:r>
+            <a:r>
+              <a:rPr lang="is-IS" sz="1350" dirty="0" smtClean="0">
+                <a:latin typeface="Monaco" charset="0"/>
+                <a:ea typeface="Monaco" charset="0"/>
+                <a:cs typeface="Monaco" charset="0"/>
+              </a:rPr>
+              <a:t>   if (file) repair_file(file);</a:t>
+            </a:r>
+            <a:endParaRPr lang="is-IS" sz="1350" dirty="0">
               <a:latin typeface="Monaco" charset="0"/>
               <a:ea typeface="Monaco" charset="0"/>
               <a:cs typeface="Monaco" charset="0"/>
             </a:endParaRPr>
           </a:p>
           <a:p>
-            <a:pPr>
-              <a:lnSpc>
-                <a:spcPct val="150000"/>
-              </a:lnSpc>
-            </a:pPr>
-            <a:r>
-              <a:rPr lang="en-US" sz="1200" dirty="0">
-                <a:latin typeface="Monaco" charset="0"/>
-                <a:ea typeface="Monaco" charset="0"/>
-                <a:cs typeface="Monaco" charset="0"/>
-              </a:rPr>
-              <a:t>  </a:t>
-            </a:r>
-            <a:r>
-              <a:rPr lang="en-US" sz="1200" dirty="0" err="1">
-                <a:latin typeface="Monaco" charset="0"/>
-                <a:ea typeface="Monaco" charset="0"/>
-                <a:cs typeface="Monaco" charset="0"/>
-              </a:rPr>
-              <a:t>int</a:t>
-            </a:r>
-            <a:r>
-              <a:rPr lang="en-US" sz="1200" dirty="0">
-                <a:latin typeface="Monaco" charset="0"/>
-                <a:ea typeface="Monaco" charset="0"/>
-                <a:cs typeface="Monaco" charset="0"/>
-              </a:rPr>
-              <a:t> </a:t>
-            </a:r>
-            <a:r>
-              <a:rPr lang="en-US" sz="1200" dirty="0" smtClean="0">
-                <a:latin typeface="Monaco" charset="0"/>
-                <a:ea typeface="Monaco" charset="0"/>
-                <a:cs typeface="Monaco" charset="0"/>
-              </a:rPr>
-              <a:t>*</a:t>
-            </a:r>
-            <a:r>
-              <a:rPr lang="en-US" sz="1200" dirty="0" err="1" smtClean="0">
-                <a:latin typeface="Monaco" charset="0"/>
-                <a:ea typeface="Monaco" charset="0"/>
-                <a:cs typeface="Monaco" charset="0"/>
-              </a:rPr>
-              <a:t>errcodes</a:t>
-            </a:r>
-            <a:r>
-              <a:rPr lang="en-US" sz="1200" dirty="0" smtClean="0">
-                <a:latin typeface="Monaco" charset="0"/>
-                <a:ea typeface="Monaco" charset="0"/>
-                <a:cs typeface="Monaco" charset="0"/>
-              </a:rPr>
-              <a:t>;</a:t>
-            </a:r>
-          </a:p>
-          <a:p>
-            <a:pPr>
-              <a:lnSpc>
-                <a:spcPct val="150000"/>
-              </a:lnSpc>
-            </a:pPr>
-            <a:r>
-              <a:rPr lang="en-US" sz="1200" dirty="0">
-                <a:latin typeface="Monaco" charset="0"/>
-                <a:ea typeface="Monaco" charset="0"/>
-                <a:cs typeface="Monaco" charset="0"/>
-              </a:rPr>
-              <a:t> </a:t>
-            </a:r>
-            <a:r>
-              <a:rPr lang="en-US" sz="1200" dirty="0" smtClean="0">
-                <a:latin typeface="Monaco" charset="0"/>
-                <a:ea typeface="Monaco" charset="0"/>
-                <a:cs typeface="Monaco" charset="0"/>
-              </a:rPr>
-              <a:t> </a:t>
-            </a:r>
-            <a:r>
-              <a:rPr lang="en-US" sz="1200" dirty="0" err="1" smtClean="0">
-                <a:latin typeface="Monaco" charset="0"/>
-                <a:ea typeface="Monaco" charset="0"/>
-                <a:cs typeface="Monaco" charset="0"/>
-              </a:rPr>
-              <a:t>int</a:t>
-            </a:r>
-            <a:r>
-              <a:rPr lang="en-US" sz="1200" dirty="0" smtClean="0">
-                <a:latin typeface="Monaco" charset="0"/>
-                <a:ea typeface="Monaco" charset="0"/>
-                <a:cs typeface="Monaco" charset="0"/>
-              </a:rPr>
-              <a:t> </a:t>
-            </a:r>
-            <a:r>
-              <a:rPr lang="en-US" sz="1200" dirty="0" err="1" smtClean="0">
-                <a:latin typeface="Monaco" charset="0"/>
-                <a:ea typeface="Monaco" charset="0"/>
-                <a:cs typeface="Monaco" charset="0"/>
-              </a:rPr>
-              <a:t>num_errcodes</a:t>
-            </a:r>
-            <a:r>
-              <a:rPr lang="en-US" sz="1200" dirty="0" smtClean="0">
-                <a:latin typeface="Monaco" charset="0"/>
-                <a:ea typeface="Monaco" charset="0"/>
-                <a:cs typeface="Monaco" charset="0"/>
-              </a:rPr>
-              <a:t>;</a:t>
-            </a:r>
-            <a:endParaRPr lang="en-US" sz="1200" dirty="0">
+            <a:r>
+              <a:rPr lang="is-IS" sz="1350" dirty="0" smtClean="0">
+                <a:latin typeface="Monaco" charset="0"/>
+                <a:ea typeface="Monaco" charset="0"/>
+                <a:cs typeface="Monaco" charset="0"/>
+              </a:rPr>
+              <a:t>}</a:t>
+            </a:r>
+            <a:endParaRPr lang="is-IS" sz="1350" dirty="0">
               <a:latin typeface="Monaco" charset="0"/>
               <a:ea typeface="Monaco" charset="0"/>
               <a:cs typeface="Monaco" charset="0"/>
             </a:endParaRPr>
           </a:p>
-          <a:p>
-            <a:pPr>
-              <a:lnSpc>
-                <a:spcPct val="150000"/>
-              </a:lnSpc>
-            </a:pPr>
-            <a:r>
-              <a:rPr lang="en-US" sz="1200" dirty="0">
-                <a:latin typeface="Monaco" charset="0"/>
-                <a:ea typeface="Monaco" charset="0"/>
-                <a:cs typeface="Monaco" charset="0"/>
-              </a:rPr>
-              <a:t>  void *</a:t>
-            </a:r>
-            <a:r>
-              <a:rPr lang="en-US" sz="1200" dirty="0" err="1">
-                <a:latin typeface="Monaco" charset="0"/>
-                <a:ea typeface="Monaco" charset="0"/>
-                <a:cs typeface="Monaco" charset="0"/>
-              </a:rPr>
-              <a:t>user_context</a:t>
-            </a:r>
-            <a:r>
-              <a:rPr lang="en-US" sz="1200" dirty="0">
-                <a:latin typeface="Monaco" charset="0"/>
-                <a:ea typeface="Monaco" charset="0"/>
-                <a:cs typeface="Monaco" charset="0"/>
-              </a:rPr>
-              <a:t>; </a:t>
-            </a:r>
-            <a:br>
-              <a:rPr lang="en-US" sz="1200" dirty="0">
-                <a:latin typeface="Monaco" charset="0"/>
-                <a:ea typeface="Monaco" charset="0"/>
-                <a:cs typeface="Monaco" charset="0"/>
-              </a:rPr>
-            </a:br>
-            <a:r>
-              <a:rPr lang="en-US" sz="1200" dirty="0">
-                <a:latin typeface="Monaco" charset="0"/>
-                <a:ea typeface="Monaco" charset="0"/>
-                <a:cs typeface="Monaco" charset="0"/>
-              </a:rPr>
-              <a:t>} </a:t>
-            </a:r>
-            <a:r>
-              <a:rPr lang="en-US" sz="1200" dirty="0" err="1">
-                <a:latin typeface="Monaco" charset="0"/>
-                <a:ea typeface="Monaco" charset="0"/>
-                <a:cs typeface="Monaco" charset="0"/>
-              </a:rPr>
-              <a:t>MPI_Errhandler_args</a:t>
-            </a:r>
-            <a:r>
-              <a:rPr lang="en-US" sz="1200" dirty="0">
-                <a:latin typeface="Monaco" charset="0"/>
-                <a:ea typeface="Monaco" charset="0"/>
-                <a:cs typeface="Monaco" charset="0"/>
-              </a:rPr>
-              <a:t>;</a:t>
-            </a:r>
+        </p:txBody>
+      </p:sp>
+      <p:sp>
+        <p:nvSpPr>
+          <p:cNvPr id="9" name="TextBox 8"/>
+          <p:cNvSpPr txBox="1"/>
+          <p:nvPr/>
+        </p:nvSpPr>
+        <p:spPr>
+          <a:xfrm>
+            <a:off x="4300953" y="5252831"/>
+            <a:ext cx="435440" cy="369332"/>
+          </a:xfrm>
+          <a:prstGeom prst="rect">
+            <a:avLst/>
+          </a:prstGeom>
+          <a:noFill/>
+        </p:spPr>
+        <p:txBody>
+          <a:bodyPr wrap="none" rtlCol="0">
+            <a:spAutoFit/>
+          </a:bodyPr>
+          <a:lstStyle/>
+          <a:p>
+            <a:r>
+              <a:rPr lang="en-US" dirty="0"/>
+              <a:t>v</a:t>
+            </a:r>
+            <a:r>
+              <a:rPr lang="en-US" dirty="0" smtClean="0"/>
+              <a:t>s.</a:t>
+            </a:r>
+            <a:endParaRPr lang="en-US" dirty="0"/>
           </a:p>
         </p:txBody>
       </p:sp>
     </p:spTree>
     <p:extLst>
       <p:ext uri="{BB962C8B-B14F-4D97-AF65-F5344CB8AC3E}">
-        <p14:creationId xmlns:p14="http://schemas.microsoft.com/office/powerpoint/2010/main" val="362328095"/>
+        <p14:creationId xmlns:p14="http://schemas.microsoft.com/office/powerpoint/2010/main" val="533739408"/>
       </p:ext>
     </p:extLst>
   </p:cSld>

</xml_diff>

<commit_message>
Update slides to include the discussions we had in the room
</commit_message>
<xml_diff>
--- a/slides/2016-03-01-FTWG-Error-Handlers.pptx
+++ b/slides/2016-03-01-FTWG-Error-Handlers.pptx
@@ -8,14 +8,16 @@
     <p:sldId id="256" r:id="rId2"/>
     <p:sldId id="260" r:id="rId3"/>
     <p:sldId id="261" r:id="rId4"/>
-    <p:sldId id="267" r:id="rId5"/>
-    <p:sldId id="262" r:id="rId6"/>
-    <p:sldId id="263" r:id="rId7"/>
-    <p:sldId id="264" r:id="rId8"/>
-    <p:sldId id="265" r:id="rId9"/>
-    <p:sldId id="258" r:id="rId10"/>
-    <p:sldId id="257" r:id="rId11"/>
-    <p:sldId id="266" r:id="rId12"/>
+    <p:sldId id="269" r:id="rId5"/>
+    <p:sldId id="268" r:id="rId6"/>
+    <p:sldId id="267" r:id="rId7"/>
+    <p:sldId id="262" r:id="rId8"/>
+    <p:sldId id="263" r:id="rId9"/>
+    <p:sldId id="264" r:id="rId10"/>
+    <p:sldId id="265" r:id="rId11"/>
+    <p:sldId id="258" r:id="rId12"/>
+    <p:sldId id="257" r:id="rId13"/>
+    <p:sldId id="266" r:id="rId14"/>
   </p:sldIdLst>
   <p:sldSz cx="9144000" cy="6858000" type="screen4x3"/>
   <p:notesSz cx="6858000" cy="9144000"/>
@@ -253,7 +255,7 @@
           <a:p>
             <a:fld id="{46937E52-4684-DE44-B24F-C2CD0B439DDE}" type="datetimeFigureOut">
               <a:rPr lang="en-US" smtClean="0"/>
-              <a:t>2/29/16</a:t>
+              <a:t>3/1/16</a:t>
             </a:fld>
             <a:endParaRPr lang="en-US"/>
           </a:p>
@@ -423,7 +425,7 @@
           <a:p>
             <a:fld id="{46937E52-4684-DE44-B24F-C2CD0B439DDE}" type="datetimeFigureOut">
               <a:rPr lang="en-US" smtClean="0"/>
-              <a:t>2/29/16</a:t>
+              <a:t>3/1/16</a:t>
             </a:fld>
             <a:endParaRPr lang="en-US"/>
           </a:p>
@@ -603,7 +605,7 @@
           <a:p>
             <a:fld id="{46937E52-4684-DE44-B24F-C2CD0B439DDE}" type="datetimeFigureOut">
               <a:rPr lang="en-US" smtClean="0"/>
-              <a:t>2/29/16</a:t>
+              <a:t>3/1/16</a:t>
             </a:fld>
             <a:endParaRPr lang="en-US"/>
           </a:p>
@@ -773,7 +775,7 @@
           <a:p>
             <a:fld id="{46937E52-4684-DE44-B24F-C2CD0B439DDE}" type="datetimeFigureOut">
               <a:rPr lang="en-US" smtClean="0"/>
-              <a:t>2/29/16</a:t>
+              <a:t>3/1/16</a:t>
             </a:fld>
             <a:endParaRPr lang="en-US"/>
           </a:p>
@@ -1017,7 +1019,7 @@
           <a:p>
             <a:fld id="{46937E52-4684-DE44-B24F-C2CD0B439DDE}" type="datetimeFigureOut">
               <a:rPr lang="en-US" smtClean="0"/>
-              <a:t>2/29/16</a:t>
+              <a:t>3/1/16</a:t>
             </a:fld>
             <a:endParaRPr lang="en-US"/>
           </a:p>
@@ -1249,7 +1251,7 @@
           <a:p>
             <a:fld id="{46937E52-4684-DE44-B24F-C2CD0B439DDE}" type="datetimeFigureOut">
               <a:rPr lang="en-US" smtClean="0"/>
-              <a:t>2/29/16</a:t>
+              <a:t>3/1/16</a:t>
             </a:fld>
             <a:endParaRPr lang="en-US"/>
           </a:p>
@@ -1616,7 +1618,7 @@
           <a:p>
             <a:fld id="{46937E52-4684-DE44-B24F-C2CD0B439DDE}" type="datetimeFigureOut">
               <a:rPr lang="en-US" smtClean="0"/>
-              <a:t>2/29/16</a:t>
+              <a:t>3/1/16</a:t>
             </a:fld>
             <a:endParaRPr lang="en-US"/>
           </a:p>
@@ -1734,7 +1736,7 @@
           <a:p>
             <a:fld id="{46937E52-4684-DE44-B24F-C2CD0B439DDE}" type="datetimeFigureOut">
               <a:rPr lang="en-US" smtClean="0"/>
-              <a:t>2/29/16</a:t>
+              <a:t>3/1/16</a:t>
             </a:fld>
             <a:endParaRPr lang="en-US"/>
           </a:p>
@@ -1829,7 +1831,7 @@
           <a:p>
             <a:fld id="{46937E52-4684-DE44-B24F-C2CD0B439DDE}" type="datetimeFigureOut">
               <a:rPr lang="en-US" smtClean="0"/>
-              <a:t>2/29/16</a:t>
+              <a:t>3/1/16</a:t>
             </a:fld>
             <a:endParaRPr lang="en-US"/>
           </a:p>
@@ -2106,7 +2108,7 @@
           <a:p>
             <a:fld id="{46937E52-4684-DE44-B24F-C2CD0B439DDE}" type="datetimeFigureOut">
               <a:rPr lang="en-US" smtClean="0"/>
-              <a:t>2/29/16</a:t>
+              <a:t>3/1/16</a:t>
             </a:fld>
             <a:endParaRPr lang="en-US"/>
           </a:p>
@@ -2363,7 +2365,7 @@
           <a:p>
             <a:fld id="{46937E52-4684-DE44-B24F-C2CD0B439DDE}" type="datetimeFigureOut">
               <a:rPr lang="en-US" smtClean="0"/>
-              <a:t>2/29/16</a:t>
+              <a:t>3/1/16</a:t>
             </a:fld>
             <a:endParaRPr lang="en-US"/>
           </a:p>
@@ -2576,7 +2578,7 @@
           <a:p>
             <a:fld id="{46937E52-4684-DE44-B24F-C2CD0B439DDE}" type="datetimeFigureOut">
               <a:rPr lang="en-US" smtClean="0"/>
-              <a:t>2/29/16</a:t>
+              <a:t>3/1/16</a:t>
             </a:fld>
             <a:endParaRPr lang="en-US"/>
           </a:p>
@@ -3066,6 +3068,874 @@
             <p:ph type="title"/>
           </p:nvPr>
         </p:nvSpPr>
+        <p:spPr/>
+        <p:txBody>
+          <a:bodyPr/>
+          <a:lstStyle/>
+          <a:p>
+            <a:r>
+              <a:rPr lang="en-US" dirty="0" smtClean="0"/>
+              <a:t>Pick Error Classes to Handle</a:t>
+            </a:r>
+            <a:endParaRPr lang="en-US" dirty="0"/>
+          </a:p>
+        </p:txBody>
+      </p:sp>
+      <p:sp>
+        <p:nvSpPr>
+          <p:cNvPr id="3" name="Content Placeholder 2"/>
+          <p:cNvSpPr>
+            <a:spLocks noGrp="1"/>
+          </p:cNvSpPr>
+          <p:nvPr>
+            <p:ph idx="1"/>
+          </p:nvPr>
+        </p:nvSpPr>
+        <p:spPr/>
+        <p:txBody>
+          <a:bodyPr>
+            <a:normAutofit lnSpcReduction="10000"/>
+          </a:bodyPr>
+          <a:lstStyle/>
+          <a:p>
+            <a:r>
+              <a:rPr lang="en-US" dirty="0" smtClean="0"/>
+              <a:t>Add array of error classes to the </a:t>
+            </a:r>
+            <a:r>
+              <a:rPr lang="en-US" dirty="0" err="1" smtClean="0"/>
+              <a:t>MPI_Errhandler_set</a:t>
+            </a:r>
+            <a:r>
+              <a:rPr lang="en-US" dirty="0" smtClean="0"/>
+              <a:t> function</a:t>
+            </a:r>
+          </a:p>
+          <a:p>
+            <a:r>
+              <a:rPr lang="en-US" dirty="0" smtClean="0"/>
+              <a:t>Only call this error handler when an error class in the array is raised</a:t>
+            </a:r>
+          </a:p>
+          <a:p>
+            <a:r>
+              <a:rPr lang="en-US" dirty="0" smtClean="0"/>
+              <a:t>Have ”generic” error handler for all other cases</a:t>
+            </a:r>
+          </a:p>
+          <a:p>
+            <a:r>
+              <a:rPr lang="en-US" dirty="0" smtClean="0"/>
+              <a:t>Add some predefined value for </a:t>
+            </a:r>
+            <a:r>
+              <a:rPr lang="en-US" dirty="0" smtClean="0"/>
+              <a:t>MPI_ALL_ERROR_CLASSES</a:t>
+            </a:r>
+          </a:p>
+          <a:p>
+            <a:r>
+              <a:rPr lang="en-US" dirty="0" smtClean="0"/>
+              <a:t>Set a default and overwrite it for specific cases</a:t>
+            </a:r>
+          </a:p>
+          <a:p>
+            <a:r>
+              <a:rPr lang="en-US" dirty="0" smtClean="0"/>
+              <a:t>Is this a big enough win over having a switch statement in your error handler already?</a:t>
+            </a:r>
+            <a:endParaRPr lang="en-US" dirty="0"/>
+          </a:p>
+        </p:txBody>
+      </p:sp>
+    </p:spTree>
+    <p:extLst>
+      <p:ext uri="{BB962C8B-B14F-4D97-AF65-F5344CB8AC3E}">
+        <p14:creationId xmlns:p14="http://schemas.microsoft.com/office/powerpoint/2010/main" val="1148874328"/>
+      </p:ext>
+    </p:extLst>
+  </p:cSld>
+  <p:clrMapOvr>
+    <a:masterClrMapping/>
+  </p:clrMapOvr>
+</p:sld>
+</file>
+
+<file path=ppt/slides/slide11.xml><?xml version="1.0" encoding="utf-8"?>
+<p:sld xmlns:a="http://schemas.openxmlformats.org/drawingml/2006/main" xmlns:r="http://schemas.openxmlformats.org/officeDocument/2006/relationships" xmlns:p="http://schemas.openxmlformats.org/presentationml/2006/main">
+  <p:cSld>
+    <p:spTree>
+      <p:nvGrpSpPr>
+        <p:cNvPr id="1" name=""/>
+        <p:cNvGrpSpPr/>
+        <p:nvPr/>
+      </p:nvGrpSpPr>
+      <p:grpSpPr>
+        <a:xfrm>
+          <a:off x="0" y="0"/>
+          <a:ext cx="0" cy="0"/>
+          <a:chOff x="0" y="0"/>
+          <a:chExt cx="0" cy="0"/>
+        </a:xfrm>
+      </p:grpSpPr>
+      <p:sp>
+        <p:nvSpPr>
+          <p:cNvPr id="2" name="Title 1"/>
+          <p:cNvSpPr>
+            <a:spLocks noGrp="1"/>
+          </p:cNvSpPr>
+          <p:nvPr>
+            <p:ph type="title"/>
+          </p:nvPr>
+        </p:nvSpPr>
+        <p:spPr/>
+        <p:txBody>
+          <a:bodyPr/>
+          <a:lstStyle/>
+          <a:p>
+            <a:r>
+              <a:rPr lang="en-US" dirty="0" smtClean="0"/>
+              <a:t>Multiple Error Handler Types Problem</a:t>
+            </a:r>
+            <a:endParaRPr lang="en-US" dirty="0"/>
+          </a:p>
+        </p:txBody>
+      </p:sp>
+      <p:sp>
+        <p:nvSpPr>
+          <p:cNvPr id="3" name="Content Placeholder 2"/>
+          <p:cNvSpPr>
+            <a:spLocks noGrp="1"/>
+          </p:cNvSpPr>
+          <p:nvPr>
+            <p:ph idx="1"/>
+          </p:nvPr>
+        </p:nvSpPr>
+        <p:spPr>
+          <a:xfrm>
+            <a:off x="628650" y="1669681"/>
+            <a:ext cx="7886700" cy="2332572"/>
+          </a:xfrm>
+        </p:spPr>
+        <p:txBody>
+          <a:bodyPr>
+            <a:normAutofit fontScale="92500" lnSpcReduction="10000"/>
+          </a:bodyPr>
+          <a:lstStyle/>
+          <a:p>
+            <a:r>
+              <a:rPr lang="en-US" dirty="0" smtClean="0"/>
+              <a:t>Currently have to create a bunch of functions even when they all often do the same thing</a:t>
+            </a:r>
+          </a:p>
+          <a:p>
+            <a:pPr lvl="1"/>
+            <a:r>
+              <a:rPr lang="en-US" dirty="0" smtClean="0"/>
+              <a:t>Callback functions have object types built into the signatures</a:t>
+            </a:r>
+          </a:p>
+          <a:p>
+            <a:r>
+              <a:rPr lang="en-US" dirty="0" smtClean="0"/>
+              <a:t>Multiple types == better code reuse</a:t>
+            </a:r>
+          </a:p>
+          <a:p>
+            <a:r>
+              <a:rPr lang="en-US" dirty="0" smtClean="0"/>
+              <a:t>Makes using a single error handler function for generic handling more complex</a:t>
+            </a:r>
+          </a:p>
+        </p:txBody>
+      </p:sp>
+      <p:sp>
+        <p:nvSpPr>
+          <p:cNvPr id="4" name="TextBox 3"/>
+          <p:cNvSpPr txBox="1"/>
+          <p:nvPr/>
+        </p:nvSpPr>
+        <p:spPr>
+          <a:xfrm>
+            <a:off x="324420" y="4241473"/>
+            <a:ext cx="3542189" cy="715581"/>
+          </a:xfrm>
+          <a:prstGeom prst="rect">
+            <a:avLst/>
+          </a:prstGeom>
+          <a:ln w="28575"/>
+        </p:spPr>
+        <p:style>
+          <a:lnRef idx="2">
+            <a:schemeClr val="accent1"/>
+          </a:lnRef>
+          <a:fillRef idx="1">
+            <a:schemeClr val="lt1"/>
+          </a:fillRef>
+          <a:effectRef idx="0">
+            <a:schemeClr val="accent1"/>
+          </a:effectRef>
+          <a:fontRef idx="minor">
+            <a:schemeClr val="dk1"/>
+          </a:fontRef>
+        </p:style>
+        <p:txBody>
+          <a:bodyPr wrap="square" rtlCol="0" anchor="ctr">
+            <a:spAutoFit/>
+          </a:bodyPr>
+          <a:lstStyle/>
+          <a:p>
+            <a:r>
+              <a:rPr lang="en-US" sz="1350" dirty="0" err="1">
+                <a:latin typeface="Monaco" charset="0"/>
+                <a:ea typeface="Monaco" charset="0"/>
+                <a:cs typeface="Monaco" charset="0"/>
+              </a:rPr>
+              <a:t>MPI_Comm_errhandler_fn</a:t>
+            </a:r>
+            <a:r>
+              <a:rPr lang="en-US" sz="1350" dirty="0">
+                <a:latin typeface="Monaco" charset="0"/>
+                <a:ea typeface="Monaco" charset="0"/>
+                <a:cs typeface="Monaco" charset="0"/>
+              </a:rPr>
+              <a:t>(</a:t>
+            </a:r>
+            <a:r>
+              <a:rPr lang="en-US" sz="1350" dirty="0" err="1">
+                <a:latin typeface="Monaco" charset="0"/>
+                <a:ea typeface="Monaco" charset="0"/>
+                <a:cs typeface="Monaco" charset="0"/>
+              </a:rPr>
+              <a:t>MPI_Comm</a:t>
+            </a:r>
+            <a:r>
+              <a:rPr lang="en-US" sz="1350" dirty="0">
+                <a:latin typeface="Monaco" charset="0"/>
+                <a:ea typeface="Monaco" charset="0"/>
+                <a:cs typeface="Monaco" charset="0"/>
+              </a:rPr>
+              <a:t> *</a:t>
+            </a:r>
+            <a:r>
+              <a:rPr lang="en-US" sz="1350" dirty="0" err="1">
+                <a:latin typeface="Monaco" charset="0"/>
+                <a:ea typeface="Monaco" charset="0"/>
+                <a:cs typeface="Monaco" charset="0"/>
+              </a:rPr>
+              <a:t>comm</a:t>
+            </a:r>
+            <a:r>
+              <a:rPr lang="en-US" sz="1350" dirty="0">
+                <a:latin typeface="Monaco" charset="0"/>
+                <a:ea typeface="Monaco" charset="0"/>
+                <a:cs typeface="Monaco" charset="0"/>
+              </a:rPr>
+              <a:t>, </a:t>
+            </a:r>
+            <a:r>
+              <a:rPr lang="en-US" sz="1350" dirty="0" err="1">
+                <a:latin typeface="Monaco" charset="0"/>
+                <a:ea typeface="Monaco" charset="0"/>
+                <a:cs typeface="Monaco" charset="0"/>
+              </a:rPr>
+              <a:t>int</a:t>
+            </a:r>
+            <a:r>
+              <a:rPr lang="en-US" sz="1350" dirty="0">
+                <a:latin typeface="Monaco" charset="0"/>
+                <a:ea typeface="Monaco" charset="0"/>
+                <a:cs typeface="Monaco" charset="0"/>
+              </a:rPr>
+              <a:t> *</a:t>
+            </a:r>
+            <a:r>
+              <a:rPr lang="en-US" sz="1350" dirty="0" err="1">
+                <a:latin typeface="Monaco" charset="0"/>
+                <a:ea typeface="Monaco" charset="0"/>
+                <a:cs typeface="Monaco" charset="0"/>
+              </a:rPr>
+              <a:t>errcode</a:t>
+            </a:r>
+            <a:r>
+              <a:rPr lang="en-US" sz="1350" dirty="0">
+                <a:latin typeface="Monaco" charset="0"/>
+                <a:ea typeface="Monaco" charset="0"/>
+                <a:cs typeface="Monaco" charset="0"/>
+              </a:rPr>
+              <a:t>, </a:t>
+            </a:r>
+            <a:r>
+              <a:rPr lang="is-IS" sz="1350" dirty="0">
+                <a:latin typeface="Monaco" charset="0"/>
+                <a:ea typeface="Monaco" charset="0"/>
+                <a:cs typeface="Monaco" charset="0"/>
+              </a:rPr>
+              <a:t>…) {</a:t>
+            </a:r>
+          </a:p>
+          <a:p>
+            <a:r>
+              <a:rPr lang="is-IS" sz="1350" dirty="0">
+                <a:latin typeface="Monaco" charset="0"/>
+                <a:ea typeface="Monaco" charset="0"/>
+                <a:cs typeface="Monaco" charset="0"/>
+              </a:rPr>
+              <a:t>    cleanup_fn</a:t>
+            </a:r>
+            <a:r>
+              <a:rPr lang="is-IS" sz="1350" dirty="0" smtClean="0">
+                <a:latin typeface="Monaco" charset="0"/>
+                <a:ea typeface="Monaco" charset="0"/>
+                <a:cs typeface="Monaco" charset="0"/>
+              </a:rPr>
+              <a:t>(); }</a:t>
+            </a:r>
+            <a:endParaRPr lang="en-US" sz="1350" dirty="0">
+              <a:latin typeface="Monaco" charset="0"/>
+              <a:ea typeface="Monaco" charset="0"/>
+              <a:cs typeface="Monaco" charset="0"/>
+            </a:endParaRPr>
+          </a:p>
+        </p:txBody>
+      </p:sp>
+      <p:sp>
+        <p:nvSpPr>
+          <p:cNvPr id="5" name="TextBox 4"/>
+          <p:cNvSpPr txBox="1"/>
+          <p:nvPr/>
+        </p:nvSpPr>
+        <p:spPr>
+          <a:xfrm>
+            <a:off x="324420" y="5085676"/>
+            <a:ext cx="3542190" cy="715581"/>
+          </a:xfrm>
+          <a:prstGeom prst="rect">
+            <a:avLst/>
+          </a:prstGeom>
+          <a:ln w="28575">
+            <a:solidFill>
+              <a:srgbClr val="7030A0"/>
+            </a:solidFill>
+          </a:ln>
+        </p:spPr>
+        <p:style>
+          <a:lnRef idx="2">
+            <a:schemeClr val="accent2"/>
+          </a:lnRef>
+          <a:fillRef idx="1">
+            <a:schemeClr val="lt1"/>
+          </a:fillRef>
+          <a:effectRef idx="0">
+            <a:schemeClr val="accent2"/>
+          </a:effectRef>
+          <a:fontRef idx="minor">
+            <a:schemeClr val="dk1"/>
+          </a:fontRef>
+        </p:style>
+        <p:txBody>
+          <a:bodyPr wrap="square" rtlCol="0" anchor="ctr">
+            <a:spAutoFit/>
+          </a:bodyPr>
+          <a:lstStyle/>
+          <a:p>
+            <a:r>
+              <a:rPr lang="en-US" sz="1350" dirty="0" err="1">
+                <a:latin typeface="Monaco" charset="0"/>
+                <a:ea typeface="Monaco" charset="0"/>
+                <a:cs typeface="Monaco" charset="0"/>
+              </a:rPr>
+              <a:t>MPI_Win_errhandler_fn</a:t>
+            </a:r>
+            <a:r>
+              <a:rPr lang="en-US" sz="1350" dirty="0">
+                <a:latin typeface="Monaco" charset="0"/>
+                <a:ea typeface="Monaco" charset="0"/>
+                <a:cs typeface="Monaco" charset="0"/>
+              </a:rPr>
+              <a:t>(</a:t>
+            </a:r>
+            <a:r>
+              <a:rPr lang="en-US" sz="1350" dirty="0" err="1">
+                <a:latin typeface="Monaco" charset="0"/>
+                <a:ea typeface="Monaco" charset="0"/>
+                <a:cs typeface="Monaco" charset="0"/>
+              </a:rPr>
+              <a:t>MPI_Win</a:t>
+            </a:r>
+            <a:r>
+              <a:rPr lang="en-US" sz="1350" dirty="0">
+                <a:latin typeface="Monaco" charset="0"/>
+                <a:ea typeface="Monaco" charset="0"/>
+                <a:cs typeface="Monaco" charset="0"/>
+              </a:rPr>
+              <a:t> *win, </a:t>
+            </a:r>
+            <a:r>
+              <a:rPr lang="en-US" sz="1350" dirty="0" err="1">
+                <a:latin typeface="Monaco" charset="0"/>
+                <a:ea typeface="Monaco" charset="0"/>
+                <a:cs typeface="Monaco" charset="0"/>
+              </a:rPr>
+              <a:t>int</a:t>
+            </a:r>
+            <a:r>
+              <a:rPr lang="en-US" sz="1350" dirty="0">
+                <a:latin typeface="Monaco" charset="0"/>
+                <a:ea typeface="Monaco" charset="0"/>
+                <a:cs typeface="Monaco" charset="0"/>
+              </a:rPr>
+              <a:t> *</a:t>
+            </a:r>
+            <a:r>
+              <a:rPr lang="en-US" sz="1350" dirty="0" err="1">
+                <a:latin typeface="Monaco" charset="0"/>
+                <a:ea typeface="Monaco" charset="0"/>
+                <a:cs typeface="Monaco" charset="0"/>
+              </a:rPr>
+              <a:t>errcode</a:t>
+            </a:r>
+            <a:r>
+              <a:rPr lang="en-US" sz="1350" dirty="0">
+                <a:latin typeface="Monaco" charset="0"/>
+                <a:ea typeface="Monaco" charset="0"/>
+                <a:cs typeface="Monaco" charset="0"/>
+              </a:rPr>
+              <a:t>, </a:t>
+            </a:r>
+            <a:r>
+              <a:rPr lang="is-IS" sz="1350" dirty="0">
+                <a:latin typeface="Monaco" charset="0"/>
+                <a:ea typeface="Monaco" charset="0"/>
+                <a:cs typeface="Monaco" charset="0"/>
+              </a:rPr>
+              <a:t>…) {</a:t>
+            </a:r>
+          </a:p>
+          <a:p>
+            <a:r>
+              <a:rPr lang="is-IS" sz="1350" dirty="0">
+                <a:latin typeface="Monaco" charset="0"/>
+                <a:ea typeface="Monaco" charset="0"/>
+                <a:cs typeface="Monaco" charset="0"/>
+              </a:rPr>
+              <a:t>    cleanup_fn</a:t>
+            </a:r>
+            <a:r>
+              <a:rPr lang="is-IS" sz="1350" dirty="0" smtClean="0">
+                <a:latin typeface="Monaco" charset="0"/>
+                <a:ea typeface="Monaco" charset="0"/>
+                <a:cs typeface="Monaco" charset="0"/>
+              </a:rPr>
+              <a:t>(); }</a:t>
+            </a:r>
+            <a:endParaRPr lang="en-US" sz="1350" dirty="0">
+              <a:latin typeface="Monaco" charset="0"/>
+              <a:ea typeface="Monaco" charset="0"/>
+              <a:cs typeface="Monaco" charset="0"/>
+            </a:endParaRPr>
+          </a:p>
+        </p:txBody>
+      </p:sp>
+      <p:sp>
+        <p:nvSpPr>
+          <p:cNvPr id="6" name="TextBox 5"/>
+          <p:cNvSpPr txBox="1"/>
+          <p:nvPr/>
+        </p:nvSpPr>
+        <p:spPr>
+          <a:xfrm>
+            <a:off x="324420" y="5925639"/>
+            <a:ext cx="3542191" cy="715581"/>
+          </a:xfrm>
+          <a:prstGeom prst="rect">
+            <a:avLst/>
+          </a:prstGeom>
+          <a:ln w="28575">
+            <a:solidFill>
+              <a:schemeClr val="accent2"/>
+            </a:solidFill>
+          </a:ln>
+        </p:spPr>
+        <p:style>
+          <a:lnRef idx="2">
+            <a:schemeClr val="accent4"/>
+          </a:lnRef>
+          <a:fillRef idx="1">
+            <a:schemeClr val="lt1"/>
+          </a:fillRef>
+          <a:effectRef idx="0">
+            <a:schemeClr val="accent4"/>
+          </a:effectRef>
+          <a:fontRef idx="minor">
+            <a:schemeClr val="dk1"/>
+          </a:fontRef>
+        </p:style>
+        <p:txBody>
+          <a:bodyPr wrap="square" rtlCol="0" anchor="ctr">
+            <a:spAutoFit/>
+          </a:bodyPr>
+          <a:lstStyle/>
+          <a:p>
+            <a:r>
+              <a:rPr lang="en-US" sz="1350" dirty="0" err="1">
+                <a:latin typeface="Monaco" charset="0"/>
+                <a:ea typeface="Monaco" charset="0"/>
+                <a:cs typeface="Monaco" charset="0"/>
+              </a:rPr>
+              <a:t>MPI_Comm_errhandler_fn</a:t>
+            </a:r>
+            <a:r>
+              <a:rPr lang="en-US" sz="1350" dirty="0">
+                <a:latin typeface="Monaco" charset="0"/>
+                <a:ea typeface="Monaco" charset="0"/>
+                <a:cs typeface="Monaco" charset="0"/>
+              </a:rPr>
+              <a:t>(</a:t>
+            </a:r>
+            <a:r>
+              <a:rPr lang="en-US" sz="1350" dirty="0" err="1">
+                <a:latin typeface="Monaco" charset="0"/>
+                <a:ea typeface="Monaco" charset="0"/>
+                <a:cs typeface="Monaco" charset="0"/>
+              </a:rPr>
+              <a:t>MPI_File</a:t>
+            </a:r>
+            <a:r>
+              <a:rPr lang="en-US" sz="1350" dirty="0">
+                <a:latin typeface="Monaco" charset="0"/>
+                <a:ea typeface="Monaco" charset="0"/>
+                <a:cs typeface="Monaco" charset="0"/>
+              </a:rPr>
+              <a:t> *file, </a:t>
+            </a:r>
+            <a:r>
+              <a:rPr lang="en-US" sz="1350" dirty="0" err="1">
+                <a:latin typeface="Monaco" charset="0"/>
+                <a:ea typeface="Monaco" charset="0"/>
+                <a:cs typeface="Monaco" charset="0"/>
+              </a:rPr>
+              <a:t>int</a:t>
+            </a:r>
+            <a:r>
+              <a:rPr lang="en-US" sz="1350" dirty="0">
+                <a:latin typeface="Monaco" charset="0"/>
+                <a:ea typeface="Monaco" charset="0"/>
+                <a:cs typeface="Monaco" charset="0"/>
+              </a:rPr>
+              <a:t> *</a:t>
+            </a:r>
+            <a:r>
+              <a:rPr lang="en-US" sz="1350" dirty="0" err="1">
+                <a:latin typeface="Monaco" charset="0"/>
+                <a:ea typeface="Monaco" charset="0"/>
+                <a:cs typeface="Monaco" charset="0"/>
+              </a:rPr>
+              <a:t>errcode</a:t>
+            </a:r>
+            <a:r>
+              <a:rPr lang="en-US" sz="1350" dirty="0">
+                <a:latin typeface="Monaco" charset="0"/>
+                <a:ea typeface="Monaco" charset="0"/>
+                <a:cs typeface="Monaco" charset="0"/>
+              </a:rPr>
+              <a:t>, </a:t>
+            </a:r>
+            <a:r>
+              <a:rPr lang="is-IS" sz="1350" dirty="0">
+                <a:latin typeface="Monaco" charset="0"/>
+                <a:ea typeface="Monaco" charset="0"/>
+                <a:cs typeface="Monaco" charset="0"/>
+              </a:rPr>
+              <a:t>…) {</a:t>
+            </a:r>
+          </a:p>
+          <a:p>
+            <a:r>
+              <a:rPr lang="is-IS" sz="1350" dirty="0">
+                <a:latin typeface="Monaco" charset="0"/>
+                <a:ea typeface="Monaco" charset="0"/>
+                <a:cs typeface="Monaco" charset="0"/>
+              </a:rPr>
+              <a:t>    cleanup_fn</a:t>
+            </a:r>
+            <a:r>
+              <a:rPr lang="is-IS" sz="1350" dirty="0" smtClean="0">
+                <a:latin typeface="Monaco" charset="0"/>
+                <a:ea typeface="Monaco" charset="0"/>
+                <a:cs typeface="Monaco" charset="0"/>
+              </a:rPr>
+              <a:t>(); }</a:t>
+            </a:r>
+            <a:endParaRPr lang="is-IS" sz="1350" dirty="0">
+              <a:latin typeface="Monaco" charset="0"/>
+              <a:ea typeface="Monaco" charset="0"/>
+              <a:cs typeface="Monaco" charset="0"/>
+            </a:endParaRPr>
+          </a:p>
+        </p:txBody>
+      </p:sp>
+      <p:sp>
+        <p:nvSpPr>
+          <p:cNvPr id="8" name="TextBox 7"/>
+          <p:cNvSpPr txBox="1"/>
+          <p:nvPr/>
+        </p:nvSpPr>
+        <p:spPr>
+          <a:xfrm>
+            <a:off x="5240405" y="4566303"/>
+            <a:ext cx="3542191" cy="1754326"/>
+          </a:xfrm>
+          <a:prstGeom prst="rect">
+            <a:avLst/>
+          </a:prstGeom>
+          <a:ln w="28575">
+            <a:solidFill>
+              <a:schemeClr val="accent6"/>
+            </a:solidFill>
+          </a:ln>
+        </p:spPr>
+        <p:style>
+          <a:lnRef idx="2">
+            <a:schemeClr val="accent4"/>
+          </a:lnRef>
+          <a:fillRef idx="1">
+            <a:schemeClr val="lt1"/>
+          </a:fillRef>
+          <a:effectRef idx="0">
+            <a:schemeClr val="accent4"/>
+          </a:effectRef>
+          <a:fontRef idx="minor">
+            <a:schemeClr val="dk1"/>
+          </a:fontRef>
+        </p:style>
+        <p:txBody>
+          <a:bodyPr wrap="square" rtlCol="0" anchor="ctr">
+            <a:spAutoFit/>
+          </a:bodyPr>
+          <a:lstStyle/>
+          <a:p>
+            <a:r>
+              <a:rPr lang="en-US" sz="1350" dirty="0" err="1" smtClean="0">
+                <a:latin typeface="Monaco" charset="0"/>
+                <a:ea typeface="Monaco" charset="0"/>
+                <a:cs typeface="Monaco" charset="0"/>
+              </a:rPr>
+              <a:t>MPI_Errhandler_fn</a:t>
+            </a:r>
+            <a:r>
+              <a:rPr lang="en-US" sz="1350" dirty="0" smtClean="0">
+                <a:latin typeface="Monaco" charset="0"/>
+                <a:ea typeface="Monaco" charset="0"/>
+                <a:cs typeface="Monaco" charset="0"/>
+              </a:rPr>
+              <a:t>(</a:t>
+            </a:r>
+            <a:r>
+              <a:rPr lang="is-IS" sz="1350" dirty="0" smtClean="0">
+                <a:latin typeface="Monaco" charset="0"/>
+                <a:ea typeface="Monaco" charset="0"/>
+                <a:cs typeface="Monaco" charset="0"/>
+              </a:rPr>
+              <a:t>…) {</a:t>
+            </a:r>
+          </a:p>
+          <a:p>
+            <a:r>
+              <a:rPr lang="is-IS" sz="1350" dirty="0" smtClean="0">
+                <a:latin typeface="Monaco" charset="0"/>
+                <a:ea typeface="Monaco" charset="0"/>
+                <a:cs typeface="Monaco" charset="0"/>
+              </a:rPr>
+              <a:t>    /* ... Free objects ... */</a:t>
+            </a:r>
+          </a:p>
+          <a:p>
+            <a:r>
+              <a:rPr lang="is-IS" sz="1350" dirty="0">
+                <a:latin typeface="Monaco" charset="0"/>
+                <a:ea typeface="Monaco" charset="0"/>
+                <a:cs typeface="Monaco" charset="0"/>
+              </a:rPr>
+              <a:t> </a:t>
+            </a:r>
+            <a:r>
+              <a:rPr lang="is-IS" sz="1350" dirty="0" smtClean="0">
+                <a:latin typeface="Monaco" charset="0"/>
+                <a:ea typeface="Monaco" charset="0"/>
+                <a:cs typeface="Monaco" charset="0"/>
+              </a:rPr>
+              <a:t>   /* ... Close files ... */</a:t>
+            </a:r>
+          </a:p>
+          <a:p>
+            <a:r>
+              <a:rPr lang="is-IS" sz="1350" dirty="0">
+                <a:latin typeface="Monaco" charset="0"/>
+                <a:ea typeface="Monaco" charset="0"/>
+                <a:cs typeface="Monaco" charset="0"/>
+              </a:rPr>
+              <a:t> </a:t>
+            </a:r>
+            <a:r>
+              <a:rPr lang="is-IS" sz="1350" dirty="0" smtClean="0">
+                <a:latin typeface="Monaco" charset="0"/>
+                <a:ea typeface="Monaco" charset="0"/>
+                <a:cs typeface="Monaco" charset="0"/>
+              </a:rPr>
+              <a:t>   </a:t>
+            </a:r>
+          </a:p>
+          <a:p>
+            <a:r>
+              <a:rPr lang="is-IS" sz="1350" dirty="0">
+                <a:latin typeface="Monaco" charset="0"/>
+                <a:ea typeface="Monaco" charset="0"/>
+                <a:cs typeface="Monaco" charset="0"/>
+              </a:rPr>
+              <a:t> </a:t>
+            </a:r>
+            <a:r>
+              <a:rPr lang="is-IS" sz="1350" dirty="0" smtClean="0">
+                <a:latin typeface="Monaco" charset="0"/>
+                <a:ea typeface="Monaco" charset="0"/>
+                <a:cs typeface="Monaco" charset="0"/>
+              </a:rPr>
+              <a:t>   if (comm) repair_comm(comm);</a:t>
+            </a:r>
+          </a:p>
+          <a:p>
+            <a:r>
+              <a:rPr lang="is-IS" sz="1350" dirty="0">
+                <a:latin typeface="Monaco" charset="0"/>
+                <a:ea typeface="Monaco" charset="0"/>
+                <a:cs typeface="Monaco" charset="0"/>
+              </a:rPr>
+              <a:t> </a:t>
+            </a:r>
+            <a:r>
+              <a:rPr lang="is-IS" sz="1350" dirty="0" smtClean="0">
+                <a:latin typeface="Monaco" charset="0"/>
+                <a:ea typeface="Monaco" charset="0"/>
+                <a:cs typeface="Monaco" charset="0"/>
+              </a:rPr>
+              <a:t>   if (win) repair_win(win);</a:t>
+            </a:r>
+          </a:p>
+          <a:p>
+            <a:r>
+              <a:rPr lang="is-IS" sz="1350" dirty="0">
+                <a:latin typeface="Monaco" charset="0"/>
+                <a:ea typeface="Monaco" charset="0"/>
+                <a:cs typeface="Monaco" charset="0"/>
+              </a:rPr>
+              <a:t> </a:t>
+            </a:r>
+            <a:r>
+              <a:rPr lang="is-IS" sz="1350" dirty="0" smtClean="0">
+                <a:latin typeface="Monaco" charset="0"/>
+                <a:ea typeface="Monaco" charset="0"/>
+                <a:cs typeface="Monaco" charset="0"/>
+              </a:rPr>
+              <a:t>   if (file) repair_file(file);</a:t>
+            </a:r>
+            <a:endParaRPr lang="is-IS" sz="1350" dirty="0">
+              <a:latin typeface="Monaco" charset="0"/>
+              <a:ea typeface="Monaco" charset="0"/>
+              <a:cs typeface="Monaco" charset="0"/>
+            </a:endParaRPr>
+          </a:p>
+          <a:p>
+            <a:r>
+              <a:rPr lang="is-IS" sz="1350" dirty="0" smtClean="0">
+                <a:latin typeface="Monaco" charset="0"/>
+                <a:ea typeface="Monaco" charset="0"/>
+                <a:cs typeface="Monaco" charset="0"/>
+              </a:rPr>
+              <a:t>}</a:t>
+            </a:r>
+            <a:endParaRPr lang="is-IS" sz="1350" dirty="0">
+              <a:latin typeface="Monaco" charset="0"/>
+              <a:ea typeface="Monaco" charset="0"/>
+              <a:cs typeface="Monaco" charset="0"/>
+            </a:endParaRPr>
+          </a:p>
+        </p:txBody>
+      </p:sp>
+      <p:sp>
+        <p:nvSpPr>
+          <p:cNvPr id="9" name="TextBox 8"/>
+          <p:cNvSpPr txBox="1"/>
+          <p:nvPr/>
+        </p:nvSpPr>
+        <p:spPr>
+          <a:xfrm>
+            <a:off x="4300953" y="5252831"/>
+            <a:ext cx="435440" cy="369332"/>
+          </a:xfrm>
+          <a:prstGeom prst="rect">
+            <a:avLst/>
+          </a:prstGeom>
+          <a:noFill/>
+        </p:spPr>
+        <p:txBody>
+          <a:bodyPr wrap="none" rtlCol="0">
+            <a:spAutoFit/>
+          </a:bodyPr>
+          <a:lstStyle/>
+          <a:p>
+            <a:r>
+              <a:rPr lang="en-US" dirty="0"/>
+              <a:t>v</a:t>
+            </a:r>
+            <a:r>
+              <a:rPr lang="en-US" dirty="0" smtClean="0"/>
+              <a:t>s.</a:t>
+            </a:r>
+            <a:endParaRPr lang="en-US" dirty="0"/>
+          </a:p>
+        </p:txBody>
+      </p:sp>
+    </p:spTree>
+    <p:extLst>
+      <p:ext uri="{BB962C8B-B14F-4D97-AF65-F5344CB8AC3E}">
+        <p14:creationId xmlns:p14="http://schemas.microsoft.com/office/powerpoint/2010/main" val="533739408"/>
+      </p:ext>
+    </p:extLst>
+  </p:cSld>
+  <p:clrMapOvr>
+    <a:masterClrMapping/>
+  </p:clrMapOvr>
+</p:sld>
+</file>
+
+<file path=ppt/slides/slide12.xml><?xml version="1.0" encoding="utf-8"?>
+<p:sld xmlns:a="http://schemas.openxmlformats.org/drawingml/2006/main" xmlns:r="http://schemas.openxmlformats.org/officeDocument/2006/relationships" xmlns:p="http://schemas.openxmlformats.org/presentationml/2006/main">
+  <p:cSld>
+    <p:spTree>
+      <p:nvGrpSpPr>
+        <p:cNvPr id="1" name=""/>
+        <p:cNvGrpSpPr/>
+        <p:nvPr/>
+      </p:nvGrpSpPr>
+      <p:grpSpPr>
+        <a:xfrm>
+          <a:off x="0" y="0"/>
+          <a:ext cx="0" cy="0"/>
+          <a:chOff x="0" y="0"/>
+          <a:chExt cx="0" cy="0"/>
+        </a:xfrm>
+      </p:grpSpPr>
+      <p:sp>
+        <p:nvSpPr>
+          <p:cNvPr id="2" name="Title 1"/>
+          <p:cNvSpPr>
+            <a:spLocks noGrp="1"/>
+          </p:cNvSpPr>
+          <p:nvPr>
+            <p:ph type="title"/>
+          </p:nvPr>
+        </p:nvSpPr>
         <p:spPr>
           <a:xfrm>
             <a:off x="628650" y="365126"/>
@@ -3123,11 +3993,7 @@
             </a:r>
             <a:r>
               <a:rPr lang="en-US" dirty="0" smtClean="0"/>
-              <a:t> that provides all of the </a:t>
-            </a:r>
-            <a:r>
-              <a:rPr lang="en-US" dirty="0" smtClean="0"/>
-              <a:t>information</a:t>
+              <a:t> that provides all of the information</a:t>
             </a:r>
           </a:p>
           <a:p>
@@ -3528,7 +4394,7 @@
                 <a:ea typeface="Monaco" charset="0"/>
                 <a:cs typeface="Monaco" charset="0"/>
               </a:rPr>
-              <a:t>MPI_Request</a:t>
+              <a:t>int</a:t>
             </a:r>
             <a:r>
               <a:rPr lang="en-US" sz="1200" dirty="0">
@@ -3544,16 +4410,21 @@
                 <a:ea typeface="Monaco" charset="0"/>
                 <a:cs typeface="Monaco" charset="0"/>
               </a:rPr>
-              <a:t>reqs</a:t>
-            </a:r>
-            <a:r>
-              <a:rPr lang="en-US" sz="1200" dirty="0">
+              <a:t>errcode</a:t>
+            </a:r>
+            <a:r>
+              <a:rPr lang="en-US" sz="1200" dirty="0" smtClean="0">
                 <a:latin typeface="Monaco" charset="0"/>
                 <a:ea typeface="Monaco" charset="0"/>
                 <a:cs typeface="Monaco" charset="0"/>
               </a:rPr>
               <a:t>;</a:t>
             </a:r>
+            <a:endParaRPr lang="en-US" sz="1200" dirty="0" smtClean="0">
+              <a:latin typeface="Monaco" charset="0"/>
+              <a:ea typeface="Monaco" charset="0"/>
+              <a:cs typeface="Monaco" charset="0"/>
+            </a:endParaRPr>
           </a:p>
           <a:p>
             <a:pPr>
@@ -3562,15 +4433,70 @@
               </a:lnSpc>
             </a:pPr>
             <a:r>
+              <a:rPr lang="en-US" sz="1200" dirty="0">
+                <a:latin typeface="Monaco" charset="0"/>
+                <a:ea typeface="Monaco" charset="0"/>
+                <a:cs typeface="Monaco" charset="0"/>
+              </a:rPr>
+              <a:t> </a:t>
+            </a:r>
+            <a:r>
               <a:rPr lang="en-US" sz="1200" dirty="0" smtClean="0">
                 <a:latin typeface="Monaco" charset="0"/>
                 <a:ea typeface="Monaco" charset="0"/>
                 <a:cs typeface="Monaco" charset="0"/>
               </a:rPr>
+              <a:t> </a:t>
+            </a:r>
+            <a:r>
+              <a:rPr lang="en-US" sz="1200" dirty="0" err="1">
+                <a:latin typeface="Monaco" charset="0"/>
+                <a:ea typeface="Monaco" charset="0"/>
+                <a:cs typeface="Monaco" charset="0"/>
+              </a:rPr>
+              <a:t>MPI_Request</a:t>
+            </a:r>
+            <a:r>
+              <a:rPr lang="en-US" sz="1200" dirty="0">
+                <a:latin typeface="Monaco" charset="0"/>
+                <a:ea typeface="Monaco" charset="0"/>
+                <a:cs typeface="Monaco" charset="0"/>
+              </a:rPr>
+              <a:t> *</a:t>
+            </a:r>
+            <a:r>
+              <a:rPr lang="en-US" sz="1200" dirty="0" err="1">
+                <a:latin typeface="Monaco" charset="0"/>
+                <a:ea typeface="Monaco" charset="0"/>
+                <a:cs typeface="Monaco" charset="0"/>
+              </a:rPr>
+              <a:t>reqs</a:t>
+            </a:r>
+            <a:r>
+              <a:rPr lang="en-US" sz="1200" dirty="0" smtClean="0">
+                <a:latin typeface="Monaco" charset="0"/>
+                <a:ea typeface="Monaco" charset="0"/>
+                <a:cs typeface="Monaco" charset="0"/>
+              </a:rPr>
+              <a:t>;</a:t>
+            </a:r>
+          </a:p>
+          <a:p>
+            <a:pPr>
+              <a:lnSpc>
+                <a:spcPct val="150000"/>
+              </a:lnSpc>
+            </a:pPr>
+            <a:r>
+              <a:rPr lang="en-US" sz="1200" dirty="0" smtClean="0">
+                <a:latin typeface="Monaco" charset="0"/>
+                <a:ea typeface="Monaco" charset="0"/>
+                <a:cs typeface="Monaco" charset="0"/>
+              </a:rPr>
               <a:t>  </a:t>
             </a:r>
             <a:r>
-              <a:rPr lang="en-US" sz="1200" dirty="0" err="1">
+              <a:rPr lang="en-US" sz="1200" dirty="0" err="1" smtClean="0">
                 <a:latin typeface="Monaco" charset="0"/>
                 <a:ea typeface="Monaco" charset="0"/>
                 <a:cs typeface="Monaco" charset="0"/>
@@ -3578,7 +4504,7 @@
               <a:t>int</a:t>
             </a:r>
             <a:r>
-              <a:rPr lang="en-US" sz="1200" dirty="0">
+              <a:rPr lang="en-US" sz="1200" dirty="0" smtClean="0">
                 <a:latin typeface="Monaco" charset="0"/>
                 <a:ea typeface="Monaco" charset="0"/>
                 <a:cs typeface="Monaco" charset="0"/>
@@ -3614,7 +4540,7 @@
               </a:lnSpc>
             </a:pPr>
             <a:r>
-              <a:rPr lang="en-US" sz="1200" dirty="0">
+              <a:rPr lang="en-US" sz="1200" dirty="0" smtClean="0">
                 <a:latin typeface="Monaco" charset="0"/>
                 <a:ea typeface="Monaco" charset="0"/>
                 <a:cs typeface="Monaco" charset="0"/>
@@ -3622,20 +4548,12 @@
               <a:t>  </a:t>
             </a:r>
             <a:r>
-              <a:rPr lang="en-US" sz="1200" dirty="0" err="1">
-                <a:latin typeface="Monaco" charset="0"/>
-                <a:ea typeface="Monaco" charset="0"/>
-                <a:cs typeface="Monaco" charset="0"/>
-              </a:rPr>
-              <a:t>int</a:t>
-            </a:r>
-            <a:r>
-              <a:rPr lang="en-US" sz="1200" dirty="0">
-                <a:latin typeface="Monaco" charset="0"/>
-                <a:ea typeface="Monaco" charset="0"/>
-                <a:cs typeface="Monaco" charset="0"/>
-              </a:rPr>
-              <a:t> </a:t>
+              <a:rPr lang="en-US" sz="1200" dirty="0" err="1" smtClean="0">
+                <a:latin typeface="Monaco" charset="0"/>
+                <a:ea typeface="Monaco" charset="0"/>
+                <a:cs typeface="Monaco" charset="0"/>
+              </a:rPr>
+              <a:t>MPI_Status</a:t>
             </a:r>
             <a:r>
               <a:rPr lang="en-US" sz="1200" dirty="0" smtClean="0">
@@ -3643,23 +4561,7 @@
                 <a:ea typeface="Monaco" charset="0"/>
                 <a:cs typeface="Monaco" charset="0"/>
               </a:rPr>
-              <a:t>*</a:t>
-            </a:r>
-            <a:r>
-              <a:rPr lang="en-US" sz="1200" dirty="0" err="1" smtClean="0">
-                <a:latin typeface="Monaco" charset="0"/>
-                <a:ea typeface="Monaco" charset="0"/>
-                <a:cs typeface="Monaco" charset="0"/>
-              </a:rPr>
-              <a:t>errcodes</a:t>
-            </a:r>
-            <a:r>
-              <a:rPr lang="en-US" sz="1200" dirty="0" smtClean="0">
-                <a:latin typeface="Monaco" charset="0"/>
-                <a:ea typeface="Monaco" charset="0"/>
-                <a:cs typeface="Monaco" charset="0"/>
-              </a:rPr>
-              <a:t>;</a:t>
+              <a:t> *statuses;</a:t>
             </a:r>
           </a:p>
           <a:p>
@@ -3669,20 +4571,12 @@
               </a:lnSpc>
             </a:pPr>
             <a:r>
-              <a:rPr lang="en-US" sz="1200" dirty="0">
-                <a:latin typeface="Monaco" charset="0"/>
-                <a:ea typeface="Monaco" charset="0"/>
-                <a:cs typeface="Monaco" charset="0"/>
-              </a:rPr>
-              <a:t> </a:t>
-            </a:r>
-            <a:r>
               <a:rPr lang="en-US" sz="1200" dirty="0" smtClean="0">
                 <a:latin typeface="Monaco" charset="0"/>
                 <a:ea typeface="Monaco" charset="0"/>
                 <a:cs typeface="Monaco" charset="0"/>
               </a:rPr>
-              <a:t> </a:t>
+              <a:t>  void *</a:t>
             </a:r>
             <a:r>
               <a:rPr lang="en-US" sz="1200" dirty="0" err="1" smtClean="0">
@@ -3690,7 +4584,7 @@
                 <a:ea typeface="Monaco" charset="0"/>
                 <a:cs typeface="Monaco" charset="0"/>
               </a:rPr>
-              <a:t>int</a:t>
+              <a:t>user_context</a:t>
             </a:r>
             <a:r>
               <a:rPr lang="en-US" sz="1200" dirty="0" smtClean="0">
@@ -3698,7 +4592,22 @@
                 <a:ea typeface="Monaco" charset="0"/>
                 <a:cs typeface="Monaco" charset="0"/>
               </a:rPr>
-              <a:t> </a:t>
+              <a:t>; </a:t>
+            </a:r>
+            <a:br>
+              <a:rPr lang="en-US" sz="1200" dirty="0" smtClean="0">
+                <a:latin typeface="Monaco" charset="0"/>
+                <a:ea typeface="Monaco" charset="0"/>
+                <a:cs typeface="Monaco" charset="0"/>
+              </a:rPr>
+            </a:br>
+            <a:r>
+              <a:rPr lang="en-US" sz="1200" dirty="0" smtClean="0">
+                <a:latin typeface="Monaco" charset="0"/>
+                <a:ea typeface="Monaco" charset="0"/>
+                <a:cs typeface="Monaco" charset="0"/>
+              </a:rPr>
+              <a:t>} </a:t>
             </a:r>
             <a:r>
               <a:rPr lang="en-US" sz="1200" dirty="0" err="1" smtClean="0">
@@ -3706,7 +4615,7 @@
                 <a:ea typeface="Monaco" charset="0"/>
                 <a:cs typeface="Monaco" charset="0"/>
               </a:rPr>
-              <a:t>num_errcodes</a:t>
+              <a:t>MPI_Errhandler_args</a:t>
             </a:r>
             <a:r>
               <a:rPr lang="en-US" sz="1200" dirty="0" smtClean="0">
@@ -3721,68 +4630,6 @@
               <a:ea typeface="Monaco" charset="0"/>
               <a:cs typeface="Monaco" charset="0"/>
             </a:endParaRPr>
-          </a:p>
-          <a:p>
-            <a:pPr>
-              <a:lnSpc>
-                <a:spcPct val="150000"/>
-              </a:lnSpc>
-            </a:pPr>
-            <a:r>
-              <a:rPr lang="en-US" sz="1200" dirty="0">
-                <a:latin typeface="Monaco" charset="0"/>
-                <a:ea typeface="Monaco" charset="0"/>
-                <a:cs typeface="Monaco" charset="0"/>
-              </a:rPr>
-              <a:t>  void *</a:t>
-            </a:r>
-            <a:r>
-              <a:rPr lang="en-US" sz="1200" dirty="0" err="1">
-                <a:latin typeface="Monaco" charset="0"/>
-                <a:ea typeface="Monaco" charset="0"/>
-                <a:cs typeface="Monaco" charset="0"/>
-              </a:rPr>
-              <a:t>user_context</a:t>
-            </a:r>
-            <a:r>
-              <a:rPr lang="en-US" sz="1200" dirty="0">
-                <a:latin typeface="Monaco" charset="0"/>
-                <a:ea typeface="Monaco" charset="0"/>
-                <a:cs typeface="Monaco" charset="0"/>
-              </a:rPr>
-              <a:t>; </a:t>
-            </a:r>
-            <a:br>
-              <a:rPr lang="en-US" sz="1200" dirty="0">
-                <a:latin typeface="Monaco" charset="0"/>
-                <a:ea typeface="Monaco" charset="0"/>
-                <a:cs typeface="Monaco" charset="0"/>
-              </a:rPr>
-            </a:br>
-            <a:r>
-              <a:rPr lang="en-US" sz="1200" dirty="0">
-                <a:latin typeface="Monaco" charset="0"/>
-                <a:ea typeface="Monaco" charset="0"/>
-                <a:cs typeface="Monaco" charset="0"/>
-              </a:rPr>
-              <a:t>} </a:t>
-            </a:r>
-            <a:r>
-              <a:rPr lang="en-US" sz="1200" dirty="0" err="1">
-                <a:latin typeface="Monaco" charset="0"/>
-                <a:ea typeface="Monaco" charset="0"/>
-                <a:cs typeface="Monaco" charset="0"/>
-              </a:rPr>
-              <a:t>MPI_Errhandler_args</a:t>
-            </a:r>
-            <a:r>
-              <a:rPr lang="en-US" sz="1200" dirty="0">
-                <a:latin typeface="Monaco" charset="0"/>
-                <a:ea typeface="Monaco" charset="0"/>
-                <a:cs typeface="Monaco" charset="0"/>
-              </a:rPr>
-              <a:t>;</a:t>
-            </a:r>
           </a:p>
         </p:txBody>
       </p:sp>
@@ -3799,7 +4646,7 @@
 </p:sld>
 </file>
 
-<file path=ppt/slides/slide11.xml><?xml version="1.0" encoding="utf-8"?>
+<file path=ppt/slides/slide13.xml><?xml version="1.0" encoding="utf-8"?>
 <p:sld xmlns:a="http://schemas.openxmlformats.org/drawingml/2006/main" xmlns:r="http://schemas.openxmlformats.org/officeDocument/2006/relationships" xmlns:p="http://schemas.openxmlformats.org/presentationml/2006/main">
   <p:cSld>
     <p:spTree>
@@ -4058,9 +4905,51 @@
                 <a:ea typeface="Calibri" charset="0"/>
                 <a:cs typeface="Calibri" charset="0"/>
               </a:rPr>
-              <a:t>New type for error handler functions</a:t>
-            </a:r>
+              <a:t>New type for error handler </a:t>
+            </a:r>
+            <a:r>
+              <a:rPr lang="en-US" sz="2000" dirty="0" smtClean="0">
+                <a:latin typeface="Calibri" charset="0"/>
+                <a:ea typeface="Calibri" charset="0"/>
+                <a:cs typeface="Calibri" charset="0"/>
+              </a:rPr>
+              <a:t>functions</a:t>
+            </a:r>
+          </a:p>
+          <a:p>
+            <a:pPr lvl="1"/>
             <a:endParaRPr lang="en-US" sz="2000" dirty="0">
+              <a:latin typeface="Calibri" charset="0"/>
+              <a:ea typeface="Calibri" charset="0"/>
+              <a:cs typeface="Calibri" charset="0"/>
+            </a:endParaRPr>
+          </a:p>
+          <a:p>
+            <a:r>
+              <a:rPr lang="en-US" dirty="0" smtClean="0">
+                <a:latin typeface="Calibri" charset="0"/>
+                <a:ea typeface="Calibri" charset="0"/>
+                <a:cs typeface="Calibri" charset="0"/>
+              </a:rPr>
+              <a:t>We might be able to avoid changing the standard if we make the </a:t>
+            </a:r>
+            <a:r>
+              <a:rPr lang="en-US" dirty="0" err="1" smtClean="0">
+                <a:latin typeface="Calibri" charset="0"/>
+                <a:ea typeface="Calibri" charset="0"/>
+                <a:cs typeface="Calibri" charset="0"/>
+              </a:rPr>
+              <a:t>varargs</a:t>
+            </a:r>
+            <a:r>
+              <a:rPr lang="en-US" dirty="0" smtClean="0">
+                <a:latin typeface="Calibri" charset="0"/>
+                <a:ea typeface="Calibri" charset="0"/>
+                <a:cs typeface="Calibri" charset="0"/>
+              </a:rPr>
+              <a:t> more well defined.</a:t>
+            </a:r>
+            <a:endParaRPr lang="en-US" dirty="0">
               <a:latin typeface="Calibri" charset="0"/>
               <a:ea typeface="Calibri" charset="0"/>
               <a:cs typeface="Calibri" charset="0"/>
@@ -4231,7 +5120,7 @@
         <p:spPr/>
         <p:txBody>
           <a:bodyPr>
-            <a:normAutofit fontScale="92500" lnSpcReduction="20000"/>
+            <a:normAutofit fontScale="77500" lnSpcReduction="20000"/>
           </a:bodyPr>
           <a:lstStyle/>
           <a:p>
@@ -4243,16 +5132,11 @@
               <a:rPr lang="en-US" dirty="0" smtClean="0"/>
               <a:t>handler</a:t>
             </a:r>
-            <a:endParaRPr lang="en-US" dirty="0" smtClean="0"/>
-          </a:p>
-          <a:p>
-            <a:r>
-              <a:rPr lang="en-US" dirty="0" smtClean="0"/>
-              <a:t>Get </a:t>
-            </a:r>
-            <a:r>
-              <a:rPr lang="en-US" dirty="0" smtClean="0"/>
-              <a:t>multiple MPI objects in a single error handler</a:t>
+          </a:p>
+          <a:p>
+            <a:r>
+              <a:rPr lang="en-US" dirty="0" smtClean="0"/>
+              <a:t>Get multiple MPI objects in a single error handler</a:t>
             </a:r>
           </a:p>
           <a:p>
@@ -4308,7 +5192,41 @@
               <a:rPr lang="en-US" dirty="0" smtClean="0"/>
               <a:t>impacted</a:t>
             </a:r>
-            <a:endParaRPr lang="en-US" dirty="0" smtClean="0"/>
+          </a:p>
+          <a:p>
+            <a:r>
+              <a:rPr lang="en-US" dirty="0" smtClean="0">
+                <a:solidFill>
+                  <a:srgbClr val="FF0000"/>
+                </a:solidFill>
+              </a:rPr>
+              <a:t>Multiple error handlers attached to a single object</a:t>
+            </a:r>
+          </a:p>
+          <a:p>
+            <a:r>
+              <a:rPr lang="en-US" dirty="0" smtClean="0">
+                <a:solidFill>
+                  <a:srgbClr val="FF0000"/>
+                </a:solidFill>
+              </a:rPr>
+              <a:t>Clarify what you are allowed to do in an error handler</a:t>
+            </a:r>
+          </a:p>
+          <a:p>
+            <a:r>
+              <a:rPr lang="en-US" dirty="0" smtClean="0">
+                <a:solidFill>
+                  <a:srgbClr val="FF0000"/>
+                </a:solidFill>
+              </a:rPr>
+              <a:t>Location to long jump</a:t>
+            </a:r>
+            <a:endParaRPr lang="en-US" dirty="0" smtClean="0">
+              <a:solidFill>
+                <a:srgbClr val="FF0000"/>
+              </a:solidFill>
+            </a:endParaRPr>
           </a:p>
         </p:txBody>
       </p:sp>
@@ -4359,7 +5277,7 @@
           <a:p>
             <a:r>
               <a:rPr lang="en-US" dirty="0" smtClean="0"/>
-              <a:t>Return New Error Code From Error Handler</a:t>
+              <a:t>Location to Long jump</a:t>
             </a:r>
             <a:endParaRPr lang="en-US" dirty="0"/>
           </a:p>
@@ -4382,28 +5300,41 @@
           <a:p>
             <a:r>
               <a:rPr lang="en-US" dirty="0" smtClean="0"/>
-              <a:t>Make error codes INOUT instead of just IN</a:t>
-            </a:r>
-          </a:p>
-          <a:p>
-            <a:r>
-              <a:rPr lang="en-US" dirty="0" smtClean="0"/>
-              <a:t>Allows the error handler to handle/mask errors</a:t>
+              <a:t>Allow the error handler to tell MPI to long jump to a location after the function is completed</a:t>
+            </a:r>
+          </a:p>
+          <a:p>
+            <a:r>
+              <a:rPr lang="en-US" dirty="0" smtClean="0"/>
+              <a:t>How to decide which error handler’s long jump to use?</a:t>
+            </a:r>
+          </a:p>
+          <a:p>
+            <a:r>
+              <a:rPr lang="en-US" dirty="0" smtClean="0"/>
+              <a:t>How do we handle this if there are multiple threads?</a:t>
+            </a:r>
+          </a:p>
+          <a:p>
+            <a:r>
+              <a:rPr lang="en-US" dirty="0" smtClean="0"/>
+              <a:t>It might not be safe to long jump directly out of the error handler because you might be in MPI’s thread</a:t>
             </a:r>
           </a:p>
           <a:p>
             <a:pPr lvl="1"/>
             <a:r>
               <a:rPr lang="en-US" dirty="0" smtClean="0"/>
-              <a:t>If the incoming error class is MPI_ERR_MEM, we could free some memory, retry the call, and return MPI_SUCCESS.</a:t>
-            </a:r>
+              <a:t>In practice, we don’t think implementations do this, but the Standard doesn’t prohibit it. We could clarify this.</a:t>
+            </a:r>
+            <a:endParaRPr lang="en-US" dirty="0"/>
           </a:p>
         </p:txBody>
       </p:sp>
     </p:spTree>
     <p:extLst>
       <p:ext uri="{BB962C8B-B14F-4D97-AF65-F5344CB8AC3E}">
-        <p14:creationId xmlns:p14="http://schemas.microsoft.com/office/powerpoint/2010/main" val="1286057464"/>
+        <p14:creationId xmlns:p14="http://schemas.microsoft.com/office/powerpoint/2010/main" val="608693254"/>
       </p:ext>
     </p:extLst>
   </p:cSld>
@@ -4447,6 +5378,183 @@
           <a:p>
             <a:r>
               <a:rPr lang="en-US" dirty="0" smtClean="0"/>
+              <a:t>Multiple Error Handlers</a:t>
+            </a:r>
+            <a:endParaRPr lang="en-US" dirty="0"/>
+          </a:p>
+        </p:txBody>
+      </p:sp>
+      <p:sp>
+        <p:nvSpPr>
+          <p:cNvPr id="3" name="Content Placeholder 2"/>
+          <p:cNvSpPr>
+            <a:spLocks noGrp="1"/>
+          </p:cNvSpPr>
+          <p:nvPr>
+            <p:ph idx="1"/>
+          </p:nvPr>
+        </p:nvSpPr>
+        <p:spPr/>
+        <p:txBody>
+          <a:bodyPr/>
+          <a:lstStyle/>
+          <a:p>
+            <a:r>
+              <a:rPr lang="en-US" dirty="0" smtClean="0"/>
+              <a:t>Need to provide API to select the order of error handlers</a:t>
+            </a:r>
+          </a:p>
+          <a:p>
+            <a:pPr lvl="1"/>
+            <a:r>
+              <a:rPr lang="en-US" dirty="0" smtClean="0"/>
+              <a:t>Probably user’s responsibility to arbitrate</a:t>
+            </a:r>
+          </a:p>
+          <a:p>
+            <a:r>
+              <a:rPr lang="en-US" dirty="0" smtClean="0"/>
+              <a:t>This might be completely implementable in PMPI</a:t>
+            </a:r>
+            <a:endParaRPr lang="en-US" dirty="0"/>
+          </a:p>
+        </p:txBody>
+      </p:sp>
+    </p:spTree>
+    <p:extLst>
+      <p:ext uri="{BB962C8B-B14F-4D97-AF65-F5344CB8AC3E}">
+        <p14:creationId xmlns:p14="http://schemas.microsoft.com/office/powerpoint/2010/main" val="280403340"/>
+      </p:ext>
+    </p:extLst>
+  </p:cSld>
+  <p:clrMapOvr>
+    <a:masterClrMapping/>
+  </p:clrMapOvr>
+</p:sld>
+</file>
+
+<file path=ppt/slides/slide6.xml><?xml version="1.0" encoding="utf-8"?>
+<p:sld xmlns:a="http://schemas.openxmlformats.org/drawingml/2006/main" xmlns:r="http://schemas.openxmlformats.org/officeDocument/2006/relationships" xmlns:p="http://schemas.openxmlformats.org/presentationml/2006/main">
+  <p:cSld>
+    <p:spTree>
+      <p:nvGrpSpPr>
+        <p:cNvPr id="1" name=""/>
+        <p:cNvGrpSpPr/>
+        <p:nvPr/>
+      </p:nvGrpSpPr>
+      <p:grpSpPr>
+        <a:xfrm>
+          <a:off x="0" y="0"/>
+          <a:ext cx="0" cy="0"/>
+          <a:chOff x="0" y="0"/>
+          <a:chExt cx="0" cy="0"/>
+        </a:xfrm>
+      </p:grpSpPr>
+      <p:sp>
+        <p:nvSpPr>
+          <p:cNvPr id="2" name="Title 1"/>
+          <p:cNvSpPr>
+            <a:spLocks noGrp="1"/>
+          </p:cNvSpPr>
+          <p:nvPr>
+            <p:ph type="title"/>
+          </p:nvPr>
+        </p:nvSpPr>
+        <p:spPr/>
+        <p:txBody>
+          <a:bodyPr/>
+          <a:lstStyle/>
+          <a:p>
+            <a:r>
+              <a:rPr lang="en-US" dirty="0" smtClean="0"/>
+              <a:t>Return New Error Code From Error Handler</a:t>
+            </a:r>
+            <a:endParaRPr lang="en-US" dirty="0"/>
+          </a:p>
+        </p:txBody>
+      </p:sp>
+      <p:sp>
+        <p:nvSpPr>
+          <p:cNvPr id="3" name="Content Placeholder 2"/>
+          <p:cNvSpPr>
+            <a:spLocks noGrp="1"/>
+          </p:cNvSpPr>
+          <p:nvPr>
+            <p:ph idx="1"/>
+          </p:nvPr>
+        </p:nvSpPr>
+        <p:spPr/>
+        <p:txBody>
+          <a:bodyPr/>
+          <a:lstStyle/>
+          <a:p>
+            <a:r>
+              <a:rPr lang="en-US" dirty="0" smtClean="0"/>
+              <a:t>Make error codes INOUT instead of just IN</a:t>
+            </a:r>
+          </a:p>
+          <a:p>
+            <a:r>
+              <a:rPr lang="en-US" dirty="0" smtClean="0"/>
+              <a:t>Allows the error handler to handle/mask errors</a:t>
+            </a:r>
+          </a:p>
+          <a:p>
+            <a:pPr lvl="1"/>
+            <a:r>
+              <a:rPr lang="en-US" dirty="0" smtClean="0"/>
+              <a:t>If the incoming error class is MPI_ERR_MEM, we could free some memory, retry the call, and return MPI_SUCCESS.</a:t>
+            </a:r>
+          </a:p>
+        </p:txBody>
+      </p:sp>
+    </p:spTree>
+    <p:extLst>
+      <p:ext uri="{BB962C8B-B14F-4D97-AF65-F5344CB8AC3E}">
+        <p14:creationId xmlns:p14="http://schemas.microsoft.com/office/powerpoint/2010/main" val="1286057464"/>
+      </p:ext>
+    </p:extLst>
+  </p:cSld>
+  <p:clrMapOvr>
+    <a:masterClrMapping/>
+  </p:clrMapOvr>
+</p:sld>
+</file>
+
+<file path=ppt/slides/slide7.xml><?xml version="1.0" encoding="utf-8"?>
+<p:sld xmlns:a="http://schemas.openxmlformats.org/drawingml/2006/main" xmlns:r="http://schemas.openxmlformats.org/officeDocument/2006/relationships" xmlns:p="http://schemas.openxmlformats.org/presentationml/2006/main">
+  <p:cSld>
+    <p:spTree>
+      <p:nvGrpSpPr>
+        <p:cNvPr id="1" name=""/>
+        <p:cNvGrpSpPr/>
+        <p:nvPr/>
+      </p:nvGrpSpPr>
+      <p:grpSpPr>
+        <a:xfrm>
+          <a:off x="0" y="0"/>
+          <a:ext cx="0" cy="0"/>
+          <a:chOff x="0" y="0"/>
+          <a:chExt cx="0" cy="0"/>
+        </a:xfrm>
+      </p:grpSpPr>
+      <p:sp>
+        <p:nvSpPr>
+          <p:cNvPr id="2" name="Title 1"/>
+          <p:cNvSpPr>
+            <a:spLocks noGrp="1"/>
+          </p:cNvSpPr>
+          <p:nvPr>
+            <p:ph type="title"/>
+          </p:nvPr>
+        </p:nvSpPr>
+        <p:spPr/>
+        <p:txBody>
+          <a:bodyPr/>
+          <a:lstStyle/>
+          <a:p>
+            <a:r>
+              <a:rPr lang="en-US" dirty="0" smtClean="0"/>
               <a:t>Multiple Objects in a Single Call</a:t>
             </a:r>
             <a:endParaRPr lang="en-US" dirty="0"/>
@@ -4505,11 +5613,7 @@
             <a:pPr lvl="1"/>
             <a:r>
               <a:rPr lang="en-US" dirty="0" smtClean="0"/>
-              <a:t>Possibly only one and the rest get </a:t>
-            </a:r>
-            <a:r>
-              <a:rPr lang="en-US" dirty="0" smtClean="0"/>
-              <a:t>MPI_ERR_PENDING</a:t>
+              <a:t>Possibly only one and the rest get MPI_ERR_PENDING</a:t>
             </a:r>
           </a:p>
           <a:p>
@@ -4525,7 +5629,6 @@
               <a:rPr lang="en-US" dirty="0" smtClean="0"/>
               <a:t> things to work? Would a single call be better?</a:t>
             </a:r>
-            <a:endParaRPr lang="en-US" dirty="0" smtClean="0"/>
           </a:p>
         </p:txBody>
       </p:sp>
@@ -5015,7 +6118,7 @@
 </p:sld>
 </file>
 
-<file path=ppt/slides/slide6.xml><?xml version="1.0" encoding="utf-8"?>
+<file path=ppt/slides/slide8.xml><?xml version="1.0" encoding="utf-8"?>
 <p:sld xmlns:a="http://schemas.openxmlformats.org/drawingml/2006/main" xmlns:r="http://schemas.openxmlformats.org/officeDocument/2006/relationships" xmlns:p="http://schemas.openxmlformats.org/presentationml/2006/main">
   <p:cSld>
     <p:spTree>
@@ -5120,11 +6223,7 @@
             </a:r>
             <a:r>
               <a:rPr lang="en-US" dirty="0" smtClean="0"/>
-              <a:t> being passed in is sometimes not </a:t>
-            </a:r>
-            <a:r>
-              <a:rPr lang="en-US" dirty="0" smtClean="0"/>
-              <a:t>enough</a:t>
+              <a:t> being passed in is sometimes not enough</a:t>
             </a:r>
           </a:p>
           <a:p>
@@ -5148,7 +6247,6 @@
               <a:rPr lang="en-US" dirty="0" smtClean="0"/>
               <a:t>)</a:t>
             </a:r>
-            <a:endParaRPr lang="en-US" dirty="0" smtClean="0"/>
           </a:p>
           <a:p>
             <a:r>
@@ -5207,249 +6305,6 @@
     <p:extLst>
       <p:ext uri="{BB962C8B-B14F-4D97-AF65-F5344CB8AC3E}">
         <p14:creationId xmlns:p14="http://schemas.microsoft.com/office/powerpoint/2010/main" val="1789365167"/>
-      </p:ext>
-    </p:extLst>
-  </p:cSld>
-  <p:clrMapOvr>
-    <a:masterClrMapping/>
-  </p:clrMapOvr>
-</p:sld>
-</file>
-
-<file path=ppt/slides/slide7.xml><?xml version="1.0" encoding="utf-8"?>
-<p:sld xmlns:a="http://schemas.openxmlformats.org/drawingml/2006/main" xmlns:r="http://schemas.openxmlformats.org/officeDocument/2006/relationships" xmlns:p="http://schemas.openxmlformats.org/presentationml/2006/main">
-  <p:cSld>
-    <p:spTree>
-      <p:nvGrpSpPr>
-        <p:cNvPr id="1" name=""/>
-        <p:cNvGrpSpPr/>
-        <p:nvPr/>
-      </p:nvGrpSpPr>
-      <p:grpSpPr>
-        <a:xfrm>
-          <a:off x="0" y="0"/>
-          <a:ext cx="0" cy="0"/>
-          <a:chOff x="0" y="0"/>
-          <a:chExt cx="0" cy="0"/>
-        </a:xfrm>
-      </p:grpSpPr>
-      <p:sp>
-        <p:nvSpPr>
-          <p:cNvPr id="2" name="Title 1"/>
-          <p:cNvSpPr>
-            <a:spLocks noGrp="1"/>
-          </p:cNvSpPr>
-          <p:nvPr>
-            <p:ph type="title"/>
-          </p:nvPr>
-        </p:nvSpPr>
-        <p:spPr/>
-        <p:txBody>
-          <a:bodyPr/>
-          <a:lstStyle/>
-          <a:p>
-            <a:r>
-              <a:rPr lang="en-US" dirty="0" smtClean="0"/>
-              <a:t>Allow the application to provide context</a:t>
-            </a:r>
-            <a:endParaRPr lang="en-US" dirty="0"/>
-          </a:p>
-        </p:txBody>
-      </p:sp>
-      <p:sp>
-        <p:nvSpPr>
-          <p:cNvPr id="4" name="Rectangle 3"/>
-          <p:cNvSpPr/>
-          <p:nvPr/>
-        </p:nvSpPr>
-        <p:spPr>
-          <a:xfrm>
-            <a:off x="628650" y="3648891"/>
-            <a:ext cx="7809956" cy="1576252"/>
-          </a:xfrm>
-          <a:prstGeom prst="rect">
-            <a:avLst/>
-          </a:prstGeom>
-        </p:spPr>
-        <p:style>
-          <a:lnRef idx="1">
-            <a:schemeClr val="accent4"/>
-          </a:lnRef>
-          <a:fillRef idx="2">
-            <a:schemeClr val="accent4"/>
-          </a:fillRef>
-          <a:effectRef idx="1">
-            <a:schemeClr val="accent4"/>
-          </a:effectRef>
-          <a:fontRef idx="minor">
-            <a:schemeClr val="dk1"/>
-          </a:fontRef>
-        </p:style>
-        <p:txBody>
-          <a:bodyPr rtlCol="0" anchor="ctr"/>
-          <a:lstStyle/>
-          <a:p>
-            <a:pPr algn="ctr"/>
-            <a:endParaRPr lang="en-US"/>
-          </a:p>
-        </p:txBody>
-      </p:sp>
-      <p:sp>
-        <p:nvSpPr>
-          <p:cNvPr id="3" name="Content Placeholder 2"/>
-          <p:cNvSpPr>
-            <a:spLocks noGrp="1"/>
-          </p:cNvSpPr>
-          <p:nvPr>
-            <p:ph idx="1"/>
-          </p:nvPr>
-        </p:nvSpPr>
-        <p:spPr/>
-        <p:txBody>
-          <a:bodyPr/>
-          <a:lstStyle/>
-          <a:p>
-            <a:r>
-              <a:rPr lang="en-US" dirty="0" smtClean="0"/>
-              <a:t>Allow the application to provide some sort of per –object context to the error handler</a:t>
-            </a:r>
-          </a:p>
-          <a:p>
-            <a:r>
-              <a:rPr lang="en-US" dirty="0" smtClean="0"/>
-              <a:t>We’d add something to the function to set the error handler with a void *context</a:t>
-            </a:r>
-          </a:p>
-          <a:p>
-            <a:r>
-              <a:rPr lang="en-US" dirty="0" smtClean="0"/>
-              <a:t>Might already get this via the info object on the communication </a:t>
-            </a:r>
-            <a:r>
-              <a:rPr lang="en-US" dirty="0" smtClean="0"/>
-              <a:t>object</a:t>
-            </a:r>
-          </a:p>
-          <a:p>
-            <a:pPr lvl="1"/>
-            <a:r>
-              <a:rPr lang="en-US" dirty="0" smtClean="0"/>
-              <a:t>George? Brought this up on the con call, but what is the idea here? Strings only?</a:t>
-            </a:r>
-            <a:endParaRPr lang="en-US" dirty="0"/>
-          </a:p>
-        </p:txBody>
-      </p:sp>
-    </p:spTree>
-    <p:extLst>
-      <p:ext uri="{BB962C8B-B14F-4D97-AF65-F5344CB8AC3E}">
-        <p14:creationId xmlns:p14="http://schemas.microsoft.com/office/powerpoint/2010/main" val="1196468407"/>
-      </p:ext>
-    </p:extLst>
-  </p:cSld>
-  <p:clrMapOvr>
-    <a:masterClrMapping/>
-  </p:clrMapOvr>
-</p:sld>
-</file>
-
-<file path=ppt/slides/slide8.xml><?xml version="1.0" encoding="utf-8"?>
-<p:sld xmlns:a="http://schemas.openxmlformats.org/drawingml/2006/main" xmlns:r="http://schemas.openxmlformats.org/officeDocument/2006/relationships" xmlns:p="http://schemas.openxmlformats.org/presentationml/2006/main">
-  <p:cSld>
-    <p:spTree>
-      <p:nvGrpSpPr>
-        <p:cNvPr id="1" name=""/>
-        <p:cNvGrpSpPr/>
-        <p:nvPr/>
-      </p:nvGrpSpPr>
-      <p:grpSpPr>
-        <a:xfrm>
-          <a:off x="0" y="0"/>
-          <a:ext cx="0" cy="0"/>
-          <a:chOff x="0" y="0"/>
-          <a:chExt cx="0" cy="0"/>
-        </a:xfrm>
-      </p:grpSpPr>
-      <p:sp>
-        <p:nvSpPr>
-          <p:cNvPr id="2" name="Title 1"/>
-          <p:cNvSpPr>
-            <a:spLocks noGrp="1"/>
-          </p:cNvSpPr>
-          <p:nvPr>
-            <p:ph type="title"/>
-          </p:nvPr>
-        </p:nvSpPr>
-        <p:spPr/>
-        <p:txBody>
-          <a:bodyPr/>
-          <a:lstStyle/>
-          <a:p>
-            <a:r>
-              <a:rPr lang="en-US" dirty="0" smtClean="0"/>
-              <a:t>Pick Error Classes to Handle</a:t>
-            </a:r>
-            <a:endParaRPr lang="en-US" dirty="0"/>
-          </a:p>
-        </p:txBody>
-      </p:sp>
-      <p:sp>
-        <p:nvSpPr>
-          <p:cNvPr id="3" name="Content Placeholder 2"/>
-          <p:cNvSpPr>
-            <a:spLocks noGrp="1"/>
-          </p:cNvSpPr>
-          <p:nvPr>
-            <p:ph idx="1"/>
-          </p:nvPr>
-        </p:nvSpPr>
-        <p:spPr/>
-        <p:txBody>
-          <a:bodyPr/>
-          <a:lstStyle/>
-          <a:p>
-            <a:r>
-              <a:rPr lang="en-US" dirty="0" smtClean="0"/>
-              <a:t>Add array of error classes to the </a:t>
-            </a:r>
-            <a:r>
-              <a:rPr lang="en-US" dirty="0" err="1" smtClean="0"/>
-              <a:t>MPI_Errhandler_set</a:t>
-            </a:r>
-            <a:r>
-              <a:rPr lang="en-US" dirty="0" smtClean="0"/>
-              <a:t> function</a:t>
-            </a:r>
-          </a:p>
-          <a:p>
-            <a:r>
-              <a:rPr lang="en-US" dirty="0" smtClean="0"/>
-              <a:t>Only call this error handler when an error class in the array is raised</a:t>
-            </a:r>
-          </a:p>
-          <a:p>
-            <a:r>
-              <a:rPr lang="en-US" dirty="0" smtClean="0"/>
-              <a:t>Have ”generic” error handler for all other </a:t>
-            </a:r>
-            <a:r>
-              <a:rPr lang="en-US" dirty="0" smtClean="0"/>
-              <a:t>cases</a:t>
-            </a:r>
-          </a:p>
-          <a:p>
-            <a:r>
-              <a:rPr lang="en-US" dirty="0" smtClean="0"/>
-              <a:t>Add some predefined value for MPI_ALL_ERROR_CLASSES</a:t>
-            </a:r>
-            <a:endParaRPr lang="en-US" dirty="0"/>
-          </a:p>
-        </p:txBody>
-      </p:sp>
-    </p:spTree>
-    <p:extLst>
-      <p:ext uri="{BB962C8B-B14F-4D97-AF65-F5344CB8AC3E}">
-        <p14:creationId xmlns:p14="http://schemas.microsoft.com/office/powerpoint/2010/main" val="1148874328"/>
       </p:ext>
     </p:extLst>
   </p:cSld>
@@ -5493,7 +6348,7 @@
           <a:p>
             <a:r>
               <a:rPr lang="en-US" dirty="0" smtClean="0"/>
-              <a:t>Multiple Error Handler Types Problem</a:t>
+              <a:t>Allow the application to provide context</a:t>
             </a:r>
             <a:endParaRPr lang="en-US" dirty="0"/>
           </a:p>
@@ -5501,394 +6356,27 @@
       </p:sp>
       <p:sp>
         <p:nvSpPr>
-          <p:cNvPr id="3" name="Content Placeholder 2"/>
-          <p:cNvSpPr>
-            <a:spLocks noGrp="1"/>
-          </p:cNvSpPr>
-          <p:nvPr>
-            <p:ph idx="1"/>
-          </p:nvPr>
+          <p:cNvPr id="4" name="Rectangle 3"/>
+          <p:cNvSpPr/>
+          <p:nvPr/>
         </p:nvSpPr>
         <p:spPr>
           <a:xfrm>
-            <a:off x="628650" y="1669681"/>
-            <a:ext cx="7886700" cy="2332572"/>
-          </a:xfrm>
-        </p:spPr>
-        <p:txBody>
-          <a:bodyPr>
-            <a:normAutofit fontScale="92500" lnSpcReduction="10000"/>
-          </a:bodyPr>
-          <a:lstStyle/>
-          <a:p>
-            <a:r>
-              <a:rPr lang="en-US" dirty="0" smtClean="0"/>
-              <a:t>Currently have </a:t>
-            </a:r>
-            <a:r>
-              <a:rPr lang="en-US" dirty="0" smtClean="0"/>
-              <a:t>to create a bunch of </a:t>
-            </a:r>
-            <a:r>
-              <a:rPr lang="en-US" dirty="0" smtClean="0"/>
-              <a:t>functions </a:t>
-            </a:r>
-            <a:r>
-              <a:rPr lang="en-US" dirty="0" smtClean="0"/>
-              <a:t>even when they all often do the same </a:t>
-            </a:r>
-            <a:r>
-              <a:rPr lang="en-US" dirty="0" smtClean="0"/>
-              <a:t>thing</a:t>
-            </a:r>
-            <a:endParaRPr lang="en-US" dirty="0" smtClean="0"/>
-          </a:p>
-          <a:p>
-            <a:pPr lvl="1"/>
-            <a:r>
-              <a:rPr lang="en-US" dirty="0" smtClean="0"/>
-              <a:t>Callback functions have object types built into the </a:t>
-            </a:r>
-            <a:r>
-              <a:rPr lang="en-US" dirty="0" smtClean="0"/>
-              <a:t>signatures</a:t>
-            </a:r>
-          </a:p>
-          <a:p>
-            <a:r>
-              <a:rPr lang="en-US" dirty="0" smtClean="0"/>
-              <a:t>Multiple types == better code reuse</a:t>
-            </a:r>
-            <a:endParaRPr lang="en-US" dirty="0" smtClean="0"/>
-          </a:p>
-          <a:p>
-            <a:r>
-              <a:rPr lang="en-US" dirty="0" smtClean="0"/>
-              <a:t>Makes using a single error handler function for generic handling more </a:t>
-            </a:r>
-            <a:r>
-              <a:rPr lang="en-US" dirty="0" smtClean="0"/>
-              <a:t>complex</a:t>
-            </a:r>
-          </a:p>
-        </p:txBody>
-      </p:sp>
-      <p:sp>
-        <p:nvSpPr>
-          <p:cNvPr id="4" name="TextBox 3"/>
-          <p:cNvSpPr txBox="1"/>
-          <p:nvPr/>
-        </p:nvSpPr>
-        <p:spPr>
-          <a:xfrm>
-            <a:off x="324420" y="4241473"/>
-            <a:ext cx="3542189" cy="715581"/>
+            <a:off x="628650" y="3648891"/>
+            <a:ext cx="7809956" cy="1576252"/>
           </a:xfrm>
           <a:prstGeom prst="rect">
             <a:avLst/>
           </a:prstGeom>
-          <a:ln w="28575"/>
         </p:spPr>
         <p:style>
-          <a:lnRef idx="2">
-            <a:schemeClr val="accent1"/>
-          </a:lnRef>
-          <a:fillRef idx="1">
-            <a:schemeClr val="lt1"/>
-          </a:fillRef>
-          <a:effectRef idx="0">
-            <a:schemeClr val="accent1"/>
-          </a:effectRef>
-          <a:fontRef idx="minor">
-            <a:schemeClr val="dk1"/>
-          </a:fontRef>
-        </p:style>
-        <p:txBody>
-          <a:bodyPr wrap="square" rtlCol="0" anchor="ctr">
-            <a:spAutoFit/>
-          </a:bodyPr>
-          <a:lstStyle/>
-          <a:p>
-            <a:r>
-              <a:rPr lang="en-US" sz="1350" dirty="0" err="1">
-                <a:latin typeface="Monaco" charset="0"/>
-                <a:ea typeface="Monaco" charset="0"/>
-                <a:cs typeface="Monaco" charset="0"/>
-              </a:rPr>
-              <a:t>MPI_Comm_errhandler_fn</a:t>
-            </a:r>
-            <a:r>
-              <a:rPr lang="en-US" sz="1350" dirty="0">
-                <a:latin typeface="Monaco" charset="0"/>
-                <a:ea typeface="Monaco" charset="0"/>
-                <a:cs typeface="Monaco" charset="0"/>
-              </a:rPr>
-              <a:t>(</a:t>
-            </a:r>
-            <a:r>
-              <a:rPr lang="en-US" sz="1350" dirty="0" err="1">
-                <a:latin typeface="Monaco" charset="0"/>
-                <a:ea typeface="Monaco" charset="0"/>
-                <a:cs typeface="Monaco" charset="0"/>
-              </a:rPr>
-              <a:t>MPI_Comm</a:t>
-            </a:r>
-            <a:r>
-              <a:rPr lang="en-US" sz="1350" dirty="0">
-                <a:latin typeface="Monaco" charset="0"/>
-                <a:ea typeface="Monaco" charset="0"/>
-                <a:cs typeface="Monaco" charset="0"/>
-              </a:rPr>
-              <a:t> *</a:t>
-            </a:r>
-            <a:r>
-              <a:rPr lang="en-US" sz="1350" dirty="0" err="1">
-                <a:latin typeface="Monaco" charset="0"/>
-                <a:ea typeface="Monaco" charset="0"/>
-                <a:cs typeface="Monaco" charset="0"/>
-              </a:rPr>
-              <a:t>comm</a:t>
-            </a:r>
-            <a:r>
-              <a:rPr lang="en-US" sz="1350" dirty="0">
-                <a:latin typeface="Monaco" charset="0"/>
-                <a:ea typeface="Monaco" charset="0"/>
-                <a:cs typeface="Monaco" charset="0"/>
-              </a:rPr>
-              <a:t>, </a:t>
-            </a:r>
-            <a:r>
-              <a:rPr lang="en-US" sz="1350" dirty="0" err="1">
-                <a:latin typeface="Monaco" charset="0"/>
-                <a:ea typeface="Monaco" charset="0"/>
-                <a:cs typeface="Monaco" charset="0"/>
-              </a:rPr>
-              <a:t>int</a:t>
-            </a:r>
-            <a:r>
-              <a:rPr lang="en-US" sz="1350" dirty="0">
-                <a:latin typeface="Monaco" charset="0"/>
-                <a:ea typeface="Monaco" charset="0"/>
-                <a:cs typeface="Monaco" charset="0"/>
-              </a:rPr>
-              <a:t> *</a:t>
-            </a:r>
-            <a:r>
-              <a:rPr lang="en-US" sz="1350" dirty="0" err="1">
-                <a:latin typeface="Monaco" charset="0"/>
-                <a:ea typeface="Monaco" charset="0"/>
-                <a:cs typeface="Monaco" charset="0"/>
-              </a:rPr>
-              <a:t>errcode</a:t>
-            </a:r>
-            <a:r>
-              <a:rPr lang="en-US" sz="1350" dirty="0">
-                <a:latin typeface="Monaco" charset="0"/>
-                <a:ea typeface="Monaco" charset="0"/>
-                <a:cs typeface="Monaco" charset="0"/>
-              </a:rPr>
-              <a:t>, </a:t>
-            </a:r>
-            <a:r>
-              <a:rPr lang="is-IS" sz="1350" dirty="0">
-                <a:latin typeface="Monaco" charset="0"/>
-                <a:ea typeface="Monaco" charset="0"/>
-                <a:cs typeface="Monaco" charset="0"/>
-              </a:rPr>
-              <a:t>…) {</a:t>
-            </a:r>
-          </a:p>
-          <a:p>
-            <a:r>
-              <a:rPr lang="is-IS" sz="1350" dirty="0">
-                <a:latin typeface="Monaco" charset="0"/>
-                <a:ea typeface="Monaco" charset="0"/>
-                <a:cs typeface="Monaco" charset="0"/>
-              </a:rPr>
-              <a:t>    cleanup_fn</a:t>
-            </a:r>
-            <a:r>
-              <a:rPr lang="is-IS" sz="1350" dirty="0" smtClean="0">
-                <a:latin typeface="Monaco" charset="0"/>
-                <a:ea typeface="Monaco" charset="0"/>
-                <a:cs typeface="Monaco" charset="0"/>
-              </a:rPr>
-              <a:t>(); }</a:t>
-            </a:r>
-            <a:endParaRPr lang="en-US" sz="1350" dirty="0">
-              <a:latin typeface="Monaco" charset="0"/>
-              <a:ea typeface="Monaco" charset="0"/>
-              <a:cs typeface="Monaco" charset="0"/>
-            </a:endParaRPr>
-          </a:p>
-        </p:txBody>
-      </p:sp>
-      <p:sp>
-        <p:nvSpPr>
-          <p:cNvPr id="5" name="TextBox 4"/>
-          <p:cNvSpPr txBox="1"/>
-          <p:nvPr/>
-        </p:nvSpPr>
-        <p:spPr>
-          <a:xfrm>
-            <a:off x="324420" y="5085676"/>
-            <a:ext cx="3542190" cy="715581"/>
-          </a:xfrm>
-          <a:prstGeom prst="rect">
-            <a:avLst/>
-          </a:prstGeom>
-          <a:ln w="28575">
-            <a:solidFill>
-              <a:srgbClr val="7030A0"/>
-            </a:solidFill>
-          </a:ln>
-        </p:spPr>
-        <p:style>
-          <a:lnRef idx="2">
-            <a:schemeClr val="accent2"/>
-          </a:lnRef>
-          <a:fillRef idx="1">
-            <a:schemeClr val="lt1"/>
-          </a:fillRef>
-          <a:effectRef idx="0">
-            <a:schemeClr val="accent2"/>
-          </a:effectRef>
-          <a:fontRef idx="minor">
-            <a:schemeClr val="dk1"/>
-          </a:fontRef>
-        </p:style>
-        <p:txBody>
-          <a:bodyPr wrap="square" rtlCol="0" anchor="ctr">
-            <a:spAutoFit/>
-          </a:bodyPr>
-          <a:lstStyle/>
-          <a:p>
-            <a:r>
-              <a:rPr lang="en-US" sz="1350" dirty="0" err="1">
-                <a:latin typeface="Monaco" charset="0"/>
-                <a:ea typeface="Monaco" charset="0"/>
-                <a:cs typeface="Monaco" charset="0"/>
-              </a:rPr>
-              <a:t>MPI_Win_errhandler_fn</a:t>
-            </a:r>
-            <a:r>
-              <a:rPr lang="en-US" sz="1350" dirty="0">
-                <a:latin typeface="Monaco" charset="0"/>
-                <a:ea typeface="Monaco" charset="0"/>
-                <a:cs typeface="Monaco" charset="0"/>
-              </a:rPr>
-              <a:t>(</a:t>
-            </a:r>
-            <a:r>
-              <a:rPr lang="en-US" sz="1350" dirty="0" err="1">
-                <a:latin typeface="Monaco" charset="0"/>
-                <a:ea typeface="Monaco" charset="0"/>
-                <a:cs typeface="Monaco" charset="0"/>
-              </a:rPr>
-              <a:t>MPI_Win</a:t>
-            </a:r>
-            <a:r>
-              <a:rPr lang="en-US" sz="1350" dirty="0">
-                <a:latin typeface="Monaco" charset="0"/>
-                <a:ea typeface="Monaco" charset="0"/>
-                <a:cs typeface="Monaco" charset="0"/>
-              </a:rPr>
-              <a:t> *win, </a:t>
-            </a:r>
-            <a:r>
-              <a:rPr lang="en-US" sz="1350" dirty="0" err="1">
-                <a:latin typeface="Monaco" charset="0"/>
-                <a:ea typeface="Monaco" charset="0"/>
-                <a:cs typeface="Monaco" charset="0"/>
-              </a:rPr>
-              <a:t>int</a:t>
-            </a:r>
-            <a:r>
-              <a:rPr lang="en-US" sz="1350" dirty="0">
-                <a:latin typeface="Monaco" charset="0"/>
-                <a:ea typeface="Monaco" charset="0"/>
-                <a:cs typeface="Monaco" charset="0"/>
-              </a:rPr>
-              <a:t> *</a:t>
-            </a:r>
-            <a:r>
-              <a:rPr lang="en-US" sz="1350" dirty="0" err="1">
-                <a:latin typeface="Monaco" charset="0"/>
-                <a:ea typeface="Monaco" charset="0"/>
-                <a:cs typeface="Monaco" charset="0"/>
-              </a:rPr>
-              <a:t>errcode</a:t>
-            </a:r>
-            <a:r>
-              <a:rPr lang="en-US" sz="1350" dirty="0">
-                <a:latin typeface="Monaco" charset="0"/>
-                <a:ea typeface="Monaco" charset="0"/>
-                <a:cs typeface="Monaco" charset="0"/>
-              </a:rPr>
-              <a:t>, </a:t>
-            </a:r>
-            <a:r>
-              <a:rPr lang="is-IS" sz="1350" dirty="0">
-                <a:latin typeface="Monaco" charset="0"/>
-                <a:ea typeface="Monaco" charset="0"/>
-                <a:cs typeface="Monaco" charset="0"/>
-              </a:rPr>
-              <a:t>…) {</a:t>
-            </a:r>
-          </a:p>
-          <a:p>
-            <a:r>
-              <a:rPr lang="is-IS" sz="1350" dirty="0">
-                <a:latin typeface="Monaco" charset="0"/>
-                <a:ea typeface="Monaco" charset="0"/>
-                <a:cs typeface="Monaco" charset="0"/>
-              </a:rPr>
-              <a:t>    cleanup_fn</a:t>
-            </a:r>
-            <a:r>
-              <a:rPr lang="is-IS" sz="1350" dirty="0" smtClean="0">
-                <a:latin typeface="Monaco" charset="0"/>
-                <a:ea typeface="Monaco" charset="0"/>
-                <a:cs typeface="Monaco" charset="0"/>
-              </a:rPr>
-              <a:t>(); }</a:t>
-            </a:r>
-            <a:endParaRPr lang="en-US" sz="1350" dirty="0">
-              <a:latin typeface="Monaco" charset="0"/>
-              <a:ea typeface="Monaco" charset="0"/>
-              <a:cs typeface="Monaco" charset="0"/>
-            </a:endParaRPr>
-          </a:p>
-        </p:txBody>
-      </p:sp>
-      <p:sp>
-        <p:nvSpPr>
-          <p:cNvPr id="6" name="TextBox 5"/>
-          <p:cNvSpPr txBox="1"/>
-          <p:nvPr/>
-        </p:nvSpPr>
-        <p:spPr>
-          <a:xfrm>
-            <a:off x="324420" y="5925639"/>
-            <a:ext cx="3542191" cy="715581"/>
-          </a:xfrm>
-          <a:prstGeom prst="rect">
-            <a:avLst/>
-          </a:prstGeom>
-          <a:ln w="28575">
-            <a:solidFill>
-              <a:schemeClr val="accent2"/>
-            </a:solidFill>
-          </a:ln>
-        </p:spPr>
-        <p:style>
-          <a:lnRef idx="2">
+          <a:lnRef idx="1">
             <a:schemeClr val="accent4"/>
           </a:lnRef>
-          <a:fillRef idx="1">
-            <a:schemeClr val="lt1"/>
+          <a:fillRef idx="2">
+            <a:schemeClr val="accent4"/>
           </a:fillRef>
-          <a:effectRef idx="0">
+          <a:effectRef idx="1">
             <a:schemeClr val="accent4"/>
           </a:effectRef>
           <a:fontRef idx="minor">
@@ -5896,325 +6384,62 @@
           </a:fontRef>
         </p:style>
         <p:txBody>
-          <a:bodyPr wrap="square" rtlCol="0" anchor="ctr">
-            <a:spAutoFit/>
-          </a:bodyPr>
-          <a:lstStyle/>
-          <a:p>
-            <a:r>
-              <a:rPr lang="en-US" sz="1350" dirty="0" err="1">
-                <a:latin typeface="Monaco" charset="0"/>
-                <a:ea typeface="Monaco" charset="0"/>
-                <a:cs typeface="Monaco" charset="0"/>
-              </a:rPr>
-              <a:t>MPI_Comm_errhandler_fn</a:t>
-            </a:r>
-            <a:r>
-              <a:rPr lang="en-US" sz="1350" dirty="0">
-                <a:latin typeface="Monaco" charset="0"/>
-                <a:ea typeface="Monaco" charset="0"/>
-                <a:cs typeface="Monaco" charset="0"/>
-              </a:rPr>
-              <a:t>(</a:t>
-            </a:r>
-            <a:r>
-              <a:rPr lang="en-US" sz="1350" dirty="0" err="1">
-                <a:latin typeface="Monaco" charset="0"/>
-                <a:ea typeface="Monaco" charset="0"/>
-                <a:cs typeface="Monaco" charset="0"/>
-              </a:rPr>
-              <a:t>MPI_File</a:t>
-            </a:r>
-            <a:r>
-              <a:rPr lang="en-US" sz="1350" dirty="0">
-                <a:latin typeface="Monaco" charset="0"/>
-                <a:ea typeface="Monaco" charset="0"/>
-                <a:cs typeface="Monaco" charset="0"/>
-              </a:rPr>
-              <a:t> *file, </a:t>
-            </a:r>
-            <a:r>
-              <a:rPr lang="en-US" sz="1350" dirty="0" err="1">
-                <a:latin typeface="Monaco" charset="0"/>
-                <a:ea typeface="Monaco" charset="0"/>
-                <a:cs typeface="Monaco" charset="0"/>
-              </a:rPr>
-              <a:t>int</a:t>
-            </a:r>
-            <a:r>
-              <a:rPr lang="en-US" sz="1350" dirty="0">
-                <a:latin typeface="Monaco" charset="0"/>
-                <a:ea typeface="Monaco" charset="0"/>
-                <a:cs typeface="Monaco" charset="0"/>
-              </a:rPr>
-              <a:t> *</a:t>
-            </a:r>
-            <a:r>
-              <a:rPr lang="en-US" sz="1350" dirty="0" err="1">
-                <a:latin typeface="Monaco" charset="0"/>
-                <a:ea typeface="Monaco" charset="0"/>
-                <a:cs typeface="Monaco" charset="0"/>
-              </a:rPr>
-              <a:t>errcode</a:t>
-            </a:r>
-            <a:r>
-              <a:rPr lang="en-US" sz="1350" dirty="0">
-                <a:latin typeface="Monaco" charset="0"/>
-                <a:ea typeface="Monaco" charset="0"/>
-                <a:cs typeface="Monaco" charset="0"/>
-              </a:rPr>
-              <a:t>, </a:t>
-            </a:r>
-            <a:r>
-              <a:rPr lang="is-IS" sz="1350" dirty="0">
-                <a:latin typeface="Monaco" charset="0"/>
-                <a:ea typeface="Monaco" charset="0"/>
-                <a:cs typeface="Monaco" charset="0"/>
-              </a:rPr>
-              <a:t>…) {</a:t>
-            </a:r>
-          </a:p>
-          <a:p>
-            <a:r>
-              <a:rPr lang="is-IS" sz="1350" dirty="0">
-                <a:latin typeface="Monaco" charset="0"/>
-                <a:ea typeface="Monaco" charset="0"/>
-                <a:cs typeface="Monaco" charset="0"/>
-              </a:rPr>
-              <a:t>    cleanup_fn</a:t>
-            </a:r>
-            <a:r>
-              <a:rPr lang="is-IS" sz="1350" dirty="0" smtClean="0">
-                <a:latin typeface="Monaco" charset="0"/>
-                <a:ea typeface="Monaco" charset="0"/>
-                <a:cs typeface="Monaco" charset="0"/>
-              </a:rPr>
-              <a:t>(); }</a:t>
-            </a:r>
-            <a:endParaRPr lang="is-IS" sz="1350" dirty="0">
-              <a:latin typeface="Monaco" charset="0"/>
-              <a:ea typeface="Monaco" charset="0"/>
-              <a:cs typeface="Monaco" charset="0"/>
-            </a:endParaRPr>
-          </a:p>
-        </p:txBody>
-      </p:sp>
-      <p:sp>
-        <p:nvSpPr>
-          <p:cNvPr id="8" name="TextBox 7"/>
-          <p:cNvSpPr txBox="1"/>
-          <p:nvPr/>
-        </p:nvSpPr>
-        <p:spPr>
-          <a:xfrm>
-            <a:off x="5240405" y="4566303"/>
-            <a:ext cx="3542191" cy="1754326"/>
-          </a:xfrm>
-          <a:prstGeom prst="rect">
-            <a:avLst/>
-          </a:prstGeom>
-          <a:ln w="28575">
-            <a:solidFill>
-              <a:schemeClr val="accent6"/>
-            </a:solidFill>
-          </a:ln>
-        </p:spPr>
-        <p:style>
-          <a:lnRef idx="2">
-            <a:schemeClr val="accent4"/>
-          </a:lnRef>
-          <a:fillRef idx="1">
-            <a:schemeClr val="lt1"/>
-          </a:fillRef>
-          <a:effectRef idx="0">
-            <a:schemeClr val="accent4"/>
-          </a:effectRef>
-          <a:fontRef idx="minor">
-            <a:schemeClr val="dk1"/>
-          </a:fontRef>
-        </p:style>
-        <p:txBody>
-          <a:bodyPr wrap="square" rtlCol="0" anchor="ctr">
-            <a:spAutoFit/>
-          </a:bodyPr>
-          <a:lstStyle/>
-          <a:p>
-            <a:r>
-              <a:rPr lang="en-US" sz="1350" dirty="0" err="1" smtClean="0">
-                <a:latin typeface="Monaco" charset="0"/>
-                <a:ea typeface="Monaco" charset="0"/>
-                <a:cs typeface="Monaco" charset="0"/>
-              </a:rPr>
-              <a:t>MPI_Errhandler_fn</a:t>
-            </a:r>
-            <a:r>
-              <a:rPr lang="en-US" sz="1350" dirty="0" smtClean="0">
-                <a:latin typeface="Monaco" charset="0"/>
-                <a:ea typeface="Monaco" charset="0"/>
-                <a:cs typeface="Monaco" charset="0"/>
-              </a:rPr>
-              <a:t>(</a:t>
-            </a:r>
-            <a:r>
-              <a:rPr lang="is-IS" sz="1350" dirty="0" smtClean="0">
-                <a:latin typeface="Monaco" charset="0"/>
-                <a:ea typeface="Monaco" charset="0"/>
-                <a:cs typeface="Monaco" charset="0"/>
-              </a:rPr>
-              <a:t>…) {</a:t>
-            </a:r>
-          </a:p>
-          <a:p>
-            <a:r>
-              <a:rPr lang="is-IS" sz="1350" dirty="0" smtClean="0">
-                <a:latin typeface="Monaco" charset="0"/>
-                <a:ea typeface="Monaco" charset="0"/>
-                <a:cs typeface="Monaco" charset="0"/>
-              </a:rPr>
-              <a:t>    /* ... Free objects ... */</a:t>
-            </a:r>
-          </a:p>
-          <a:p>
-            <a:r>
-              <a:rPr lang="is-IS" sz="1350" dirty="0">
-                <a:latin typeface="Monaco" charset="0"/>
-                <a:ea typeface="Monaco" charset="0"/>
-                <a:cs typeface="Monaco" charset="0"/>
-              </a:rPr>
-              <a:t> </a:t>
-            </a:r>
-            <a:r>
-              <a:rPr lang="is-IS" sz="1350" dirty="0" smtClean="0">
-                <a:latin typeface="Monaco" charset="0"/>
-                <a:ea typeface="Monaco" charset="0"/>
-                <a:cs typeface="Monaco" charset="0"/>
-              </a:rPr>
-              <a:t>   /* ... Close files ... */</a:t>
-            </a:r>
-          </a:p>
-          <a:p>
-            <a:r>
-              <a:rPr lang="is-IS" sz="1350" dirty="0">
-                <a:latin typeface="Monaco" charset="0"/>
-                <a:ea typeface="Monaco" charset="0"/>
-                <a:cs typeface="Monaco" charset="0"/>
-              </a:rPr>
-              <a:t> </a:t>
-            </a:r>
-            <a:r>
-              <a:rPr lang="is-IS" sz="1350" dirty="0" smtClean="0">
-                <a:latin typeface="Monaco" charset="0"/>
-                <a:ea typeface="Monaco" charset="0"/>
-                <a:cs typeface="Monaco" charset="0"/>
-              </a:rPr>
-              <a:t>   </a:t>
-            </a:r>
-          </a:p>
-          <a:p>
-            <a:r>
-              <a:rPr lang="is-IS" sz="1350" dirty="0">
-                <a:latin typeface="Monaco" charset="0"/>
-                <a:ea typeface="Monaco" charset="0"/>
-                <a:cs typeface="Monaco" charset="0"/>
-              </a:rPr>
-              <a:t> </a:t>
-            </a:r>
-            <a:r>
-              <a:rPr lang="is-IS" sz="1350" dirty="0" smtClean="0">
-                <a:latin typeface="Monaco" charset="0"/>
-                <a:ea typeface="Monaco" charset="0"/>
-                <a:cs typeface="Monaco" charset="0"/>
-              </a:rPr>
-              <a:t>   if (comm) repair_comm(comm);</a:t>
-            </a:r>
-          </a:p>
-          <a:p>
-            <a:r>
-              <a:rPr lang="is-IS" sz="1350" dirty="0">
-                <a:latin typeface="Monaco" charset="0"/>
-                <a:ea typeface="Monaco" charset="0"/>
-                <a:cs typeface="Monaco" charset="0"/>
-              </a:rPr>
-              <a:t> </a:t>
-            </a:r>
-            <a:r>
-              <a:rPr lang="is-IS" sz="1350" dirty="0" smtClean="0">
-                <a:latin typeface="Monaco" charset="0"/>
-                <a:ea typeface="Monaco" charset="0"/>
-                <a:cs typeface="Monaco" charset="0"/>
-              </a:rPr>
-              <a:t>   if (win) repair_win(win);</a:t>
-            </a:r>
-          </a:p>
-          <a:p>
-            <a:r>
-              <a:rPr lang="is-IS" sz="1350" dirty="0">
-                <a:latin typeface="Monaco" charset="0"/>
-                <a:ea typeface="Monaco" charset="0"/>
-                <a:cs typeface="Monaco" charset="0"/>
-              </a:rPr>
-              <a:t> </a:t>
-            </a:r>
-            <a:r>
-              <a:rPr lang="is-IS" sz="1350" dirty="0" smtClean="0">
-                <a:latin typeface="Monaco" charset="0"/>
-                <a:ea typeface="Monaco" charset="0"/>
-                <a:cs typeface="Monaco" charset="0"/>
-              </a:rPr>
-              <a:t>   if (file) repair_file(file);</a:t>
-            </a:r>
-            <a:endParaRPr lang="is-IS" sz="1350" dirty="0">
-              <a:latin typeface="Monaco" charset="0"/>
-              <a:ea typeface="Monaco" charset="0"/>
-              <a:cs typeface="Monaco" charset="0"/>
-            </a:endParaRPr>
-          </a:p>
-          <a:p>
-            <a:r>
-              <a:rPr lang="is-IS" sz="1350" dirty="0" smtClean="0">
-                <a:latin typeface="Monaco" charset="0"/>
-                <a:ea typeface="Monaco" charset="0"/>
-                <a:cs typeface="Monaco" charset="0"/>
-              </a:rPr>
-              <a:t>}</a:t>
-            </a:r>
-            <a:endParaRPr lang="is-IS" sz="1350" dirty="0">
-              <a:latin typeface="Monaco" charset="0"/>
-              <a:ea typeface="Monaco" charset="0"/>
-              <a:cs typeface="Monaco" charset="0"/>
-            </a:endParaRPr>
-          </a:p>
-        </p:txBody>
-      </p:sp>
-      <p:sp>
-        <p:nvSpPr>
-          <p:cNvPr id="9" name="TextBox 8"/>
-          <p:cNvSpPr txBox="1"/>
-          <p:nvPr/>
-        </p:nvSpPr>
-        <p:spPr>
-          <a:xfrm>
-            <a:off x="4300953" y="5252831"/>
-            <a:ext cx="435440" cy="369332"/>
-          </a:xfrm>
-          <a:prstGeom prst="rect">
-            <a:avLst/>
-          </a:prstGeom>
-          <a:noFill/>
-        </p:spPr>
-        <p:txBody>
-          <a:bodyPr wrap="none" rtlCol="0">
-            <a:spAutoFit/>
-          </a:bodyPr>
-          <a:lstStyle/>
-          <a:p>
-            <a:r>
-              <a:rPr lang="en-US" dirty="0"/>
-              <a:t>v</a:t>
-            </a:r>
-            <a:r>
-              <a:rPr lang="en-US" dirty="0" smtClean="0"/>
-              <a:t>s.</a:t>
+          <a:bodyPr rtlCol="0" anchor="ctr"/>
+          <a:lstStyle/>
+          <a:p>
+            <a:pPr algn="ctr"/>
+            <a:endParaRPr lang="en-US"/>
+          </a:p>
+        </p:txBody>
+      </p:sp>
+      <p:sp>
+        <p:nvSpPr>
+          <p:cNvPr id="3" name="Content Placeholder 2"/>
+          <p:cNvSpPr>
+            <a:spLocks noGrp="1"/>
+          </p:cNvSpPr>
+          <p:nvPr>
+            <p:ph idx="1"/>
+          </p:nvPr>
+        </p:nvSpPr>
+        <p:spPr/>
+        <p:txBody>
+          <a:bodyPr/>
+          <a:lstStyle/>
+          <a:p>
+            <a:r>
+              <a:rPr lang="en-US" dirty="0" smtClean="0"/>
+              <a:t>Allow the application to provide some sort of per –object context to the error handler</a:t>
+            </a:r>
+          </a:p>
+          <a:p>
+            <a:r>
+              <a:rPr lang="en-US" dirty="0" smtClean="0"/>
+              <a:t>We’d add something to the function to set the error handler with a void *context</a:t>
+            </a:r>
+          </a:p>
+          <a:p>
+            <a:r>
+              <a:rPr lang="en-US" dirty="0" smtClean="0"/>
+              <a:t>Might already get this via the info object on the communication object</a:t>
+            </a:r>
+          </a:p>
+          <a:p>
+            <a:pPr lvl="1"/>
+            <a:r>
+              <a:rPr lang="en-US" dirty="0" smtClean="0"/>
+              <a:t>George? Brought this up on the con call, but what is the idea here? Strings only</a:t>
+            </a:r>
+            <a:r>
+              <a:rPr lang="en-US" dirty="0" smtClean="0"/>
+              <a:t>?</a:t>
+            </a:r>
+          </a:p>
+          <a:p>
+            <a:pPr lvl="1"/>
+            <a:r>
+              <a:rPr lang="en-US" dirty="0" smtClean="0"/>
+              <a:t>Could provide anything to the char * and cast or use attributes</a:t>
             </a:r>
             <a:endParaRPr lang="en-US" dirty="0"/>
           </a:p>
@@ -6223,7 +6448,7 @@
     </p:spTree>
     <p:extLst>
       <p:ext uri="{BB962C8B-B14F-4D97-AF65-F5344CB8AC3E}">
-        <p14:creationId xmlns:p14="http://schemas.microsoft.com/office/powerpoint/2010/main" val="533739408"/>
+        <p14:creationId xmlns:p14="http://schemas.microsoft.com/office/powerpoint/2010/main" val="1196468407"/>
       </p:ext>
     </p:extLst>
   </p:cSld>

</xml_diff>

<commit_message>
Update slides for FTWG F2F meeting
</commit_message>
<xml_diff>
--- a/slides/2016-03-01-FTWG-Error-Handlers.pptx
+++ b/slides/2016-03-01-FTWG-Error-Handlers.pptx
@@ -255,7 +255,7 @@
           <a:p>
             <a:fld id="{46937E52-4684-DE44-B24F-C2CD0B439DDE}" type="datetimeFigureOut">
               <a:rPr lang="en-US" smtClean="0"/>
-              <a:t>3/1/16</a:t>
+              <a:t>3/15/16</a:t>
             </a:fld>
             <a:endParaRPr lang="en-US"/>
           </a:p>
@@ -425,7 +425,7 @@
           <a:p>
             <a:fld id="{46937E52-4684-DE44-B24F-C2CD0B439DDE}" type="datetimeFigureOut">
               <a:rPr lang="en-US" smtClean="0"/>
-              <a:t>3/1/16</a:t>
+              <a:t>3/15/16</a:t>
             </a:fld>
             <a:endParaRPr lang="en-US"/>
           </a:p>
@@ -605,7 +605,7 @@
           <a:p>
             <a:fld id="{46937E52-4684-DE44-B24F-C2CD0B439DDE}" type="datetimeFigureOut">
               <a:rPr lang="en-US" smtClean="0"/>
-              <a:t>3/1/16</a:t>
+              <a:t>3/15/16</a:t>
             </a:fld>
             <a:endParaRPr lang="en-US"/>
           </a:p>
@@ -775,7 +775,7 @@
           <a:p>
             <a:fld id="{46937E52-4684-DE44-B24F-C2CD0B439DDE}" type="datetimeFigureOut">
               <a:rPr lang="en-US" smtClean="0"/>
-              <a:t>3/1/16</a:t>
+              <a:t>3/15/16</a:t>
             </a:fld>
             <a:endParaRPr lang="en-US"/>
           </a:p>
@@ -1019,7 +1019,7 @@
           <a:p>
             <a:fld id="{46937E52-4684-DE44-B24F-C2CD0B439DDE}" type="datetimeFigureOut">
               <a:rPr lang="en-US" smtClean="0"/>
-              <a:t>3/1/16</a:t>
+              <a:t>3/15/16</a:t>
             </a:fld>
             <a:endParaRPr lang="en-US"/>
           </a:p>
@@ -1251,7 +1251,7 @@
           <a:p>
             <a:fld id="{46937E52-4684-DE44-B24F-C2CD0B439DDE}" type="datetimeFigureOut">
               <a:rPr lang="en-US" smtClean="0"/>
-              <a:t>3/1/16</a:t>
+              <a:t>3/15/16</a:t>
             </a:fld>
             <a:endParaRPr lang="en-US"/>
           </a:p>
@@ -1618,7 +1618,7 @@
           <a:p>
             <a:fld id="{46937E52-4684-DE44-B24F-C2CD0B439DDE}" type="datetimeFigureOut">
               <a:rPr lang="en-US" smtClean="0"/>
-              <a:t>3/1/16</a:t>
+              <a:t>3/15/16</a:t>
             </a:fld>
             <a:endParaRPr lang="en-US"/>
           </a:p>
@@ -1736,7 +1736,7 @@
           <a:p>
             <a:fld id="{46937E52-4684-DE44-B24F-C2CD0B439DDE}" type="datetimeFigureOut">
               <a:rPr lang="en-US" smtClean="0"/>
-              <a:t>3/1/16</a:t>
+              <a:t>3/15/16</a:t>
             </a:fld>
             <a:endParaRPr lang="en-US"/>
           </a:p>
@@ -1831,7 +1831,7 @@
           <a:p>
             <a:fld id="{46937E52-4684-DE44-B24F-C2CD0B439DDE}" type="datetimeFigureOut">
               <a:rPr lang="en-US" smtClean="0"/>
-              <a:t>3/1/16</a:t>
+              <a:t>3/15/16</a:t>
             </a:fld>
             <a:endParaRPr lang="en-US"/>
           </a:p>
@@ -2108,7 +2108,7 @@
           <a:p>
             <a:fld id="{46937E52-4684-DE44-B24F-C2CD0B439DDE}" type="datetimeFigureOut">
               <a:rPr lang="en-US" smtClean="0"/>
-              <a:t>3/1/16</a:t>
+              <a:t>3/15/16</a:t>
             </a:fld>
             <a:endParaRPr lang="en-US"/>
           </a:p>
@@ -2365,7 +2365,7 @@
           <a:p>
             <a:fld id="{46937E52-4684-DE44-B24F-C2CD0B439DDE}" type="datetimeFigureOut">
               <a:rPr lang="en-US" smtClean="0"/>
-              <a:t>3/1/16</a:t>
+              <a:t>3/15/16</a:t>
             </a:fld>
             <a:endParaRPr lang="en-US"/>
           </a:p>
@@ -2578,7 +2578,7 @@
           <a:p>
             <a:fld id="{46937E52-4684-DE44-B24F-C2CD0B439DDE}" type="datetimeFigureOut">
               <a:rPr lang="en-US" smtClean="0"/>
-              <a:t>3/1/16</a:t>
+              <a:t>3/15/16</a:t>
             </a:fld>
             <a:endParaRPr lang="en-US"/>
           </a:p>
@@ -3126,11 +3126,7 @@
           <a:p>
             <a:r>
               <a:rPr lang="en-US" dirty="0" smtClean="0"/>
-              <a:t>Add some predefined value for </a:t>
-            </a:r>
-            <a:r>
-              <a:rPr lang="en-US" dirty="0" smtClean="0"/>
-              <a:t>MPI_ALL_ERROR_CLASSES</a:t>
+              <a:t>Add some predefined value for MPI_ALL_ERROR_CLASSES</a:t>
             </a:r>
           </a:p>
           <a:p>
@@ -4420,11 +4416,6 @@
               </a:rPr>
               <a:t>;</a:t>
             </a:r>
-            <a:endParaRPr lang="en-US" sz="1200" dirty="0" smtClean="0">
-              <a:latin typeface="Monaco" charset="0"/>
-              <a:ea typeface="Monaco" charset="0"/>
-              <a:cs typeface="Monaco" charset="0"/>
-            </a:endParaRPr>
           </a:p>
           <a:p>
             <a:pPr>
@@ -4905,15 +4896,7 @@
                 <a:ea typeface="Calibri" charset="0"/>
                 <a:cs typeface="Calibri" charset="0"/>
               </a:rPr>
-              <a:t>New type for error handler </a:t>
-            </a:r>
-            <a:r>
-              <a:rPr lang="en-US" sz="2000" dirty="0" smtClean="0">
-                <a:latin typeface="Calibri" charset="0"/>
-                <a:ea typeface="Calibri" charset="0"/>
-                <a:cs typeface="Calibri" charset="0"/>
-              </a:rPr>
-              <a:t>functions</a:t>
+              <a:t>New type for error handler functions</a:t>
             </a:r>
           </a:p>
           <a:p>
@@ -5120,7 +5103,7 @@
         <p:spPr/>
         <p:txBody>
           <a:bodyPr>
-            <a:normAutofit fontScale="77500" lnSpcReduction="20000"/>
+            <a:normAutofit fontScale="70000" lnSpcReduction="20000"/>
           </a:bodyPr>
           <a:lstStyle/>
           <a:p>
@@ -5165,8 +5148,13 @@
           <a:p>
             <a:r>
               <a:rPr lang="en-US" dirty="0" smtClean="0"/>
-              <a:t>Pick which error classes we handle in a single function</a:t>
-            </a:r>
+              <a:t>Pick which error classes we handle in a single </a:t>
+            </a:r>
+            <a:r>
+              <a:rPr lang="en-US" dirty="0" smtClean="0"/>
+              <a:t>function (catastrophic?)</a:t>
+            </a:r>
+            <a:endParaRPr lang="en-US" dirty="0" smtClean="0"/>
           </a:p>
           <a:p>
             <a:r>
@@ -5186,11 +5174,7 @@
             </a:r>
             <a:r>
               <a:rPr lang="en-US" dirty="0" smtClean="0"/>
-              <a:t>/union/whatever to figure out what is </a:t>
-            </a:r>
-            <a:r>
-              <a:rPr lang="en-US" dirty="0" smtClean="0"/>
-              <a:t>impacted</a:t>
+              <a:t>/union/whatever to figure out what is impacted</a:t>
             </a:r>
           </a:p>
           <a:p>
@@ -5220,7 +5204,25 @@
                   <a:srgbClr val="FF0000"/>
                 </a:solidFill>
               </a:rPr>
-              <a:t>Location to long jump</a:t>
+              <a:t>Location to long </a:t>
+            </a:r>
+            <a:r>
+              <a:rPr lang="en-US" dirty="0" smtClean="0">
+                <a:solidFill>
+                  <a:srgbClr val="FF0000"/>
+                </a:solidFill>
+              </a:rPr>
+              <a:t>jump</a:t>
+            </a:r>
+          </a:p>
+          <a:p>
+            <a:r>
+              <a:rPr lang="en-US" dirty="0" smtClean="0">
+                <a:solidFill>
+                  <a:srgbClr val="FF0000"/>
+                </a:solidFill>
+              </a:rPr>
+              <a:t>Add an error handler for each operation</a:t>
             </a:r>
             <a:endParaRPr lang="en-US" dirty="0" smtClean="0">
               <a:solidFill>
@@ -6428,11 +6430,7 @@
             <a:pPr lvl="1"/>
             <a:r>
               <a:rPr lang="en-US" dirty="0" smtClean="0"/>
-              <a:t>George? Brought this up on the con call, but what is the idea here? Strings only</a:t>
-            </a:r>
-            <a:r>
-              <a:rPr lang="en-US" dirty="0" smtClean="0"/>
-              <a:t>?</a:t>
+              <a:t>George? Brought this up on the con call, but what is the idea here? Strings only?</a:t>
             </a:r>
           </a:p>
           <a:p>

</xml_diff>